<commit_message>
model specification and table for estimates
</commit_message>
<xml_diff>
--- a/libs/materials/naming_convention.pptx
+++ b/libs/materials/naming_convention.pptx
@@ -6,6 +6,8 @@
   </p:sldMasterIdLst>
   <p:sldIdLst>
     <p:sldId id="256" r:id="rId2"/>
+    <p:sldId id="257" r:id="rId3"/>
+    <p:sldId id="258" r:id="rId4"/>
   </p:sldIdLst>
   <p:sldSz cx="12192000" cy="6858000"/>
   <p:notesSz cx="6858000" cy="9144000"/>
@@ -104,6 +106,11 @@
       </a:defRPr>
     </a:lvl9pPr>
   </p:defaultTextStyle>
+  <p:extLst>
+    <p:ext uri="{EFAFB233-063F-42B5-8137-9DF3F51BA10A}">
+      <p15:sldGuideLst xmlns:p15="http://schemas.microsoft.com/office/powerpoint/2012/main"/>
+    </p:ext>
+  </p:extLst>
 </p:presentation>
 </file>
 
@@ -238,7 +245,7 @@
           <a:p>
             <a:fld id="{FFC3AEC4-2EDB-40EB-AFB2-2248CB6E3774}" type="datetimeFigureOut">
               <a:rPr lang="en-US" smtClean="0"/>
-              <a:t>2/25/2015</a:t>
+              <a:t>4/29/2015</a:t>
             </a:fld>
             <a:endParaRPr lang="en-US"/>
           </a:p>
@@ -408,7 +415,7 @@
           <a:p>
             <a:fld id="{FFC3AEC4-2EDB-40EB-AFB2-2248CB6E3774}" type="datetimeFigureOut">
               <a:rPr lang="en-US" smtClean="0"/>
-              <a:t>2/25/2015</a:t>
+              <a:t>4/29/2015</a:t>
             </a:fld>
             <a:endParaRPr lang="en-US"/>
           </a:p>
@@ -588,7 +595,7 @@
           <a:p>
             <a:fld id="{FFC3AEC4-2EDB-40EB-AFB2-2248CB6E3774}" type="datetimeFigureOut">
               <a:rPr lang="en-US" smtClean="0"/>
-              <a:t>2/25/2015</a:t>
+              <a:t>4/29/2015</a:t>
             </a:fld>
             <a:endParaRPr lang="en-US"/>
           </a:p>
@@ -758,7 +765,7 @@
           <a:p>
             <a:fld id="{FFC3AEC4-2EDB-40EB-AFB2-2248CB6E3774}" type="datetimeFigureOut">
               <a:rPr lang="en-US" smtClean="0"/>
-              <a:t>2/25/2015</a:t>
+              <a:t>4/29/2015</a:t>
             </a:fld>
             <a:endParaRPr lang="en-US"/>
           </a:p>
@@ -1004,7 +1011,7 @@
           <a:p>
             <a:fld id="{FFC3AEC4-2EDB-40EB-AFB2-2248CB6E3774}" type="datetimeFigureOut">
               <a:rPr lang="en-US" smtClean="0"/>
-              <a:t>2/25/2015</a:t>
+              <a:t>4/29/2015</a:t>
             </a:fld>
             <a:endParaRPr lang="en-US"/>
           </a:p>
@@ -1236,7 +1243,7 @@
           <a:p>
             <a:fld id="{FFC3AEC4-2EDB-40EB-AFB2-2248CB6E3774}" type="datetimeFigureOut">
               <a:rPr lang="en-US" smtClean="0"/>
-              <a:t>2/25/2015</a:t>
+              <a:t>4/29/2015</a:t>
             </a:fld>
             <a:endParaRPr lang="en-US"/>
           </a:p>
@@ -1603,7 +1610,7 @@
           <a:p>
             <a:fld id="{FFC3AEC4-2EDB-40EB-AFB2-2248CB6E3774}" type="datetimeFigureOut">
               <a:rPr lang="en-US" smtClean="0"/>
-              <a:t>2/25/2015</a:t>
+              <a:t>4/29/2015</a:t>
             </a:fld>
             <a:endParaRPr lang="en-US"/>
           </a:p>
@@ -1721,7 +1728,7 @@
           <a:p>
             <a:fld id="{FFC3AEC4-2EDB-40EB-AFB2-2248CB6E3774}" type="datetimeFigureOut">
               <a:rPr lang="en-US" smtClean="0"/>
-              <a:t>2/25/2015</a:t>
+              <a:t>4/29/2015</a:t>
             </a:fld>
             <a:endParaRPr lang="en-US"/>
           </a:p>
@@ -1816,7 +1823,7 @@
           <a:p>
             <a:fld id="{FFC3AEC4-2EDB-40EB-AFB2-2248CB6E3774}" type="datetimeFigureOut">
               <a:rPr lang="en-US" smtClean="0"/>
-              <a:t>2/25/2015</a:t>
+              <a:t>4/29/2015</a:t>
             </a:fld>
             <a:endParaRPr lang="en-US"/>
           </a:p>
@@ -2093,7 +2100,7 @@
           <a:p>
             <a:fld id="{FFC3AEC4-2EDB-40EB-AFB2-2248CB6E3774}" type="datetimeFigureOut">
               <a:rPr lang="en-US" smtClean="0"/>
-              <a:t>2/25/2015</a:t>
+              <a:t>4/29/2015</a:t>
             </a:fld>
             <a:endParaRPr lang="en-US"/>
           </a:p>
@@ -2346,7 +2353,7 @@
           <a:p>
             <a:fld id="{FFC3AEC4-2EDB-40EB-AFB2-2248CB6E3774}" type="datetimeFigureOut">
               <a:rPr lang="en-US" smtClean="0"/>
-              <a:t>2/25/2015</a:t>
+              <a:t>4/29/2015</a:t>
             </a:fld>
             <a:endParaRPr lang="en-US"/>
           </a:p>
@@ -2559,7 +2566,7 @@
           <a:p>
             <a:fld id="{FFC3AEC4-2EDB-40EB-AFB2-2248CB6E3774}" type="datetimeFigureOut">
               <a:rPr lang="en-US" smtClean="0"/>
-              <a:t>2/25/2015</a:t>
+              <a:t>4/29/2015</a:t>
             </a:fld>
             <a:endParaRPr lang="en-US"/>
           </a:p>
@@ -3491,6 +3498,849 @@
 </p:sld>
 </file>
 
+<file path=ppt/slides/slide2.xml><?xml version="1.0" encoding="utf-8"?>
+<p:sld xmlns:a="http://schemas.openxmlformats.org/drawingml/2006/main" xmlns:r="http://schemas.openxmlformats.org/officeDocument/2006/relationships" xmlns:p="http://schemas.openxmlformats.org/presentationml/2006/main">
+  <p:cSld>
+    <p:spTree>
+      <p:nvGrpSpPr>
+        <p:cNvPr id="1" name=""/>
+        <p:cNvGrpSpPr/>
+        <p:nvPr/>
+      </p:nvGrpSpPr>
+      <p:grpSpPr>
+        <a:xfrm>
+          <a:off x="0" y="0"/>
+          <a:ext cx="0" cy="0"/>
+          <a:chOff x="0" y="0"/>
+          <a:chExt cx="0" cy="0"/>
+        </a:xfrm>
+      </p:grpSpPr>
+      <p:grpSp>
+        <p:nvGrpSpPr>
+          <p:cNvPr id="18" name="Group 17"/>
+          <p:cNvGrpSpPr/>
+          <p:nvPr/>
+        </p:nvGrpSpPr>
+        <p:grpSpPr>
+          <a:xfrm>
+            <a:off x="1785480" y="293688"/>
+            <a:ext cx="7655383" cy="3371850"/>
+            <a:chOff x="292686" y="315259"/>
+            <a:chExt cx="7655383" cy="3371850"/>
+          </a:xfrm>
+        </p:grpSpPr>
+        <p:graphicFrame>
+          <p:nvGraphicFramePr>
+            <p:cNvPr id="6" name="Object 5"/>
+            <p:cNvGraphicFramePr>
+              <a:graphicFrameLocks noChangeAspect="1"/>
+            </p:cNvGraphicFramePr>
+            <p:nvPr>
+              <p:extLst>
+                <p:ext uri="{D42A27DB-BD31-4B8C-83A1-F6EECF244321}">
+                  <p14:modId xmlns:p14="http://schemas.microsoft.com/office/powerpoint/2010/main" val="911362208"/>
+                </p:ext>
+              </p:extLst>
+            </p:nvPr>
+          </p:nvGraphicFramePr>
+          <p:xfrm>
+            <a:off x="292686" y="1758449"/>
+            <a:ext cx="4064000" cy="487363"/>
+          </p:xfrm>
+          <a:graphic>
+            <a:graphicData uri="http://schemas.openxmlformats.org/presentationml/2006/ole">
+              <mc:AlternateContent xmlns:mc="http://schemas.openxmlformats.org/markup-compatibility/2006">
+                <mc:Choice xmlns:v="urn:schemas-microsoft-com:vml" Requires="v">
+                  <p:oleObj spid="_x0000_s1066" name="Equation" r:id="rId3" imgW="1904760" imgH="228600" progId="Equation.DSMT4">
+                    <p:embed/>
+                  </p:oleObj>
+                </mc:Choice>
+                <mc:Fallback>
+                  <p:oleObj name="Equation" r:id="rId3" imgW="1904760" imgH="228600" progId="Equation.DSMT4">
+                    <p:embed/>
+                    <p:pic>
+                      <p:nvPicPr>
+                        <p:cNvPr id="0" name=""/>
+                        <p:cNvPicPr/>
+                        <p:nvPr/>
+                      </p:nvPicPr>
+                      <p:blipFill>
+                        <a:blip r:embed="rId4"/>
+                        <a:stretch>
+                          <a:fillRect/>
+                        </a:stretch>
+                      </p:blipFill>
+                      <p:spPr>
+                        <a:xfrm>
+                          <a:off x="292686" y="1758449"/>
+                          <a:ext cx="4064000" cy="487363"/>
+                        </a:xfrm>
+                        <a:prstGeom prst="rect">
+                          <a:avLst/>
+                        </a:prstGeom>
+                      </p:spPr>
+                    </p:pic>
+                  </p:oleObj>
+                </mc:Fallback>
+              </mc:AlternateContent>
+            </a:graphicData>
+          </a:graphic>
+        </p:graphicFrame>
+        <p:graphicFrame>
+          <p:nvGraphicFramePr>
+            <p:cNvPr id="7" name="Object 6"/>
+            <p:cNvGraphicFramePr>
+              <a:graphicFrameLocks noChangeAspect="1"/>
+            </p:cNvGraphicFramePr>
+            <p:nvPr>
+              <p:extLst>
+                <p:ext uri="{D42A27DB-BD31-4B8C-83A1-F6EECF244321}">
+                  <p14:modId xmlns:p14="http://schemas.microsoft.com/office/powerpoint/2010/main" val="1596895567"/>
+                </p:ext>
+              </p:extLst>
+            </p:nvPr>
+          </p:nvGraphicFramePr>
+          <p:xfrm>
+            <a:off x="380456" y="315259"/>
+            <a:ext cx="6797675" cy="514350"/>
+          </p:xfrm>
+          <a:graphic>
+            <a:graphicData uri="http://schemas.openxmlformats.org/presentationml/2006/ole">
+              <mc:AlternateContent xmlns:mc="http://schemas.openxmlformats.org/markup-compatibility/2006">
+                <mc:Choice xmlns:v="urn:schemas-microsoft-com:vml" Requires="v">
+                  <p:oleObj spid="_x0000_s1067" name="Equation" r:id="rId5" imgW="3187440" imgH="241200" progId="Equation.DSMT4">
+                    <p:embed/>
+                  </p:oleObj>
+                </mc:Choice>
+                <mc:Fallback>
+                  <p:oleObj name="Equation" r:id="rId5" imgW="3187440" imgH="241200" progId="Equation.DSMT4">
+                    <p:embed/>
+                    <p:pic>
+                      <p:nvPicPr>
+                        <p:cNvPr id="0" name=""/>
+                        <p:cNvPicPr/>
+                        <p:nvPr/>
+                      </p:nvPicPr>
+                      <p:blipFill>
+                        <a:blip r:embed="rId6"/>
+                        <a:stretch>
+                          <a:fillRect/>
+                        </a:stretch>
+                      </p:blipFill>
+                      <p:spPr>
+                        <a:xfrm>
+                          <a:off x="380456" y="315259"/>
+                          <a:ext cx="6797675" cy="514350"/>
+                        </a:xfrm>
+                        <a:prstGeom prst="rect">
+                          <a:avLst/>
+                        </a:prstGeom>
+                      </p:spPr>
+                    </p:pic>
+                  </p:oleObj>
+                </mc:Fallback>
+              </mc:AlternateContent>
+            </a:graphicData>
+          </a:graphic>
+        </p:graphicFrame>
+        <p:graphicFrame>
+          <p:nvGraphicFramePr>
+            <p:cNvPr id="8" name="Object 7"/>
+            <p:cNvGraphicFramePr>
+              <a:graphicFrameLocks noChangeAspect="1"/>
+            </p:cNvGraphicFramePr>
+            <p:nvPr>
+              <p:extLst>
+                <p:ext uri="{D42A27DB-BD31-4B8C-83A1-F6EECF244321}">
+                  <p14:modId xmlns:p14="http://schemas.microsoft.com/office/powerpoint/2010/main" val="3622217143"/>
+                </p:ext>
+              </p:extLst>
+            </p:nvPr>
+          </p:nvGraphicFramePr>
+          <p:xfrm>
+            <a:off x="1286919" y="1035984"/>
+            <a:ext cx="6661150" cy="514350"/>
+          </p:xfrm>
+          <a:graphic>
+            <a:graphicData uri="http://schemas.openxmlformats.org/presentationml/2006/ole">
+              <mc:AlternateContent xmlns:mc="http://schemas.openxmlformats.org/markup-compatibility/2006">
+                <mc:Choice xmlns:v="urn:schemas-microsoft-com:vml" Requires="v">
+                  <p:oleObj spid="_x0000_s1068" name="Equation" r:id="rId7" imgW="3124080" imgH="241200" progId="Equation.DSMT4">
+                    <p:embed/>
+                  </p:oleObj>
+                </mc:Choice>
+                <mc:Fallback>
+                  <p:oleObj name="Equation" r:id="rId7" imgW="3124080" imgH="241200" progId="Equation.DSMT4">
+                    <p:embed/>
+                    <p:pic>
+                      <p:nvPicPr>
+                        <p:cNvPr id="0" name=""/>
+                        <p:cNvPicPr/>
+                        <p:nvPr/>
+                      </p:nvPicPr>
+                      <p:blipFill>
+                        <a:blip r:embed="rId8"/>
+                        <a:stretch>
+                          <a:fillRect/>
+                        </a:stretch>
+                      </p:blipFill>
+                      <p:spPr>
+                        <a:xfrm>
+                          <a:off x="1286919" y="1035984"/>
+                          <a:ext cx="6661150" cy="514350"/>
+                        </a:xfrm>
+                        <a:prstGeom prst="rect">
+                          <a:avLst/>
+                        </a:prstGeom>
+                      </p:spPr>
+                    </p:pic>
+                  </p:oleObj>
+                </mc:Fallback>
+              </mc:AlternateContent>
+            </a:graphicData>
+          </a:graphic>
+        </p:graphicFrame>
+        <p:graphicFrame>
+          <p:nvGraphicFramePr>
+            <p:cNvPr id="9" name="Object 8"/>
+            <p:cNvGraphicFramePr>
+              <a:graphicFrameLocks noChangeAspect="1"/>
+            </p:cNvGraphicFramePr>
+            <p:nvPr>
+              <p:extLst>
+                <p:ext uri="{D42A27DB-BD31-4B8C-83A1-F6EECF244321}">
+                  <p14:modId xmlns:p14="http://schemas.microsoft.com/office/powerpoint/2010/main" val="684153974"/>
+                </p:ext>
+              </p:extLst>
+            </p:nvPr>
+          </p:nvGraphicFramePr>
+          <p:xfrm>
+            <a:off x="486819" y="3172759"/>
+            <a:ext cx="6689725" cy="514350"/>
+          </p:xfrm>
+          <a:graphic>
+            <a:graphicData uri="http://schemas.openxmlformats.org/presentationml/2006/ole">
+              <mc:AlternateContent xmlns:mc="http://schemas.openxmlformats.org/markup-compatibility/2006">
+                <mc:Choice xmlns:v="urn:schemas-microsoft-com:vml" Requires="v">
+                  <p:oleObj spid="_x0000_s1069" name="Equation" r:id="rId9" imgW="3136680" imgH="241200" progId="Equation.DSMT4">
+                    <p:embed/>
+                  </p:oleObj>
+                </mc:Choice>
+                <mc:Fallback>
+                  <p:oleObj name="Equation" r:id="rId9" imgW="3136680" imgH="241200" progId="Equation.DSMT4">
+                    <p:embed/>
+                    <p:pic>
+                      <p:nvPicPr>
+                        <p:cNvPr id="0" name=""/>
+                        <p:cNvPicPr/>
+                        <p:nvPr/>
+                      </p:nvPicPr>
+                      <p:blipFill>
+                        <a:blip r:embed="rId10"/>
+                        <a:stretch>
+                          <a:fillRect/>
+                        </a:stretch>
+                      </p:blipFill>
+                      <p:spPr>
+                        <a:xfrm>
+                          <a:off x="486819" y="3172759"/>
+                          <a:ext cx="6689725" cy="514350"/>
+                        </a:xfrm>
+                        <a:prstGeom prst="rect">
+                          <a:avLst/>
+                        </a:prstGeom>
+                      </p:spPr>
+                    </p:pic>
+                  </p:oleObj>
+                </mc:Fallback>
+              </mc:AlternateContent>
+            </a:graphicData>
+          </a:graphic>
+        </p:graphicFrame>
+        <p:graphicFrame>
+          <p:nvGraphicFramePr>
+            <p:cNvPr id="10" name="Object 9"/>
+            <p:cNvGraphicFramePr>
+              <a:graphicFrameLocks noChangeAspect="1"/>
+            </p:cNvGraphicFramePr>
+            <p:nvPr>
+              <p:extLst>
+                <p:ext uri="{D42A27DB-BD31-4B8C-83A1-F6EECF244321}">
+                  <p14:modId xmlns:p14="http://schemas.microsoft.com/office/powerpoint/2010/main" val="2054376199"/>
+                </p:ext>
+              </p:extLst>
+            </p:nvPr>
+          </p:nvGraphicFramePr>
+          <p:xfrm>
+            <a:off x="1286919" y="2452034"/>
+            <a:ext cx="6551612" cy="514350"/>
+          </p:xfrm>
+          <a:graphic>
+            <a:graphicData uri="http://schemas.openxmlformats.org/presentationml/2006/ole">
+              <mc:AlternateContent xmlns:mc="http://schemas.openxmlformats.org/markup-compatibility/2006">
+                <mc:Choice xmlns:v="urn:schemas-microsoft-com:vml" Requires="v">
+                  <p:oleObj spid="_x0000_s1070" name="Equation" r:id="rId11" imgW="3073320" imgH="241200" progId="Equation.DSMT4">
+                    <p:embed/>
+                  </p:oleObj>
+                </mc:Choice>
+                <mc:Fallback>
+                  <p:oleObj name="Equation" r:id="rId11" imgW="3073320" imgH="241200" progId="Equation.DSMT4">
+                    <p:embed/>
+                    <p:pic>
+                      <p:nvPicPr>
+                        <p:cNvPr id="0" name=""/>
+                        <p:cNvPicPr/>
+                        <p:nvPr/>
+                      </p:nvPicPr>
+                      <p:blipFill>
+                        <a:blip r:embed="rId12"/>
+                        <a:stretch>
+                          <a:fillRect/>
+                        </a:stretch>
+                      </p:blipFill>
+                      <p:spPr>
+                        <a:xfrm>
+                          <a:off x="1286919" y="2452034"/>
+                          <a:ext cx="6551612" cy="514350"/>
+                        </a:xfrm>
+                        <a:prstGeom prst="rect">
+                          <a:avLst/>
+                        </a:prstGeom>
+                      </p:spPr>
+                    </p:pic>
+                  </p:oleObj>
+                </mc:Fallback>
+              </mc:AlternateContent>
+            </a:graphicData>
+          </a:graphic>
+        </p:graphicFrame>
+      </p:grpSp>
+      <p:grpSp>
+        <p:nvGrpSpPr>
+          <p:cNvPr id="19" name="Group 18"/>
+          <p:cNvGrpSpPr/>
+          <p:nvPr/>
+        </p:nvGrpSpPr>
+        <p:grpSpPr>
+          <a:xfrm>
+            <a:off x="1568032" y="4466390"/>
+            <a:ext cx="8442285" cy="1460500"/>
+            <a:chOff x="1054684" y="4690980"/>
+            <a:chExt cx="8442285" cy="1460500"/>
+          </a:xfrm>
+        </p:grpSpPr>
+        <p:graphicFrame>
+          <p:nvGraphicFramePr>
+            <p:cNvPr id="12" name="Object 11"/>
+            <p:cNvGraphicFramePr>
+              <a:graphicFrameLocks noChangeAspect="1"/>
+            </p:cNvGraphicFramePr>
+            <p:nvPr>
+              <p:extLst>
+                <p:ext uri="{D42A27DB-BD31-4B8C-83A1-F6EECF244321}">
+                  <p14:modId xmlns:p14="http://schemas.microsoft.com/office/powerpoint/2010/main" val="559808419"/>
+                </p:ext>
+              </p:extLst>
+            </p:nvPr>
+          </p:nvGraphicFramePr>
+          <p:xfrm>
+            <a:off x="6993481" y="4690980"/>
+            <a:ext cx="2503488" cy="1460500"/>
+          </p:xfrm>
+          <a:graphic>
+            <a:graphicData uri="http://schemas.openxmlformats.org/presentationml/2006/ole">
+              <mc:AlternateContent xmlns:mc="http://schemas.openxmlformats.org/markup-compatibility/2006">
+                <mc:Choice xmlns:v="urn:schemas-microsoft-com:vml" Requires="v">
+                  <p:oleObj spid="_x0000_s1071" name="Equation" r:id="rId13" imgW="1650960" imgH="965160" progId="Equation.DSMT4">
+                    <p:embed/>
+                  </p:oleObj>
+                </mc:Choice>
+                <mc:Fallback>
+                  <p:oleObj name="Equation" r:id="rId13" imgW="1650960" imgH="965160" progId="Equation.DSMT4">
+                    <p:embed/>
+                    <p:pic>
+                      <p:nvPicPr>
+                        <p:cNvPr id="0" name=""/>
+                        <p:cNvPicPr/>
+                        <p:nvPr/>
+                      </p:nvPicPr>
+                      <p:blipFill>
+                        <a:blip r:embed="rId14"/>
+                        <a:stretch>
+                          <a:fillRect/>
+                        </a:stretch>
+                      </p:blipFill>
+                      <p:spPr>
+                        <a:xfrm>
+                          <a:off x="6993481" y="4690980"/>
+                          <a:ext cx="2503488" cy="1460500"/>
+                        </a:xfrm>
+                        <a:prstGeom prst="rect">
+                          <a:avLst/>
+                        </a:prstGeom>
+                      </p:spPr>
+                    </p:pic>
+                  </p:oleObj>
+                </mc:Fallback>
+              </mc:AlternateContent>
+            </a:graphicData>
+          </a:graphic>
+        </p:graphicFrame>
+        <p:graphicFrame>
+          <p:nvGraphicFramePr>
+            <p:cNvPr id="13" name="Object 12"/>
+            <p:cNvGraphicFramePr>
+              <a:graphicFrameLocks noChangeAspect="1"/>
+            </p:cNvGraphicFramePr>
+            <p:nvPr>
+              <p:extLst>
+                <p:ext uri="{D42A27DB-BD31-4B8C-83A1-F6EECF244321}">
+                  <p14:modId xmlns:p14="http://schemas.microsoft.com/office/powerpoint/2010/main" val="2919850147"/>
+                </p:ext>
+              </p:extLst>
+            </p:nvPr>
+          </p:nvGraphicFramePr>
+          <p:xfrm>
+            <a:off x="3138903" y="4752245"/>
+            <a:ext cx="3731293" cy="1399235"/>
+          </p:xfrm>
+          <a:graphic>
+            <a:graphicData uri="http://schemas.openxmlformats.org/presentationml/2006/ole">
+              <mc:AlternateContent xmlns:mc="http://schemas.openxmlformats.org/markup-compatibility/2006">
+                <mc:Choice xmlns:v="urn:schemas-microsoft-com:vml" Requires="v">
+                  <p:oleObj spid="_x0000_s1072" name="Equation" r:id="rId15" imgW="2438280" imgH="914400" progId="Equation.DSMT4">
+                    <p:embed/>
+                  </p:oleObj>
+                </mc:Choice>
+                <mc:Fallback>
+                  <p:oleObj name="Equation" r:id="rId15" imgW="2438280" imgH="914400" progId="Equation.DSMT4">
+                    <p:embed/>
+                    <p:pic>
+                      <p:nvPicPr>
+                        <p:cNvPr id="0" name=""/>
+                        <p:cNvPicPr/>
+                        <p:nvPr/>
+                      </p:nvPicPr>
+                      <p:blipFill>
+                        <a:blip r:embed="rId16"/>
+                        <a:stretch>
+                          <a:fillRect/>
+                        </a:stretch>
+                      </p:blipFill>
+                      <p:spPr>
+                        <a:xfrm>
+                          <a:off x="3138903" y="4752245"/>
+                          <a:ext cx="3731293" cy="1399235"/>
+                        </a:xfrm>
+                        <a:prstGeom prst="rect">
+                          <a:avLst/>
+                        </a:prstGeom>
+                      </p:spPr>
+                    </p:pic>
+                  </p:oleObj>
+                </mc:Fallback>
+              </mc:AlternateContent>
+            </a:graphicData>
+          </a:graphic>
+        </p:graphicFrame>
+        <p:sp>
+          <p:nvSpPr>
+            <p:cNvPr id="14" name="TextBox 13"/>
+            <p:cNvSpPr txBox="1"/>
+            <p:nvPr/>
+          </p:nvSpPr>
+          <p:spPr>
+            <a:xfrm>
+              <a:off x="1190619" y="4769529"/>
+              <a:ext cx="1832809" cy="369332"/>
+            </a:xfrm>
+            <a:prstGeom prst="rect">
+              <a:avLst/>
+            </a:prstGeom>
+            <a:noFill/>
+          </p:spPr>
+          <p:txBody>
+            <a:bodyPr wrap="none" rtlCol="0">
+              <a:spAutoFit/>
+            </a:bodyPr>
+            <a:lstStyle/>
+            <a:p>
+              <a:r>
+                <a:rPr lang="en-US" dirty="0" smtClean="0"/>
+                <a:t>Physical Intercept</a:t>
+              </a:r>
+              <a:endParaRPr lang="en-US" dirty="0"/>
+            </a:p>
+          </p:txBody>
+        </p:sp>
+        <p:sp>
+          <p:nvSpPr>
+            <p:cNvPr id="15" name="TextBox 14"/>
+            <p:cNvSpPr txBox="1"/>
+            <p:nvPr/>
+          </p:nvSpPr>
+          <p:spPr>
+            <a:xfrm>
+              <a:off x="1527826" y="5107069"/>
+              <a:ext cx="1495602" cy="369332"/>
+            </a:xfrm>
+            <a:prstGeom prst="rect">
+              <a:avLst/>
+            </a:prstGeom>
+            <a:noFill/>
+          </p:spPr>
+          <p:txBody>
+            <a:bodyPr wrap="none" rtlCol="0">
+              <a:spAutoFit/>
+            </a:bodyPr>
+            <a:lstStyle/>
+            <a:p>
+              <a:r>
+                <a:rPr lang="en-US" dirty="0" smtClean="0"/>
+                <a:t>Physical Slope</a:t>
+              </a:r>
+              <a:endParaRPr lang="en-US" dirty="0"/>
+            </a:p>
+          </p:txBody>
+        </p:sp>
+        <p:sp>
+          <p:nvSpPr>
+            <p:cNvPr id="16" name="TextBox 15"/>
+            <p:cNvSpPr txBox="1"/>
+            <p:nvPr/>
+          </p:nvSpPr>
+          <p:spPr>
+            <a:xfrm>
+              <a:off x="1054684" y="5782148"/>
+              <a:ext cx="1968744" cy="369332"/>
+            </a:xfrm>
+            <a:prstGeom prst="rect">
+              <a:avLst/>
+            </a:prstGeom>
+            <a:noFill/>
+          </p:spPr>
+          <p:txBody>
+            <a:bodyPr wrap="none" rtlCol="0">
+              <a:spAutoFit/>
+            </a:bodyPr>
+            <a:lstStyle/>
+            <a:p>
+              <a:r>
+                <a:rPr lang="en-US" dirty="0" smtClean="0"/>
+                <a:t>Cognitive Intercept</a:t>
+              </a:r>
+              <a:endParaRPr lang="en-US" dirty="0"/>
+            </a:p>
+          </p:txBody>
+        </p:sp>
+        <p:sp>
+          <p:nvSpPr>
+            <p:cNvPr id="17" name="TextBox 16"/>
+            <p:cNvSpPr txBox="1"/>
+            <p:nvPr/>
+          </p:nvSpPr>
+          <p:spPr>
+            <a:xfrm>
+              <a:off x="1391891" y="5444609"/>
+              <a:ext cx="1631537" cy="369332"/>
+            </a:xfrm>
+            <a:prstGeom prst="rect">
+              <a:avLst/>
+            </a:prstGeom>
+            <a:noFill/>
+          </p:spPr>
+          <p:txBody>
+            <a:bodyPr wrap="none" rtlCol="0">
+              <a:spAutoFit/>
+            </a:bodyPr>
+            <a:lstStyle/>
+            <a:p>
+              <a:r>
+                <a:rPr lang="en-US" dirty="0" smtClean="0"/>
+                <a:t>Cognitive Slope</a:t>
+              </a:r>
+              <a:endParaRPr lang="en-US" dirty="0"/>
+            </a:p>
+          </p:txBody>
+        </p:sp>
+      </p:grpSp>
+    </p:spTree>
+    <p:extLst>
+      <p:ext uri="{BB962C8B-B14F-4D97-AF65-F5344CB8AC3E}">
+        <p14:creationId xmlns:p14="http://schemas.microsoft.com/office/powerpoint/2010/main" val="2179247795"/>
+      </p:ext>
+    </p:extLst>
+  </p:cSld>
+  <p:clrMapOvr>
+    <a:masterClrMapping/>
+  </p:clrMapOvr>
+</p:sld>
+</file>
+
+<file path=ppt/slides/slide3.xml><?xml version="1.0" encoding="utf-8"?>
+<p:sld xmlns:a="http://schemas.openxmlformats.org/drawingml/2006/main" xmlns:r="http://schemas.openxmlformats.org/officeDocument/2006/relationships" xmlns:p="http://schemas.openxmlformats.org/presentationml/2006/main">
+  <p:cSld>
+    <p:spTree>
+      <p:nvGrpSpPr>
+        <p:cNvPr id="1" name=""/>
+        <p:cNvGrpSpPr/>
+        <p:nvPr/>
+      </p:nvGrpSpPr>
+      <p:grpSpPr>
+        <a:xfrm>
+          <a:off x="0" y="0"/>
+          <a:ext cx="0" cy="0"/>
+          <a:chOff x="0" y="0"/>
+          <a:chExt cx="0" cy="0"/>
+        </a:xfrm>
+      </p:grpSpPr>
+      <p:graphicFrame>
+        <p:nvGraphicFramePr>
+          <p:cNvPr id="5" name="Object 4"/>
+          <p:cNvGraphicFramePr>
+            <a:graphicFrameLocks noChangeAspect="1"/>
+          </p:cNvGraphicFramePr>
+          <p:nvPr>
+            <p:extLst>
+              <p:ext uri="{D42A27DB-BD31-4B8C-83A1-F6EECF244321}">
+                <p14:modId xmlns:p14="http://schemas.microsoft.com/office/powerpoint/2010/main" val="1739161297"/>
+              </p:ext>
+            </p:extLst>
+          </p:nvPr>
+        </p:nvGraphicFramePr>
+        <p:xfrm>
+          <a:off x="7065670" y="2541338"/>
+          <a:ext cx="2503488" cy="1460500"/>
+        </p:xfrm>
+        <a:graphic>
+          <a:graphicData uri="http://schemas.openxmlformats.org/presentationml/2006/ole">
+            <mc:AlternateContent xmlns:mc="http://schemas.openxmlformats.org/markup-compatibility/2006">
+              <mc:Choice xmlns:v="urn:schemas-microsoft-com:vml" Requires="v">
+                <p:oleObj spid="_x0000_s2074" name="Equation" r:id="rId3" imgW="1650960" imgH="965160" progId="Equation.DSMT4">
+                  <p:embed/>
+                </p:oleObj>
+              </mc:Choice>
+              <mc:Fallback>
+                <p:oleObj name="Equation" r:id="rId3" imgW="1650960" imgH="965160" progId="Equation.DSMT4">
+                  <p:embed/>
+                  <p:pic>
+                    <p:nvPicPr>
+                      <p:cNvPr id="0" name=""/>
+                      <p:cNvPicPr/>
+                      <p:nvPr/>
+                    </p:nvPicPr>
+                    <p:blipFill>
+                      <a:blip r:embed="rId4"/>
+                      <a:stretch>
+                        <a:fillRect/>
+                      </a:stretch>
+                    </p:blipFill>
+                    <p:spPr>
+                      <a:xfrm>
+                        <a:off x="7065670" y="2541338"/>
+                        <a:ext cx="2503488" cy="1460500"/>
+                      </a:xfrm>
+                      <a:prstGeom prst="rect">
+                        <a:avLst/>
+                      </a:prstGeom>
+                    </p:spPr>
+                  </p:pic>
+                </p:oleObj>
+              </mc:Fallback>
+            </mc:AlternateContent>
+          </a:graphicData>
+        </a:graphic>
+      </p:graphicFrame>
+      <p:graphicFrame>
+        <p:nvGraphicFramePr>
+          <p:cNvPr id="22" name="Object 21"/>
+          <p:cNvGraphicFramePr>
+            <a:graphicFrameLocks noChangeAspect="1"/>
+          </p:cNvGraphicFramePr>
+          <p:nvPr>
+            <p:extLst>
+              <p:ext uri="{D42A27DB-BD31-4B8C-83A1-F6EECF244321}">
+                <p14:modId xmlns:p14="http://schemas.microsoft.com/office/powerpoint/2010/main" val="3398110707"/>
+              </p:ext>
+            </p:extLst>
+          </p:nvPr>
+        </p:nvGraphicFramePr>
+        <p:xfrm>
+          <a:off x="3211092" y="2602603"/>
+          <a:ext cx="3731293" cy="1399235"/>
+        </p:xfrm>
+        <a:graphic>
+          <a:graphicData uri="http://schemas.openxmlformats.org/presentationml/2006/ole">
+            <mc:AlternateContent xmlns:mc="http://schemas.openxmlformats.org/markup-compatibility/2006">
+              <mc:Choice xmlns:v="urn:schemas-microsoft-com:vml" Requires="v">
+                <p:oleObj spid="_x0000_s2075" name="Equation" r:id="rId5" imgW="2438280" imgH="914400" progId="Equation.DSMT4">
+                  <p:embed/>
+                </p:oleObj>
+              </mc:Choice>
+              <mc:Fallback>
+                <p:oleObj name="Equation" r:id="rId5" imgW="2438280" imgH="914400" progId="Equation.DSMT4">
+                  <p:embed/>
+                  <p:pic>
+                    <p:nvPicPr>
+                      <p:cNvPr id="0" name=""/>
+                      <p:cNvPicPr/>
+                      <p:nvPr/>
+                    </p:nvPicPr>
+                    <p:blipFill>
+                      <a:blip r:embed="rId6"/>
+                      <a:stretch>
+                        <a:fillRect/>
+                      </a:stretch>
+                    </p:blipFill>
+                    <p:spPr>
+                      <a:xfrm>
+                        <a:off x="3211092" y="2602603"/>
+                        <a:ext cx="3731293" cy="1399235"/>
+                      </a:xfrm>
+                      <a:prstGeom prst="rect">
+                        <a:avLst/>
+                      </a:prstGeom>
+                    </p:spPr>
+                  </p:pic>
+                </p:oleObj>
+              </mc:Fallback>
+            </mc:AlternateContent>
+          </a:graphicData>
+        </a:graphic>
+      </p:graphicFrame>
+      <p:sp>
+        <p:nvSpPr>
+          <p:cNvPr id="23" name="TextBox 22"/>
+          <p:cNvSpPr txBox="1"/>
+          <p:nvPr/>
+        </p:nvSpPr>
+        <p:spPr>
+          <a:xfrm>
+            <a:off x="1262808" y="2619887"/>
+            <a:ext cx="1832809" cy="369332"/>
+          </a:xfrm>
+          <a:prstGeom prst="rect">
+            <a:avLst/>
+          </a:prstGeom>
+          <a:noFill/>
+        </p:spPr>
+        <p:txBody>
+          <a:bodyPr wrap="none" rtlCol="0">
+            <a:spAutoFit/>
+          </a:bodyPr>
+          <a:lstStyle/>
+          <a:p>
+            <a:r>
+              <a:rPr lang="en-US" dirty="0" smtClean="0"/>
+              <a:t>Physical Intercept</a:t>
+            </a:r>
+            <a:endParaRPr lang="en-US" dirty="0"/>
+          </a:p>
+        </p:txBody>
+      </p:sp>
+      <p:sp>
+        <p:nvSpPr>
+          <p:cNvPr id="24" name="TextBox 23"/>
+          <p:cNvSpPr txBox="1"/>
+          <p:nvPr/>
+        </p:nvSpPr>
+        <p:spPr>
+          <a:xfrm>
+            <a:off x="1600015" y="2957427"/>
+            <a:ext cx="1495602" cy="369332"/>
+          </a:xfrm>
+          <a:prstGeom prst="rect">
+            <a:avLst/>
+          </a:prstGeom>
+          <a:noFill/>
+        </p:spPr>
+        <p:txBody>
+          <a:bodyPr wrap="none" rtlCol="0">
+            <a:spAutoFit/>
+          </a:bodyPr>
+          <a:lstStyle/>
+          <a:p>
+            <a:r>
+              <a:rPr lang="en-US" dirty="0" smtClean="0"/>
+              <a:t>Physical Slope</a:t>
+            </a:r>
+            <a:endParaRPr lang="en-US" dirty="0"/>
+          </a:p>
+        </p:txBody>
+      </p:sp>
+      <p:sp>
+        <p:nvSpPr>
+          <p:cNvPr id="25" name="TextBox 24"/>
+          <p:cNvSpPr txBox="1"/>
+          <p:nvPr/>
+        </p:nvSpPr>
+        <p:spPr>
+          <a:xfrm>
+            <a:off x="1126873" y="3632506"/>
+            <a:ext cx="1968744" cy="369332"/>
+          </a:xfrm>
+          <a:prstGeom prst="rect">
+            <a:avLst/>
+          </a:prstGeom>
+          <a:noFill/>
+        </p:spPr>
+        <p:txBody>
+          <a:bodyPr wrap="none" rtlCol="0">
+            <a:spAutoFit/>
+          </a:bodyPr>
+          <a:lstStyle/>
+          <a:p>
+            <a:r>
+              <a:rPr lang="en-US" dirty="0" smtClean="0"/>
+              <a:t>Cognitive Intercept</a:t>
+            </a:r>
+            <a:endParaRPr lang="en-US" dirty="0"/>
+          </a:p>
+        </p:txBody>
+      </p:sp>
+      <p:sp>
+        <p:nvSpPr>
+          <p:cNvPr id="26" name="TextBox 25"/>
+          <p:cNvSpPr txBox="1"/>
+          <p:nvPr/>
+        </p:nvSpPr>
+        <p:spPr>
+          <a:xfrm>
+            <a:off x="1464080" y="3294967"/>
+            <a:ext cx="1631537" cy="369332"/>
+          </a:xfrm>
+          <a:prstGeom prst="rect">
+            <a:avLst/>
+          </a:prstGeom>
+          <a:noFill/>
+        </p:spPr>
+        <p:txBody>
+          <a:bodyPr wrap="none" rtlCol="0">
+            <a:spAutoFit/>
+          </a:bodyPr>
+          <a:lstStyle/>
+          <a:p>
+            <a:r>
+              <a:rPr lang="en-US" dirty="0" smtClean="0"/>
+              <a:t>Cognitive Slope</a:t>
+            </a:r>
+            <a:endParaRPr lang="en-US" dirty="0"/>
+          </a:p>
+        </p:txBody>
+      </p:sp>
+    </p:spTree>
+    <p:extLst>
+      <p:ext uri="{BB962C8B-B14F-4D97-AF65-F5344CB8AC3E}">
+        <p14:creationId xmlns:p14="http://schemas.microsoft.com/office/powerpoint/2010/main" val="1662999876"/>
+      </p:ext>
+    </p:extLst>
+  </p:cSld>
+  <p:clrMapOvr>
+    <a:masterClrMapping/>
+  </p:clrMapOvr>
+</p:sld>
+</file>
+
 <file path=ppt/theme/theme1.xml><?xml version="1.0" encoding="utf-8"?>
 <a:theme xmlns:a="http://schemas.openxmlformats.org/drawingml/2006/main" name="Office Theme">
   <a:themeElements>

</xml_diff>

<commit_message>
table 2 readme support
</commit_message>
<xml_diff>
--- a/libs/materials/naming_convention.pptx
+++ b/libs/materials/naming_convention.pptx
@@ -10,6 +10,9 @@
     <p:sldId id="257" r:id="rId4"/>
     <p:sldId id="258" r:id="rId5"/>
     <p:sldId id="259" r:id="rId6"/>
+    <p:sldId id="262" r:id="rId7"/>
+    <p:sldId id="263" r:id="rId8"/>
+    <p:sldId id="261" r:id="rId9"/>
   </p:sldIdLst>
   <p:sldSz cx="12192000" cy="6858000"/>
   <p:notesSz cx="6858000" cy="9144000"/>
@@ -247,7 +250,7 @@
           <a:p>
             <a:fld id="{FFC3AEC4-2EDB-40EB-AFB2-2248CB6E3774}" type="datetimeFigureOut">
               <a:rPr lang="en-US" smtClean="0"/>
-              <a:t>5/19/2015</a:t>
+              <a:t>6/22/2015</a:t>
             </a:fld>
             <a:endParaRPr lang="en-US"/>
           </a:p>
@@ -417,7 +420,7 @@
           <a:p>
             <a:fld id="{FFC3AEC4-2EDB-40EB-AFB2-2248CB6E3774}" type="datetimeFigureOut">
               <a:rPr lang="en-US" smtClean="0"/>
-              <a:t>5/19/2015</a:t>
+              <a:t>6/22/2015</a:t>
             </a:fld>
             <a:endParaRPr lang="en-US"/>
           </a:p>
@@ -597,7 +600,7 @@
           <a:p>
             <a:fld id="{FFC3AEC4-2EDB-40EB-AFB2-2248CB6E3774}" type="datetimeFigureOut">
               <a:rPr lang="en-US" smtClean="0"/>
-              <a:t>5/19/2015</a:t>
+              <a:t>6/22/2015</a:t>
             </a:fld>
             <a:endParaRPr lang="en-US"/>
           </a:p>
@@ -767,7 +770,7 @@
           <a:p>
             <a:fld id="{FFC3AEC4-2EDB-40EB-AFB2-2248CB6E3774}" type="datetimeFigureOut">
               <a:rPr lang="en-US" smtClean="0"/>
-              <a:t>5/19/2015</a:t>
+              <a:t>6/22/2015</a:t>
             </a:fld>
             <a:endParaRPr lang="en-US"/>
           </a:p>
@@ -1013,7 +1016,7 @@
           <a:p>
             <a:fld id="{FFC3AEC4-2EDB-40EB-AFB2-2248CB6E3774}" type="datetimeFigureOut">
               <a:rPr lang="en-US" smtClean="0"/>
-              <a:t>5/19/2015</a:t>
+              <a:t>6/22/2015</a:t>
             </a:fld>
             <a:endParaRPr lang="en-US"/>
           </a:p>
@@ -1245,7 +1248,7 @@
           <a:p>
             <a:fld id="{FFC3AEC4-2EDB-40EB-AFB2-2248CB6E3774}" type="datetimeFigureOut">
               <a:rPr lang="en-US" smtClean="0"/>
-              <a:t>5/19/2015</a:t>
+              <a:t>6/22/2015</a:t>
             </a:fld>
             <a:endParaRPr lang="en-US"/>
           </a:p>
@@ -1612,7 +1615,7 @@
           <a:p>
             <a:fld id="{FFC3AEC4-2EDB-40EB-AFB2-2248CB6E3774}" type="datetimeFigureOut">
               <a:rPr lang="en-US" smtClean="0"/>
-              <a:t>5/19/2015</a:t>
+              <a:t>6/22/2015</a:t>
             </a:fld>
             <a:endParaRPr lang="en-US"/>
           </a:p>
@@ -1730,7 +1733,7 @@
           <a:p>
             <a:fld id="{FFC3AEC4-2EDB-40EB-AFB2-2248CB6E3774}" type="datetimeFigureOut">
               <a:rPr lang="en-US" smtClean="0"/>
-              <a:t>5/19/2015</a:t>
+              <a:t>6/22/2015</a:t>
             </a:fld>
             <a:endParaRPr lang="en-US"/>
           </a:p>
@@ -1825,7 +1828,7 @@
           <a:p>
             <a:fld id="{FFC3AEC4-2EDB-40EB-AFB2-2248CB6E3774}" type="datetimeFigureOut">
               <a:rPr lang="en-US" smtClean="0"/>
-              <a:t>5/19/2015</a:t>
+              <a:t>6/22/2015</a:t>
             </a:fld>
             <a:endParaRPr lang="en-US"/>
           </a:p>
@@ -2102,7 +2105,7 @@
           <a:p>
             <a:fld id="{FFC3AEC4-2EDB-40EB-AFB2-2248CB6E3774}" type="datetimeFigureOut">
               <a:rPr lang="en-US" smtClean="0"/>
-              <a:t>5/19/2015</a:t>
+              <a:t>6/22/2015</a:t>
             </a:fld>
             <a:endParaRPr lang="en-US"/>
           </a:p>
@@ -2355,7 +2358,7 @@
           <a:p>
             <a:fld id="{FFC3AEC4-2EDB-40EB-AFB2-2248CB6E3774}" type="datetimeFigureOut">
               <a:rPr lang="en-US" smtClean="0"/>
-              <a:t>5/19/2015</a:t>
+              <a:t>6/22/2015</a:t>
             </a:fld>
             <a:endParaRPr lang="en-US"/>
           </a:p>
@@ -2568,7 +2571,7 @@
           <a:p>
             <a:fld id="{FFC3AEC4-2EDB-40EB-AFB2-2248CB6E3774}" type="datetimeFigureOut">
               <a:rPr lang="en-US" smtClean="0"/>
-              <a:t>5/19/2015</a:t>
+              <a:t>6/22/2015</a:t>
             </a:fld>
             <a:endParaRPr lang="en-US"/>
           </a:p>
@@ -3130,13 +3133,6 @@
               </a:rPr>
               <a:t>global</a:t>
             </a:r>
-            <a:endParaRPr lang="en-US" dirty="0" smtClean="0">
-              <a:solidFill>
-                <a:schemeClr val="accent1">
-                  <a:lumMod val="50000"/>
-                </a:schemeClr>
-              </a:solidFill>
-            </a:endParaRPr>
           </a:p>
           <a:p>
             <a:r>
@@ -3149,13 +3145,6 @@
               </a:rPr>
               <a:t>knowledge</a:t>
             </a:r>
-            <a:endParaRPr lang="en-US" dirty="0" smtClean="0">
-              <a:solidFill>
-                <a:schemeClr val="accent1">
-                  <a:lumMod val="50000"/>
-                </a:schemeClr>
-              </a:solidFill>
-            </a:endParaRPr>
           </a:p>
           <a:p>
             <a:r>
@@ -3168,13 +3157,6 @@
               </a:rPr>
               <a:t>reasoning</a:t>
             </a:r>
-            <a:endParaRPr lang="en-US" dirty="0" smtClean="0">
-              <a:solidFill>
-                <a:schemeClr val="accent1">
-                  <a:lumMod val="50000"/>
-                </a:schemeClr>
-              </a:solidFill>
-            </a:endParaRPr>
           </a:p>
           <a:p>
             <a:r>
@@ -3187,13 +3169,6 @@
               </a:rPr>
               <a:t>executive</a:t>
             </a:r>
-            <a:endParaRPr lang="en-US" dirty="0" smtClean="0">
-              <a:solidFill>
-                <a:schemeClr val="accent1">
-                  <a:lumMod val="50000"/>
-                </a:schemeClr>
-              </a:solidFill>
-            </a:endParaRPr>
           </a:p>
           <a:p>
             <a:r>
@@ -3206,13 +3181,6 @@
               </a:rPr>
               <a:t>speed</a:t>
             </a:r>
-            <a:endParaRPr lang="en-US" dirty="0" smtClean="0">
-              <a:solidFill>
-                <a:schemeClr val="accent1">
-                  <a:lumMod val="50000"/>
-                </a:schemeClr>
-              </a:solidFill>
-            </a:endParaRPr>
           </a:p>
           <a:p>
             <a:r>
@@ -3225,13 +3193,6 @@
               </a:rPr>
               <a:t>memory</a:t>
             </a:r>
-            <a:endParaRPr lang="en-US" dirty="0" smtClean="0">
-              <a:solidFill>
-                <a:schemeClr val="accent1">
-                  <a:lumMod val="50000"/>
-                </a:schemeClr>
-              </a:solidFill>
-            </a:endParaRPr>
           </a:p>
           <a:p>
             <a:r>
@@ -3266,13 +3227,6 @@
               </a:rPr>
               <a:t>walking</a:t>
             </a:r>
-            <a:endParaRPr lang="en-US" dirty="0" smtClean="0">
-              <a:solidFill>
-                <a:schemeClr val="accent1">
-                  <a:lumMod val="50000"/>
-                </a:schemeClr>
-              </a:solidFill>
-            </a:endParaRPr>
           </a:p>
         </p:txBody>
       </p:sp>
@@ -3302,21 +3256,18 @@
               <a:rPr lang="en-US" sz="1600" dirty="0" smtClean="0"/>
               <a:t>empty</a:t>
             </a:r>
-            <a:endParaRPr lang="en-US" sz="1600" dirty="0" smtClean="0"/>
           </a:p>
           <a:p>
             <a:r>
               <a:rPr lang="en-US" sz="1600" dirty="0" smtClean="0"/>
               <a:t>a</a:t>
             </a:r>
-            <a:endParaRPr lang="en-US" sz="1600" dirty="0" smtClean="0"/>
           </a:p>
           <a:p>
             <a:r>
               <a:rPr lang="en-US" sz="1600" dirty="0" smtClean="0"/>
               <a:t>ae</a:t>
             </a:r>
-            <a:endParaRPr lang="en-US" sz="1600" dirty="0" smtClean="0"/>
           </a:p>
           <a:p>
             <a:r>
@@ -3851,13 +3802,6 @@
               </a:rPr>
               <a:t>pulmonary</a:t>
             </a:r>
-            <a:endParaRPr lang="en-US" dirty="0" smtClean="0">
-              <a:solidFill>
-                <a:schemeClr val="accent2">
-                  <a:lumMod val="50000"/>
-                </a:schemeClr>
-              </a:solidFill>
-            </a:endParaRPr>
           </a:p>
           <a:p>
             <a:r>
@@ -3870,13 +3814,6 @@
               </a:rPr>
               <a:t>walking</a:t>
             </a:r>
-            <a:endParaRPr lang="en-US" dirty="0" smtClean="0">
-              <a:solidFill>
-                <a:schemeClr val="accent2">
-                  <a:lumMod val="50000"/>
-                </a:schemeClr>
-              </a:solidFill>
-            </a:endParaRPr>
           </a:p>
           <a:p>
             <a:r>
@@ -3889,13 +3826,6 @@
               </a:rPr>
               <a:t>muscle</a:t>
             </a:r>
-            <a:endParaRPr lang="en-US" dirty="0" smtClean="0">
-              <a:solidFill>
-                <a:schemeClr val="accent2">
-                  <a:lumMod val="50000"/>
-                </a:schemeClr>
-              </a:solidFill>
-            </a:endParaRPr>
           </a:p>
           <a:p>
             <a:r>
@@ -3908,13 +3838,6 @@
               </a:rPr>
               <a:t>chair</a:t>
             </a:r>
-            <a:endParaRPr lang="en-US" dirty="0" smtClean="0">
-              <a:solidFill>
-                <a:schemeClr val="accent2">
-                  <a:lumMod val="50000"/>
-                </a:schemeClr>
-              </a:solidFill>
-            </a:endParaRPr>
           </a:p>
           <a:p>
             <a:r>
@@ -3927,13 +3850,6 @@
               </a:rPr>
               <a:t>flamingo</a:t>
             </a:r>
-            <a:endParaRPr lang="en-US" dirty="0" smtClean="0">
-              <a:solidFill>
-                <a:schemeClr val="accent2">
-                  <a:lumMod val="50000"/>
-                </a:schemeClr>
-              </a:solidFill>
-            </a:endParaRPr>
           </a:p>
           <a:p>
             <a:r>
@@ -3946,13 +3862,6 @@
               </a:rPr>
               <a:t>tug</a:t>
             </a:r>
-            <a:endParaRPr lang="en-US" dirty="0" smtClean="0">
-              <a:solidFill>
-                <a:schemeClr val="accent2">
-                  <a:lumMod val="50000"/>
-                </a:schemeClr>
-              </a:solidFill>
-            </a:endParaRPr>
           </a:p>
           <a:p>
             <a:r>
@@ -4585,7 +4494,7 @@
             <a:graphicData uri="http://schemas.openxmlformats.org/presentationml/2006/ole">
               <mc:AlternateContent xmlns:mc="http://schemas.openxmlformats.org/markup-compatibility/2006">
                 <mc:Choice xmlns:v="urn:schemas-microsoft-com:vml" Requires="v">
-                  <p:oleObj spid="_x0000_s1101" name="Equation" r:id="rId3" imgW="1904760" imgH="228600" progId="Equation.DSMT4">
+                  <p:oleObj spid="_x0000_s1157" name="Equation" r:id="rId3" imgW="1904760" imgH="228600" progId="Equation.DSMT4">
                     <p:embed/>
                   </p:oleObj>
                 </mc:Choice>
@@ -4642,7 +4551,7 @@
             <a:graphicData uri="http://schemas.openxmlformats.org/presentationml/2006/ole">
               <mc:AlternateContent xmlns:mc="http://schemas.openxmlformats.org/markup-compatibility/2006">
                 <mc:Choice xmlns:v="urn:schemas-microsoft-com:vml" Requires="v">
-                  <p:oleObj spid="_x0000_s1102" name="Equation" r:id="rId5" imgW="3187440" imgH="241200" progId="Equation.DSMT4">
+                  <p:oleObj spid="_x0000_s1158" name="Equation" r:id="rId5" imgW="3187440" imgH="241200" progId="Equation.DSMT4">
                     <p:embed/>
                   </p:oleObj>
                 </mc:Choice>
@@ -4699,7 +4608,7 @@
             <a:graphicData uri="http://schemas.openxmlformats.org/presentationml/2006/ole">
               <mc:AlternateContent xmlns:mc="http://schemas.openxmlformats.org/markup-compatibility/2006">
                 <mc:Choice xmlns:v="urn:schemas-microsoft-com:vml" Requires="v">
-                  <p:oleObj spid="_x0000_s1103" name="Equation" r:id="rId7" imgW="3124080" imgH="241200" progId="Equation.DSMT4">
+                  <p:oleObj spid="_x0000_s1159" name="Equation" r:id="rId7" imgW="3124080" imgH="241200" progId="Equation.DSMT4">
                     <p:embed/>
                   </p:oleObj>
                 </mc:Choice>
@@ -4756,7 +4665,7 @@
             <a:graphicData uri="http://schemas.openxmlformats.org/presentationml/2006/ole">
               <mc:AlternateContent xmlns:mc="http://schemas.openxmlformats.org/markup-compatibility/2006">
                 <mc:Choice xmlns:v="urn:schemas-microsoft-com:vml" Requires="v">
-                  <p:oleObj spid="_x0000_s1104" name="Equation" r:id="rId9" imgW="3136680" imgH="241200" progId="Equation.DSMT4">
+                  <p:oleObj spid="_x0000_s1160" name="Equation" r:id="rId9" imgW="3136680" imgH="241200" progId="Equation.DSMT4">
                     <p:embed/>
                   </p:oleObj>
                 </mc:Choice>
@@ -4813,7 +4722,7 @@
             <a:graphicData uri="http://schemas.openxmlformats.org/presentationml/2006/ole">
               <mc:AlternateContent xmlns:mc="http://schemas.openxmlformats.org/markup-compatibility/2006">
                 <mc:Choice xmlns:v="urn:schemas-microsoft-com:vml" Requires="v">
-                  <p:oleObj spid="_x0000_s1105" name="Equation" r:id="rId11" imgW="3073320" imgH="241200" progId="Equation.DSMT4">
+                  <p:oleObj spid="_x0000_s1161" name="Equation" r:id="rId11" imgW="3073320" imgH="241200" progId="Equation.DSMT4">
                     <p:embed/>
                   </p:oleObj>
                 </mc:Choice>
@@ -4885,7 +4794,7 @@
             <a:graphicData uri="http://schemas.openxmlformats.org/presentationml/2006/ole">
               <mc:AlternateContent xmlns:mc="http://schemas.openxmlformats.org/markup-compatibility/2006">
                 <mc:Choice xmlns:v="urn:schemas-microsoft-com:vml" Requires="v">
-                  <p:oleObj spid="_x0000_s1106" name="Equation" r:id="rId13" imgW="1650960" imgH="965160" progId="Equation.DSMT4">
+                  <p:oleObj spid="_x0000_s1162" name="Equation" r:id="rId13" imgW="1650960" imgH="965160" progId="Equation.DSMT4">
                     <p:embed/>
                   </p:oleObj>
                 </mc:Choice>
@@ -4942,7 +4851,7 @@
             <a:graphicData uri="http://schemas.openxmlformats.org/presentationml/2006/ole">
               <mc:AlternateContent xmlns:mc="http://schemas.openxmlformats.org/markup-compatibility/2006">
                 <mc:Choice xmlns:v="urn:schemas-microsoft-com:vml" Requires="v">
-                  <p:oleObj spid="_x0000_s1107" name="Equation" r:id="rId15" imgW="2438280" imgH="914400" progId="Equation.DSMT4">
+                  <p:oleObj spid="_x0000_s1163" name="Equation" r:id="rId15" imgW="2438280" imgH="914400" progId="Equation.DSMT4">
                     <p:embed/>
                   </p:oleObj>
                 </mc:Choice>
@@ -5150,7 +5059,7 @@
           <a:graphicData uri="http://schemas.openxmlformats.org/presentationml/2006/ole">
             <mc:AlternateContent xmlns:mc="http://schemas.openxmlformats.org/markup-compatibility/2006">
               <mc:Choice xmlns:v="urn:schemas-microsoft-com:vml" Requires="v">
-                <p:oleObj spid="_x0000_s2084" name="Equation" r:id="rId3" imgW="1650960" imgH="965160" progId="Equation.DSMT4">
+                <p:oleObj spid="_x0000_s2100" name="Equation" r:id="rId3" imgW="1650960" imgH="965160" progId="Equation.DSMT4">
                   <p:embed/>
                 </p:oleObj>
               </mc:Choice>
@@ -5194,7 +5103,7 @@
           <p:nvPr>
             <p:extLst>
               <p:ext uri="{D42A27DB-BD31-4B8C-83A1-F6EECF244321}">
-                <p14:modId xmlns:p14="http://schemas.microsoft.com/office/powerpoint/2010/main" val="3398110707"/>
+                <p14:modId xmlns:p14="http://schemas.microsoft.com/office/powerpoint/2010/main" val="3361155519"/>
               </p:ext>
             </p:extLst>
           </p:nvPr>
@@ -5207,7 +5116,7 @@
           <a:graphicData uri="http://schemas.openxmlformats.org/presentationml/2006/ole">
             <mc:AlternateContent xmlns:mc="http://schemas.openxmlformats.org/markup-compatibility/2006">
               <mc:Choice xmlns:v="urn:schemas-microsoft-com:vml" Requires="v">
-                <p:oleObj spid="_x0000_s2085" name="Equation" r:id="rId5" imgW="2438280" imgH="914400" progId="Equation.DSMT4">
+                <p:oleObj spid="_x0000_s2101" name="Equation" r:id="rId5" imgW="2438280" imgH="914400" progId="Equation.DSMT4">
                   <p:embed/>
                 </p:oleObj>
               </mc:Choice>
@@ -5362,6 +5271,120 @@
           </a:p>
         </p:txBody>
       </p:sp>
+      <p:sp>
+        <p:nvSpPr>
+          <p:cNvPr id="8" name="Rectangle 7"/>
+          <p:cNvSpPr/>
+          <p:nvPr/>
+        </p:nvSpPr>
+        <p:spPr>
+          <a:xfrm>
+            <a:off x="4278738" y="2140248"/>
+            <a:ext cx="1628330" cy="369332"/>
+          </a:xfrm>
+          <a:prstGeom prst="rect">
+            <a:avLst/>
+          </a:prstGeom>
+          <a:noFill/>
+        </p:spPr>
+        <p:txBody>
+          <a:bodyPr wrap="none" lIns="91440" tIns="45720" rIns="91440" bIns="45720">
+            <a:spAutoFit/>
+          </a:bodyPr>
+          <a:lstStyle/>
+          <a:p>
+            <a:pPr algn="ctr"/>
+            <a:r>
+              <a:rPr lang="en-US" b="0" cap="none" spc="0" dirty="0" smtClean="0">
+                <a:ln w="0"/>
+                <a:solidFill>
+                  <a:schemeClr val="accent1"/>
+                </a:solidFill>
+                <a:effectLst>
+                  <a:outerShdw blurRad="38100" dist="19050" dir="2700000" algn="tl" rotWithShape="0">
+                    <a:schemeClr val="dk1">
+                      <a:alpha val="40000"/>
+                    </a:schemeClr>
+                  </a:outerShdw>
+                </a:effectLst>
+                <a:latin typeface="Gill Sans MT" panose="020B0502020104020203" pitchFamily="34" charset="0"/>
+              </a:rPr>
+              <a:t>Random Effects</a:t>
+            </a:r>
+            <a:endParaRPr lang="en-US" b="0" cap="none" spc="0" dirty="0">
+              <a:ln w="0"/>
+              <a:solidFill>
+                <a:schemeClr val="accent1"/>
+              </a:solidFill>
+              <a:effectLst>
+                <a:outerShdw blurRad="38100" dist="19050" dir="2700000" algn="tl" rotWithShape="0">
+                  <a:schemeClr val="dk1">
+                    <a:alpha val="40000"/>
+                  </a:schemeClr>
+                </a:outerShdw>
+              </a:effectLst>
+              <a:latin typeface="Gill Sans MT" panose="020B0502020104020203" pitchFamily="34" charset="0"/>
+            </a:endParaRPr>
+          </a:p>
+        </p:txBody>
+      </p:sp>
+      <p:sp>
+        <p:nvSpPr>
+          <p:cNvPr id="9" name="Rectangle 8"/>
+          <p:cNvSpPr/>
+          <p:nvPr/>
+        </p:nvSpPr>
+        <p:spPr>
+          <a:xfrm>
+            <a:off x="7540705" y="2140248"/>
+            <a:ext cx="1350562" cy="369332"/>
+          </a:xfrm>
+          <a:prstGeom prst="rect">
+            <a:avLst/>
+          </a:prstGeom>
+          <a:noFill/>
+        </p:spPr>
+        <p:txBody>
+          <a:bodyPr wrap="none" lIns="91440" tIns="45720" rIns="91440" bIns="45720">
+            <a:spAutoFit/>
+          </a:bodyPr>
+          <a:lstStyle/>
+          <a:p>
+            <a:pPr algn="ctr"/>
+            <a:r>
+              <a:rPr lang="en-US" b="0" cap="none" spc="0" dirty="0" smtClean="0">
+                <a:ln w="0"/>
+                <a:solidFill>
+                  <a:schemeClr val="accent1"/>
+                </a:solidFill>
+                <a:effectLst>
+                  <a:outerShdw blurRad="38100" dist="19050" dir="2700000" algn="tl" rotWithShape="0">
+                    <a:schemeClr val="dk1">
+                      <a:alpha val="40000"/>
+                    </a:schemeClr>
+                  </a:outerShdw>
+                </a:effectLst>
+                <a:latin typeface="Gill Sans MT" panose="020B0502020104020203" pitchFamily="34" charset="0"/>
+              </a:rPr>
+              <a:t>Fixed Effects</a:t>
+            </a:r>
+            <a:endParaRPr lang="en-US" b="0" cap="none" spc="0" dirty="0">
+              <a:ln w="0"/>
+              <a:solidFill>
+                <a:schemeClr val="accent1"/>
+              </a:solidFill>
+              <a:effectLst>
+                <a:outerShdw blurRad="38100" dist="19050" dir="2700000" algn="tl" rotWithShape="0">
+                  <a:schemeClr val="dk1">
+                    <a:alpha val="40000"/>
+                  </a:schemeClr>
+                </a:outerShdw>
+              </a:effectLst>
+              <a:latin typeface="Gill Sans MT" panose="020B0502020104020203" pitchFamily="34" charset="0"/>
+            </a:endParaRPr>
+          </a:p>
+        </p:txBody>
+      </p:sp>
     </p:spTree>
     <p:extLst>
       <p:ext uri="{BB962C8B-B14F-4D97-AF65-F5344CB8AC3E}">
@@ -5392,30 +5415,998 @@
           <a:chExt cx="0" cy="0"/>
         </a:xfrm>
       </p:grpSpPr>
+      <p:grpSp>
+        <p:nvGrpSpPr>
+          <p:cNvPr id="2" name="Group 1"/>
+          <p:cNvGrpSpPr/>
+          <p:nvPr/>
+        </p:nvGrpSpPr>
+        <p:grpSpPr>
+          <a:xfrm>
+            <a:off x="1126873" y="2541338"/>
+            <a:ext cx="8442285" cy="1460750"/>
+            <a:chOff x="1126873" y="2541338"/>
+            <a:chExt cx="8442285" cy="1460750"/>
+          </a:xfrm>
+        </p:grpSpPr>
+        <p:graphicFrame>
+          <p:nvGraphicFramePr>
+            <p:cNvPr id="5" name="Object 4"/>
+            <p:cNvGraphicFramePr>
+              <a:graphicFrameLocks noChangeAspect="1"/>
+            </p:cNvGraphicFramePr>
+            <p:nvPr>
+              <p:extLst>
+                <p:ext uri="{D42A27DB-BD31-4B8C-83A1-F6EECF244321}">
+                  <p14:modId xmlns:p14="http://schemas.microsoft.com/office/powerpoint/2010/main" val="3913760974"/>
+                </p:ext>
+              </p:extLst>
+            </p:nvPr>
+          </p:nvGraphicFramePr>
+          <p:xfrm>
+            <a:off x="7065670" y="2541338"/>
+            <a:ext cx="2503488" cy="1460500"/>
+          </p:xfrm>
+          <a:graphic>
+            <a:graphicData uri="http://schemas.openxmlformats.org/presentationml/2006/ole">
+              <mc:AlternateContent xmlns:mc="http://schemas.openxmlformats.org/markup-compatibility/2006">
+                <mc:Choice xmlns:v="urn:schemas-microsoft-com:vml" Requires="v">
+                  <p:oleObj spid="_x0000_s3098" name="Equation" r:id="rId3" imgW="1650960" imgH="965160" progId="Equation.DSMT4">
+                    <p:embed/>
+                  </p:oleObj>
+                </mc:Choice>
+                <mc:Fallback>
+                  <p:oleObj name="Equation" r:id="rId3" imgW="1650960" imgH="965160" progId="Equation.DSMT4">
+                    <p:embed/>
+                    <p:pic>
+                      <p:nvPicPr>
+                        <p:cNvPr id="0" name=""/>
+                        <p:cNvPicPr/>
+                        <p:nvPr/>
+                      </p:nvPicPr>
+                      <p:blipFill>
+                        <a:blip r:embed="rId4"/>
+                        <a:stretch>
+                          <a:fillRect/>
+                        </a:stretch>
+                      </p:blipFill>
+                      <p:spPr>
+                        <a:xfrm>
+                          <a:off x="7065670" y="2541338"/>
+                          <a:ext cx="2503488" cy="1460500"/>
+                        </a:xfrm>
+                        <a:prstGeom prst="rect">
+                          <a:avLst/>
+                        </a:prstGeom>
+                      </p:spPr>
+                    </p:pic>
+                  </p:oleObj>
+                </mc:Fallback>
+              </mc:AlternateContent>
+            </a:graphicData>
+          </a:graphic>
+        </p:graphicFrame>
+        <p:graphicFrame>
+          <p:nvGraphicFramePr>
+            <p:cNvPr id="22" name="Object 21"/>
+            <p:cNvGraphicFramePr>
+              <a:graphicFrameLocks noChangeAspect="1"/>
+            </p:cNvGraphicFramePr>
+            <p:nvPr>
+              <p:extLst>
+                <p:ext uri="{D42A27DB-BD31-4B8C-83A1-F6EECF244321}">
+                  <p14:modId xmlns:p14="http://schemas.microsoft.com/office/powerpoint/2010/main" val="4051897349"/>
+                </p:ext>
+              </p:extLst>
+            </p:nvPr>
+          </p:nvGraphicFramePr>
+          <p:xfrm>
+            <a:off x="3803650" y="2601913"/>
+            <a:ext cx="2546350" cy="1400175"/>
+          </p:xfrm>
+          <a:graphic>
+            <a:graphicData uri="http://schemas.openxmlformats.org/presentationml/2006/ole">
+              <mc:AlternateContent xmlns:mc="http://schemas.openxmlformats.org/markup-compatibility/2006">
+                <mc:Choice xmlns:v="urn:schemas-microsoft-com:vml" Requires="v">
+                  <p:oleObj spid="_x0000_s3099" name="Equation" r:id="rId5" imgW="1663560" imgH="914400" progId="Equation.DSMT4">
+                    <p:embed/>
+                  </p:oleObj>
+                </mc:Choice>
+                <mc:Fallback>
+                  <p:oleObj name="Equation" r:id="rId5" imgW="1663560" imgH="914400" progId="Equation.DSMT4">
+                    <p:embed/>
+                    <p:pic>
+                      <p:nvPicPr>
+                        <p:cNvPr id="0" name=""/>
+                        <p:cNvPicPr/>
+                        <p:nvPr/>
+                      </p:nvPicPr>
+                      <p:blipFill>
+                        <a:blip r:embed="rId6"/>
+                        <a:stretch>
+                          <a:fillRect/>
+                        </a:stretch>
+                      </p:blipFill>
+                      <p:spPr>
+                        <a:xfrm>
+                          <a:off x="3803650" y="2601913"/>
+                          <a:ext cx="2546350" cy="1400175"/>
+                        </a:xfrm>
+                        <a:prstGeom prst="rect">
+                          <a:avLst/>
+                        </a:prstGeom>
+                      </p:spPr>
+                    </p:pic>
+                  </p:oleObj>
+                </mc:Fallback>
+              </mc:AlternateContent>
+            </a:graphicData>
+          </a:graphic>
+        </p:graphicFrame>
+        <p:sp>
+          <p:nvSpPr>
+            <p:cNvPr id="23" name="TextBox 22"/>
+            <p:cNvSpPr txBox="1"/>
+            <p:nvPr/>
+          </p:nvSpPr>
+          <p:spPr>
+            <a:xfrm>
+              <a:off x="1262808" y="2619887"/>
+              <a:ext cx="1832809" cy="369332"/>
+            </a:xfrm>
+            <a:prstGeom prst="rect">
+              <a:avLst/>
+            </a:prstGeom>
+            <a:noFill/>
+          </p:spPr>
+          <p:txBody>
+            <a:bodyPr wrap="none" rtlCol="0">
+              <a:spAutoFit/>
+            </a:bodyPr>
+            <a:lstStyle/>
+            <a:p>
+              <a:r>
+                <a:rPr lang="en-US" dirty="0" smtClean="0"/>
+                <a:t>Physical Intercept</a:t>
+              </a:r>
+              <a:endParaRPr lang="en-US" dirty="0"/>
+            </a:p>
+          </p:txBody>
+        </p:sp>
+        <p:sp>
+          <p:nvSpPr>
+            <p:cNvPr id="24" name="TextBox 23"/>
+            <p:cNvSpPr txBox="1"/>
+            <p:nvPr/>
+          </p:nvSpPr>
+          <p:spPr>
+            <a:xfrm>
+              <a:off x="1600015" y="2957427"/>
+              <a:ext cx="1495602" cy="369332"/>
+            </a:xfrm>
+            <a:prstGeom prst="rect">
+              <a:avLst/>
+            </a:prstGeom>
+            <a:noFill/>
+          </p:spPr>
+          <p:txBody>
+            <a:bodyPr wrap="none" rtlCol="0">
+              <a:spAutoFit/>
+            </a:bodyPr>
+            <a:lstStyle/>
+            <a:p>
+              <a:r>
+                <a:rPr lang="en-US" dirty="0" smtClean="0"/>
+                <a:t>Physical Slope</a:t>
+              </a:r>
+              <a:endParaRPr lang="en-US" dirty="0"/>
+            </a:p>
+          </p:txBody>
+        </p:sp>
+        <p:sp>
+          <p:nvSpPr>
+            <p:cNvPr id="25" name="TextBox 24"/>
+            <p:cNvSpPr txBox="1"/>
+            <p:nvPr/>
+          </p:nvSpPr>
+          <p:spPr>
+            <a:xfrm>
+              <a:off x="1126873" y="3632506"/>
+              <a:ext cx="1968744" cy="369332"/>
+            </a:xfrm>
+            <a:prstGeom prst="rect">
+              <a:avLst/>
+            </a:prstGeom>
+            <a:noFill/>
+          </p:spPr>
+          <p:txBody>
+            <a:bodyPr wrap="none" rtlCol="0">
+              <a:spAutoFit/>
+            </a:bodyPr>
+            <a:lstStyle/>
+            <a:p>
+              <a:r>
+                <a:rPr lang="en-US" dirty="0" smtClean="0"/>
+                <a:t>Cognitive Intercept</a:t>
+              </a:r>
+              <a:endParaRPr lang="en-US" dirty="0"/>
+            </a:p>
+          </p:txBody>
+        </p:sp>
+        <p:sp>
+          <p:nvSpPr>
+            <p:cNvPr id="26" name="TextBox 25"/>
+            <p:cNvSpPr txBox="1"/>
+            <p:nvPr/>
+          </p:nvSpPr>
+          <p:spPr>
+            <a:xfrm>
+              <a:off x="1464080" y="3294967"/>
+              <a:ext cx="1631537" cy="369332"/>
+            </a:xfrm>
+            <a:prstGeom prst="rect">
+              <a:avLst/>
+            </a:prstGeom>
+            <a:noFill/>
+          </p:spPr>
+          <p:txBody>
+            <a:bodyPr wrap="none" rtlCol="0">
+              <a:spAutoFit/>
+            </a:bodyPr>
+            <a:lstStyle/>
+            <a:p>
+              <a:r>
+                <a:rPr lang="en-US" dirty="0" smtClean="0"/>
+                <a:t>Cognitive Slope</a:t>
+              </a:r>
+              <a:endParaRPr lang="en-US" dirty="0"/>
+            </a:p>
+          </p:txBody>
+        </p:sp>
+      </p:grpSp>
+      <p:sp>
+        <p:nvSpPr>
+          <p:cNvPr id="3" name="Rectangle 2"/>
+          <p:cNvSpPr/>
+          <p:nvPr/>
+        </p:nvSpPr>
+        <p:spPr>
+          <a:xfrm>
+            <a:off x="4278738" y="2140248"/>
+            <a:ext cx="1628330" cy="369332"/>
+          </a:xfrm>
+          <a:prstGeom prst="rect">
+            <a:avLst/>
+          </a:prstGeom>
+          <a:noFill/>
+        </p:spPr>
+        <p:txBody>
+          <a:bodyPr wrap="none" lIns="91440" tIns="45720" rIns="91440" bIns="45720">
+            <a:spAutoFit/>
+          </a:bodyPr>
+          <a:lstStyle/>
+          <a:p>
+            <a:pPr algn="ctr"/>
+            <a:r>
+              <a:rPr lang="en-US" b="0" cap="none" spc="0" dirty="0" smtClean="0">
+                <a:ln w="0"/>
+                <a:solidFill>
+                  <a:schemeClr val="accent1"/>
+                </a:solidFill>
+                <a:effectLst>
+                  <a:outerShdw blurRad="38100" dist="19050" dir="2700000" algn="tl" rotWithShape="0">
+                    <a:schemeClr val="dk1">
+                      <a:alpha val="40000"/>
+                    </a:schemeClr>
+                  </a:outerShdw>
+                </a:effectLst>
+                <a:latin typeface="Gill Sans MT" panose="020B0502020104020203" pitchFamily="34" charset="0"/>
+              </a:rPr>
+              <a:t>Random Effects</a:t>
+            </a:r>
+            <a:endParaRPr lang="en-US" b="0" cap="none" spc="0" dirty="0">
+              <a:ln w="0"/>
+              <a:solidFill>
+                <a:schemeClr val="accent1"/>
+              </a:solidFill>
+              <a:effectLst>
+                <a:outerShdw blurRad="38100" dist="19050" dir="2700000" algn="tl" rotWithShape="0">
+                  <a:schemeClr val="dk1">
+                    <a:alpha val="40000"/>
+                  </a:schemeClr>
+                </a:outerShdw>
+              </a:effectLst>
+              <a:latin typeface="Gill Sans MT" panose="020B0502020104020203" pitchFamily="34" charset="0"/>
+            </a:endParaRPr>
+          </a:p>
+        </p:txBody>
+      </p:sp>
+      <p:sp>
+        <p:nvSpPr>
+          <p:cNvPr id="11" name="Rectangle 10"/>
+          <p:cNvSpPr/>
+          <p:nvPr/>
+        </p:nvSpPr>
+        <p:spPr>
+          <a:xfrm>
+            <a:off x="7540705" y="2140248"/>
+            <a:ext cx="1350562" cy="369332"/>
+          </a:xfrm>
+          <a:prstGeom prst="rect">
+            <a:avLst/>
+          </a:prstGeom>
+          <a:noFill/>
+        </p:spPr>
+        <p:txBody>
+          <a:bodyPr wrap="none" lIns="91440" tIns="45720" rIns="91440" bIns="45720">
+            <a:spAutoFit/>
+          </a:bodyPr>
+          <a:lstStyle/>
+          <a:p>
+            <a:pPr algn="ctr"/>
+            <a:r>
+              <a:rPr lang="en-US" b="0" cap="none" spc="0" dirty="0" smtClean="0">
+                <a:ln w="0"/>
+                <a:solidFill>
+                  <a:schemeClr val="accent1"/>
+                </a:solidFill>
+                <a:effectLst>
+                  <a:outerShdw blurRad="38100" dist="19050" dir="2700000" algn="tl" rotWithShape="0">
+                    <a:schemeClr val="dk1">
+                      <a:alpha val="40000"/>
+                    </a:schemeClr>
+                  </a:outerShdw>
+                </a:effectLst>
+                <a:latin typeface="Gill Sans MT" panose="020B0502020104020203" pitchFamily="34" charset="0"/>
+              </a:rPr>
+              <a:t>Fixed Effects</a:t>
+            </a:r>
+            <a:endParaRPr lang="en-US" b="0" cap="none" spc="0" dirty="0">
+              <a:ln w="0"/>
+              <a:solidFill>
+                <a:schemeClr val="accent1"/>
+              </a:solidFill>
+              <a:effectLst>
+                <a:outerShdw blurRad="38100" dist="19050" dir="2700000" algn="tl" rotWithShape="0">
+                  <a:schemeClr val="dk1">
+                    <a:alpha val="40000"/>
+                  </a:schemeClr>
+                </a:outerShdw>
+              </a:effectLst>
+              <a:latin typeface="Gill Sans MT" panose="020B0502020104020203" pitchFamily="34" charset="0"/>
+            </a:endParaRPr>
+          </a:p>
+        </p:txBody>
+      </p:sp>
+    </p:spTree>
+    <p:extLst>
+      <p:ext uri="{BB962C8B-B14F-4D97-AF65-F5344CB8AC3E}">
+        <p14:creationId xmlns:p14="http://schemas.microsoft.com/office/powerpoint/2010/main" val="1673359969"/>
+      </p:ext>
+    </p:extLst>
+  </p:cSld>
+  <p:clrMapOvr>
+    <a:masterClrMapping/>
+  </p:clrMapOvr>
+</p:sld>
+</file>
+
+<file path=ppt/slides/slide6.xml><?xml version="1.0" encoding="utf-8"?>
+<p:sld xmlns:a="http://schemas.openxmlformats.org/drawingml/2006/main" xmlns:r="http://schemas.openxmlformats.org/officeDocument/2006/relationships" xmlns:p="http://schemas.openxmlformats.org/presentationml/2006/main">
+  <p:cSld>
+    <p:spTree>
+      <p:nvGrpSpPr>
+        <p:cNvPr id="1" name=""/>
+        <p:cNvGrpSpPr/>
+        <p:nvPr/>
+      </p:nvGrpSpPr>
+      <p:grpSpPr>
+        <a:xfrm>
+          <a:off x="0" y="0"/>
+          <a:ext cx="0" cy="0"/>
+          <a:chOff x="0" y="0"/>
+          <a:chExt cx="0" cy="0"/>
+        </a:xfrm>
+      </p:grpSpPr>
+      <p:grpSp>
+        <p:nvGrpSpPr>
+          <p:cNvPr id="2" name="Group 1"/>
+          <p:cNvGrpSpPr/>
+          <p:nvPr/>
+        </p:nvGrpSpPr>
+        <p:grpSpPr>
+          <a:xfrm>
+            <a:off x="1757363" y="484188"/>
+            <a:ext cx="6067425" cy="3181350"/>
+            <a:chOff x="1757363" y="484188"/>
+            <a:chExt cx="6067425" cy="3181350"/>
+          </a:xfrm>
+        </p:grpSpPr>
+        <p:graphicFrame>
+          <p:nvGraphicFramePr>
+            <p:cNvPr id="6" name="Object 5"/>
+            <p:cNvGraphicFramePr>
+              <a:graphicFrameLocks noChangeAspect="1"/>
+            </p:cNvGraphicFramePr>
+            <p:nvPr>
+              <p:extLst>
+                <p:ext uri="{D42A27DB-BD31-4B8C-83A1-F6EECF244321}">
+                  <p14:modId xmlns:p14="http://schemas.microsoft.com/office/powerpoint/2010/main" val="488549130"/>
+                </p:ext>
+              </p:extLst>
+            </p:nvPr>
+          </p:nvGraphicFramePr>
+          <p:xfrm>
+            <a:off x="1839913" y="1831975"/>
+            <a:ext cx="3956050" cy="487363"/>
+          </p:xfrm>
+          <a:graphic>
+            <a:graphicData uri="http://schemas.openxmlformats.org/presentationml/2006/ole">
+              <mc:AlternateContent xmlns:mc="http://schemas.openxmlformats.org/markup-compatibility/2006">
+                <mc:Choice xmlns:v="urn:schemas-microsoft-com:vml" Requires="v">
+                  <p:oleObj spid="_x0000_s4147" name="Equation" r:id="rId3" imgW="1854000" imgH="228600" progId="Equation.DSMT4">
+                    <p:embed/>
+                  </p:oleObj>
+                </mc:Choice>
+                <mc:Fallback>
+                  <p:oleObj name="Equation" r:id="rId3" imgW="1854000" imgH="228600" progId="Equation.DSMT4">
+                    <p:embed/>
+                    <p:pic>
+                      <p:nvPicPr>
+                        <p:cNvPr id="0" name=""/>
+                        <p:cNvPicPr/>
+                        <p:nvPr/>
+                      </p:nvPicPr>
+                      <p:blipFill>
+                        <a:blip r:embed="rId4"/>
+                        <a:stretch>
+                          <a:fillRect/>
+                        </a:stretch>
+                      </p:blipFill>
+                      <p:spPr>
+                        <a:xfrm>
+                          <a:off x="1839913" y="1831975"/>
+                          <a:ext cx="3956050" cy="487363"/>
+                        </a:xfrm>
+                        <a:prstGeom prst="rect">
+                          <a:avLst/>
+                        </a:prstGeom>
+                      </p:spPr>
+                    </p:pic>
+                  </p:oleObj>
+                </mc:Fallback>
+              </mc:AlternateContent>
+            </a:graphicData>
+          </a:graphic>
+        </p:graphicFrame>
+        <p:graphicFrame>
+          <p:nvGraphicFramePr>
+            <p:cNvPr id="7" name="Object 6"/>
+            <p:cNvGraphicFramePr>
+              <a:graphicFrameLocks noChangeAspect="1"/>
+            </p:cNvGraphicFramePr>
+            <p:nvPr>
+              <p:extLst>
+                <p:ext uri="{D42A27DB-BD31-4B8C-83A1-F6EECF244321}">
+                  <p14:modId xmlns:p14="http://schemas.microsoft.com/office/powerpoint/2010/main" val="1197812011"/>
+                </p:ext>
+              </p:extLst>
+            </p:nvPr>
+          </p:nvGraphicFramePr>
+          <p:xfrm>
+            <a:off x="1958975" y="484188"/>
+            <a:ext cx="5172075" cy="514350"/>
+          </p:xfrm>
+          <a:graphic>
+            <a:graphicData uri="http://schemas.openxmlformats.org/presentationml/2006/ole">
+              <mc:AlternateContent xmlns:mc="http://schemas.openxmlformats.org/markup-compatibility/2006">
+                <mc:Choice xmlns:v="urn:schemas-microsoft-com:vml" Requires="v">
+                  <p:oleObj spid="_x0000_s4148" name="Equation" r:id="rId5" imgW="2425680" imgH="241200" progId="Equation.DSMT4">
+                    <p:embed/>
+                  </p:oleObj>
+                </mc:Choice>
+                <mc:Fallback>
+                  <p:oleObj name="Equation" r:id="rId5" imgW="2425680" imgH="241200" progId="Equation.DSMT4">
+                    <p:embed/>
+                    <p:pic>
+                      <p:nvPicPr>
+                        <p:cNvPr id="0" name=""/>
+                        <p:cNvPicPr/>
+                        <p:nvPr/>
+                      </p:nvPicPr>
+                      <p:blipFill>
+                        <a:blip r:embed="rId6"/>
+                        <a:stretch>
+                          <a:fillRect/>
+                        </a:stretch>
+                      </p:blipFill>
+                      <p:spPr>
+                        <a:xfrm>
+                          <a:off x="1958975" y="484188"/>
+                          <a:ext cx="5172075" cy="514350"/>
+                        </a:xfrm>
+                        <a:prstGeom prst="rect">
+                          <a:avLst/>
+                        </a:prstGeom>
+                      </p:spPr>
+                    </p:pic>
+                  </p:oleObj>
+                </mc:Fallback>
+              </mc:AlternateContent>
+            </a:graphicData>
+          </a:graphic>
+        </p:graphicFrame>
+        <p:graphicFrame>
+          <p:nvGraphicFramePr>
+            <p:cNvPr id="8" name="Object 7"/>
+            <p:cNvGraphicFramePr>
+              <a:graphicFrameLocks noChangeAspect="1"/>
+            </p:cNvGraphicFramePr>
+            <p:nvPr>
+              <p:extLst>
+                <p:ext uri="{D42A27DB-BD31-4B8C-83A1-F6EECF244321}">
+                  <p14:modId xmlns:p14="http://schemas.microsoft.com/office/powerpoint/2010/main" val="1472665258"/>
+                </p:ext>
+              </p:extLst>
+            </p:nvPr>
+          </p:nvGraphicFramePr>
+          <p:xfrm>
+            <a:off x="2760663" y="1157288"/>
+            <a:ext cx="5064125" cy="514350"/>
+          </p:xfrm>
+          <a:graphic>
+            <a:graphicData uri="http://schemas.openxmlformats.org/presentationml/2006/ole">
+              <mc:AlternateContent xmlns:mc="http://schemas.openxmlformats.org/markup-compatibility/2006">
+                <mc:Choice xmlns:v="urn:schemas-microsoft-com:vml" Requires="v">
+                  <p:oleObj spid="_x0000_s4149" name="Equation" r:id="rId7" imgW="2374560" imgH="241200" progId="Equation.DSMT4">
+                    <p:embed/>
+                  </p:oleObj>
+                </mc:Choice>
+                <mc:Fallback>
+                  <p:oleObj name="Equation" r:id="rId7" imgW="2374560" imgH="241200" progId="Equation.DSMT4">
+                    <p:embed/>
+                    <p:pic>
+                      <p:nvPicPr>
+                        <p:cNvPr id="0" name=""/>
+                        <p:cNvPicPr/>
+                        <p:nvPr/>
+                      </p:nvPicPr>
+                      <p:blipFill>
+                        <a:blip r:embed="rId8"/>
+                        <a:stretch>
+                          <a:fillRect/>
+                        </a:stretch>
+                      </p:blipFill>
+                      <p:spPr>
+                        <a:xfrm>
+                          <a:off x="2760663" y="1157288"/>
+                          <a:ext cx="5064125" cy="514350"/>
+                        </a:xfrm>
+                        <a:prstGeom prst="rect">
+                          <a:avLst/>
+                        </a:prstGeom>
+                      </p:spPr>
+                    </p:pic>
+                  </p:oleObj>
+                </mc:Fallback>
+              </mc:AlternateContent>
+            </a:graphicData>
+          </a:graphic>
+        </p:graphicFrame>
+        <p:graphicFrame>
+          <p:nvGraphicFramePr>
+            <p:cNvPr id="9" name="Object 8"/>
+            <p:cNvGraphicFramePr>
+              <a:graphicFrameLocks noChangeAspect="1"/>
+            </p:cNvGraphicFramePr>
+            <p:nvPr>
+              <p:extLst>
+                <p:ext uri="{D42A27DB-BD31-4B8C-83A1-F6EECF244321}">
+                  <p14:modId xmlns:p14="http://schemas.microsoft.com/office/powerpoint/2010/main" val="3891912589"/>
+                </p:ext>
+              </p:extLst>
+            </p:nvPr>
+          </p:nvGraphicFramePr>
+          <p:xfrm>
+            <a:off x="1757363" y="3151188"/>
+            <a:ext cx="5172075" cy="514350"/>
+          </p:xfrm>
+          <a:graphic>
+            <a:graphicData uri="http://schemas.openxmlformats.org/presentationml/2006/ole">
+              <mc:AlternateContent xmlns:mc="http://schemas.openxmlformats.org/markup-compatibility/2006">
+                <mc:Choice xmlns:v="urn:schemas-microsoft-com:vml" Requires="v">
+                  <p:oleObj spid="_x0000_s4150" name="Equation" r:id="rId9" imgW="2425680" imgH="241200" progId="Equation.DSMT4">
+                    <p:embed/>
+                  </p:oleObj>
+                </mc:Choice>
+                <mc:Fallback>
+                  <p:oleObj name="Equation" r:id="rId9" imgW="2425680" imgH="241200" progId="Equation.DSMT4">
+                    <p:embed/>
+                    <p:pic>
+                      <p:nvPicPr>
+                        <p:cNvPr id="0" name=""/>
+                        <p:cNvPicPr/>
+                        <p:nvPr/>
+                      </p:nvPicPr>
+                      <p:blipFill>
+                        <a:blip r:embed="rId10"/>
+                        <a:stretch>
+                          <a:fillRect/>
+                        </a:stretch>
+                      </p:blipFill>
+                      <p:spPr>
+                        <a:xfrm>
+                          <a:off x="1757363" y="3151188"/>
+                          <a:ext cx="5172075" cy="514350"/>
+                        </a:xfrm>
+                        <a:prstGeom prst="rect">
+                          <a:avLst/>
+                        </a:prstGeom>
+                      </p:spPr>
+                    </p:pic>
+                  </p:oleObj>
+                </mc:Fallback>
+              </mc:AlternateContent>
+            </a:graphicData>
+          </a:graphic>
+        </p:graphicFrame>
+        <p:graphicFrame>
+          <p:nvGraphicFramePr>
+            <p:cNvPr id="10" name="Object 9"/>
+            <p:cNvGraphicFramePr>
+              <a:graphicFrameLocks noChangeAspect="1"/>
+            </p:cNvGraphicFramePr>
+            <p:nvPr>
+              <p:extLst>
+                <p:ext uri="{D42A27DB-BD31-4B8C-83A1-F6EECF244321}">
+                  <p14:modId xmlns:p14="http://schemas.microsoft.com/office/powerpoint/2010/main" val="2471938168"/>
+                </p:ext>
+              </p:extLst>
+            </p:nvPr>
+          </p:nvGraphicFramePr>
+          <p:xfrm>
+            <a:off x="2674938" y="2478088"/>
+            <a:ext cx="5037137" cy="514350"/>
+          </p:xfrm>
+          <a:graphic>
+            <a:graphicData uri="http://schemas.openxmlformats.org/presentationml/2006/ole">
+              <mc:AlternateContent xmlns:mc="http://schemas.openxmlformats.org/markup-compatibility/2006">
+                <mc:Choice xmlns:v="urn:schemas-microsoft-com:vml" Requires="v">
+                  <p:oleObj spid="_x0000_s4151" name="Equation" r:id="rId11" imgW="2361960" imgH="241200" progId="Equation.DSMT4">
+                    <p:embed/>
+                  </p:oleObj>
+                </mc:Choice>
+                <mc:Fallback>
+                  <p:oleObj name="Equation" r:id="rId11" imgW="2361960" imgH="241200" progId="Equation.DSMT4">
+                    <p:embed/>
+                    <p:pic>
+                      <p:nvPicPr>
+                        <p:cNvPr id="0" name=""/>
+                        <p:cNvPicPr/>
+                        <p:nvPr/>
+                      </p:nvPicPr>
+                      <p:blipFill>
+                        <a:blip r:embed="rId12"/>
+                        <a:stretch>
+                          <a:fillRect/>
+                        </a:stretch>
+                      </p:blipFill>
+                      <p:spPr>
+                        <a:xfrm>
+                          <a:off x="2674938" y="2478088"/>
+                          <a:ext cx="5037137" cy="514350"/>
+                        </a:xfrm>
+                        <a:prstGeom prst="rect">
+                          <a:avLst/>
+                        </a:prstGeom>
+                      </p:spPr>
+                    </p:pic>
+                  </p:oleObj>
+                </mc:Fallback>
+              </mc:AlternateContent>
+            </a:graphicData>
+          </a:graphic>
+        </p:graphicFrame>
+      </p:grpSp>
+      <p:grpSp>
+        <p:nvGrpSpPr>
+          <p:cNvPr id="19" name="Group 18"/>
+          <p:cNvGrpSpPr/>
+          <p:nvPr/>
+        </p:nvGrpSpPr>
+        <p:grpSpPr>
+          <a:xfrm>
+            <a:off x="1568032" y="4466390"/>
+            <a:ext cx="8442285" cy="1460500"/>
+            <a:chOff x="1054684" y="4690980"/>
+            <a:chExt cx="8442285" cy="1460500"/>
+          </a:xfrm>
+        </p:grpSpPr>
+        <p:graphicFrame>
+          <p:nvGraphicFramePr>
+            <p:cNvPr id="12" name="Object 11"/>
+            <p:cNvGraphicFramePr>
+              <a:graphicFrameLocks noChangeAspect="1"/>
+            </p:cNvGraphicFramePr>
+            <p:nvPr>
+              <p:extLst/>
+            </p:nvPr>
+          </p:nvGraphicFramePr>
+          <p:xfrm>
+            <a:off x="6993481" y="4690980"/>
+            <a:ext cx="2503488" cy="1460500"/>
+          </p:xfrm>
+          <a:graphic>
+            <a:graphicData uri="http://schemas.openxmlformats.org/presentationml/2006/ole">
+              <mc:AlternateContent xmlns:mc="http://schemas.openxmlformats.org/markup-compatibility/2006">
+                <mc:Choice xmlns:v="urn:schemas-microsoft-com:vml" Requires="v">
+                  <p:oleObj spid="_x0000_s4152" name="Equation" r:id="rId13" imgW="1650960" imgH="965160" progId="Equation.DSMT4">
+                    <p:embed/>
+                  </p:oleObj>
+                </mc:Choice>
+                <mc:Fallback>
+                  <p:oleObj name="Equation" r:id="rId13" imgW="1650960" imgH="965160" progId="Equation.DSMT4">
+                    <p:embed/>
+                    <p:pic>
+                      <p:nvPicPr>
+                        <p:cNvPr id="0" name=""/>
+                        <p:cNvPicPr/>
+                        <p:nvPr/>
+                      </p:nvPicPr>
+                      <p:blipFill>
+                        <a:blip r:embed="rId14"/>
+                        <a:stretch>
+                          <a:fillRect/>
+                        </a:stretch>
+                      </p:blipFill>
+                      <p:spPr>
+                        <a:xfrm>
+                          <a:off x="6993481" y="4690980"/>
+                          <a:ext cx="2503488" cy="1460500"/>
+                        </a:xfrm>
+                        <a:prstGeom prst="rect">
+                          <a:avLst/>
+                        </a:prstGeom>
+                      </p:spPr>
+                    </p:pic>
+                  </p:oleObj>
+                </mc:Fallback>
+              </mc:AlternateContent>
+            </a:graphicData>
+          </a:graphic>
+        </p:graphicFrame>
+        <p:graphicFrame>
+          <p:nvGraphicFramePr>
+            <p:cNvPr id="13" name="Object 12"/>
+            <p:cNvGraphicFramePr>
+              <a:graphicFrameLocks noChangeAspect="1"/>
+            </p:cNvGraphicFramePr>
+            <p:nvPr>
+              <p:extLst/>
+            </p:nvPr>
+          </p:nvGraphicFramePr>
+          <p:xfrm>
+            <a:off x="3138903" y="4752245"/>
+            <a:ext cx="3731293" cy="1399235"/>
+          </p:xfrm>
+          <a:graphic>
+            <a:graphicData uri="http://schemas.openxmlformats.org/presentationml/2006/ole">
+              <mc:AlternateContent xmlns:mc="http://schemas.openxmlformats.org/markup-compatibility/2006">
+                <mc:Choice xmlns:v="urn:schemas-microsoft-com:vml" Requires="v">
+                  <p:oleObj spid="_x0000_s4153" name="Equation" r:id="rId15" imgW="2438280" imgH="914400" progId="Equation.DSMT4">
+                    <p:embed/>
+                  </p:oleObj>
+                </mc:Choice>
+                <mc:Fallback>
+                  <p:oleObj name="Equation" r:id="rId15" imgW="2438280" imgH="914400" progId="Equation.DSMT4">
+                    <p:embed/>
+                    <p:pic>
+                      <p:nvPicPr>
+                        <p:cNvPr id="0" name=""/>
+                        <p:cNvPicPr/>
+                        <p:nvPr/>
+                      </p:nvPicPr>
+                      <p:blipFill>
+                        <a:blip r:embed="rId16"/>
+                        <a:stretch>
+                          <a:fillRect/>
+                        </a:stretch>
+                      </p:blipFill>
+                      <p:spPr>
+                        <a:xfrm>
+                          <a:off x="3138903" y="4752245"/>
+                          <a:ext cx="3731293" cy="1399235"/>
+                        </a:xfrm>
+                        <a:prstGeom prst="rect">
+                          <a:avLst/>
+                        </a:prstGeom>
+                      </p:spPr>
+                    </p:pic>
+                  </p:oleObj>
+                </mc:Fallback>
+              </mc:AlternateContent>
+            </a:graphicData>
+          </a:graphic>
+        </p:graphicFrame>
+        <p:sp>
+          <p:nvSpPr>
+            <p:cNvPr id="14" name="TextBox 13"/>
+            <p:cNvSpPr txBox="1"/>
+            <p:nvPr/>
+          </p:nvSpPr>
+          <p:spPr>
+            <a:xfrm>
+              <a:off x="1190619" y="4769529"/>
+              <a:ext cx="1832809" cy="369332"/>
+            </a:xfrm>
+            <a:prstGeom prst="rect">
+              <a:avLst/>
+            </a:prstGeom>
+            <a:noFill/>
+          </p:spPr>
+          <p:txBody>
+            <a:bodyPr wrap="none" rtlCol="0">
+              <a:spAutoFit/>
+            </a:bodyPr>
+            <a:lstStyle/>
+            <a:p>
+              <a:r>
+                <a:rPr lang="en-US" dirty="0" smtClean="0"/>
+                <a:t>Physical Intercept</a:t>
+              </a:r>
+              <a:endParaRPr lang="en-US" dirty="0"/>
+            </a:p>
+          </p:txBody>
+        </p:sp>
+        <p:sp>
+          <p:nvSpPr>
+            <p:cNvPr id="15" name="TextBox 14"/>
+            <p:cNvSpPr txBox="1"/>
+            <p:nvPr/>
+          </p:nvSpPr>
+          <p:spPr>
+            <a:xfrm>
+              <a:off x="1527826" y="5107069"/>
+              <a:ext cx="1495602" cy="369332"/>
+            </a:xfrm>
+            <a:prstGeom prst="rect">
+              <a:avLst/>
+            </a:prstGeom>
+            <a:noFill/>
+          </p:spPr>
+          <p:txBody>
+            <a:bodyPr wrap="none" rtlCol="0">
+              <a:spAutoFit/>
+            </a:bodyPr>
+            <a:lstStyle/>
+            <a:p>
+              <a:r>
+                <a:rPr lang="en-US" dirty="0" smtClean="0"/>
+                <a:t>Physical Slope</a:t>
+              </a:r>
+              <a:endParaRPr lang="en-US" dirty="0"/>
+            </a:p>
+          </p:txBody>
+        </p:sp>
+        <p:sp>
+          <p:nvSpPr>
+            <p:cNvPr id="16" name="TextBox 15"/>
+            <p:cNvSpPr txBox="1"/>
+            <p:nvPr/>
+          </p:nvSpPr>
+          <p:spPr>
+            <a:xfrm>
+              <a:off x="1054684" y="5782148"/>
+              <a:ext cx="1968744" cy="369332"/>
+            </a:xfrm>
+            <a:prstGeom prst="rect">
+              <a:avLst/>
+            </a:prstGeom>
+            <a:noFill/>
+          </p:spPr>
+          <p:txBody>
+            <a:bodyPr wrap="none" rtlCol="0">
+              <a:spAutoFit/>
+            </a:bodyPr>
+            <a:lstStyle/>
+            <a:p>
+              <a:r>
+                <a:rPr lang="en-US" dirty="0" smtClean="0"/>
+                <a:t>Cognitive Intercept</a:t>
+              </a:r>
+              <a:endParaRPr lang="en-US" dirty="0"/>
+            </a:p>
+          </p:txBody>
+        </p:sp>
+        <p:sp>
+          <p:nvSpPr>
+            <p:cNvPr id="17" name="TextBox 16"/>
+            <p:cNvSpPr txBox="1"/>
+            <p:nvPr/>
+          </p:nvSpPr>
+          <p:spPr>
+            <a:xfrm>
+              <a:off x="1391891" y="5444609"/>
+              <a:ext cx="1631537" cy="369332"/>
+            </a:xfrm>
+            <a:prstGeom prst="rect">
+              <a:avLst/>
+            </a:prstGeom>
+            <a:noFill/>
+          </p:spPr>
+          <p:txBody>
+            <a:bodyPr wrap="none" rtlCol="0">
+              <a:spAutoFit/>
+            </a:bodyPr>
+            <a:lstStyle/>
+            <a:p>
+              <a:r>
+                <a:rPr lang="en-US" dirty="0" smtClean="0"/>
+                <a:t>Cognitive Slope</a:t>
+              </a:r>
+              <a:endParaRPr lang="en-US" dirty="0"/>
+            </a:p>
+          </p:txBody>
+        </p:sp>
+      </p:grpSp>
+    </p:spTree>
+    <p:extLst>
+      <p:ext uri="{BB962C8B-B14F-4D97-AF65-F5344CB8AC3E}">
+        <p14:creationId xmlns:p14="http://schemas.microsoft.com/office/powerpoint/2010/main" val="766250007"/>
+      </p:ext>
+    </p:extLst>
+  </p:cSld>
+  <p:clrMapOvr>
+    <a:masterClrMapping/>
+  </p:clrMapOvr>
+</p:sld>
+</file>
+
+<file path=ppt/slides/slide7.xml><?xml version="1.0" encoding="utf-8"?>
+<p:sld xmlns:a="http://schemas.openxmlformats.org/drawingml/2006/main" xmlns:r="http://schemas.openxmlformats.org/officeDocument/2006/relationships" xmlns:p="http://schemas.openxmlformats.org/presentationml/2006/main">
+  <p:cSld>
+    <p:spTree>
+      <p:nvGrpSpPr>
+        <p:cNvPr id="1" name=""/>
+        <p:cNvGrpSpPr/>
+        <p:nvPr/>
+      </p:nvGrpSpPr>
+      <p:grpSpPr>
+        <a:xfrm>
+          <a:off x="0" y="0"/>
+          <a:ext cx="0" cy="0"/>
+          <a:chOff x="0" y="0"/>
+          <a:chExt cx="0" cy="0"/>
+        </a:xfrm>
+      </p:grpSpPr>
       <p:graphicFrame>
         <p:nvGraphicFramePr>
-          <p:cNvPr id="5" name="Object 4"/>
+          <p:cNvPr id="6" name="Object 5"/>
           <p:cNvGraphicFramePr>
             <a:graphicFrameLocks noChangeAspect="1"/>
           </p:cNvGraphicFramePr>
           <p:nvPr>
-            <p:extLst/>
+            <p:extLst>
+              <p:ext uri="{D42A27DB-BD31-4B8C-83A1-F6EECF244321}">
+                <p14:modId xmlns:p14="http://schemas.microsoft.com/office/powerpoint/2010/main" val="1505998496"/>
+              </p:ext>
+            </p:extLst>
           </p:nvPr>
         </p:nvGraphicFramePr>
         <p:xfrm>
-          <a:off x="7065670" y="2541338"/>
-          <a:ext cx="2503488" cy="1460500"/>
+          <a:off x="1839913" y="1839723"/>
+          <a:ext cx="3956050" cy="487363"/>
         </p:xfrm>
         <a:graphic>
           <a:graphicData uri="http://schemas.openxmlformats.org/presentationml/2006/ole">
             <mc:AlternateContent xmlns:mc="http://schemas.openxmlformats.org/markup-compatibility/2006">
               <mc:Choice xmlns:v="urn:schemas-microsoft-com:vml" Requires="v">
-                <p:oleObj spid="_x0000_s3082" name="Equation" r:id="rId3" imgW="1650960" imgH="965160" progId="Equation.DSMT4">
+                <p:oleObj spid="_x0000_s5132" name="Equation" r:id="rId3" imgW="1854000" imgH="228600" progId="Equation.DSMT4">
                   <p:embed/>
                 </p:oleObj>
               </mc:Choice>
               <mc:Fallback>
-                <p:oleObj name="Equation" r:id="rId3" imgW="1650960" imgH="965160" progId="Equation.DSMT4">
+                <p:oleObj name="Equation" r:id="rId3" imgW="1854000" imgH="228600" progId="Equation.DSMT4">
                   <p:embed/>
                   <p:pic>
                     <p:nvPicPr>
@@ -5431,8 +6422,8 @@
                     </p:blipFill>
                     <p:spPr>
                       <a:xfrm>
-                        <a:off x="7065670" y="2541338"/>
-                        <a:ext cx="2503488" cy="1460500"/>
+                        <a:off x="1839913" y="1839723"/>
+                        <a:ext cx="3956050" cy="487363"/>
                       </a:xfrm>
                       <a:prstGeom prst="rect">
                         <a:avLst/>
@@ -5447,32 +6438,32 @@
       </p:graphicFrame>
       <p:graphicFrame>
         <p:nvGraphicFramePr>
-          <p:cNvPr id="22" name="Object 21"/>
+          <p:cNvPr id="7" name="Object 6"/>
           <p:cNvGraphicFramePr>
             <a:graphicFrameLocks noChangeAspect="1"/>
           </p:cNvGraphicFramePr>
           <p:nvPr>
             <p:extLst>
               <p:ext uri="{D42A27DB-BD31-4B8C-83A1-F6EECF244321}">
-                <p14:modId xmlns:p14="http://schemas.microsoft.com/office/powerpoint/2010/main" val="3441142605"/>
+                <p14:modId xmlns:p14="http://schemas.microsoft.com/office/powerpoint/2010/main" val="568965476"/>
               </p:ext>
             </p:extLst>
           </p:nvPr>
         </p:nvGraphicFramePr>
         <p:xfrm>
-          <a:off x="3803650" y="2601913"/>
-          <a:ext cx="2546350" cy="1400175"/>
+          <a:off x="2065809" y="1081033"/>
+          <a:ext cx="3960938" cy="393905"/>
         </p:xfrm>
         <a:graphic>
           <a:graphicData uri="http://schemas.openxmlformats.org/presentationml/2006/ole">
             <mc:AlternateContent xmlns:mc="http://schemas.openxmlformats.org/markup-compatibility/2006">
               <mc:Choice xmlns:v="urn:schemas-microsoft-com:vml" Requires="v">
-                <p:oleObj spid="_x0000_s3083" name="Equation" r:id="rId5" imgW="1663560" imgH="914400" progId="Equation.DSMT4">
+                <p:oleObj spid="_x0000_s5133" name="Equation" r:id="rId5" imgW="2425680" imgH="241200" progId="Equation.DSMT4">
                   <p:embed/>
                 </p:oleObj>
               </mc:Choice>
               <mc:Fallback>
-                <p:oleObj name="Equation" r:id="rId5" imgW="1663560" imgH="914400" progId="Equation.DSMT4">
+                <p:oleObj name="Equation" r:id="rId5" imgW="2425680" imgH="241200" progId="Equation.DSMT4">
                   <p:embed/>
                   <p:pic>
                     <p:nvPicPr>
@@ -5488,8 +6479,8 @@
                     </p:blipFill>
                     <p:spPr>
                       <a:xfrm>
-                        <a:off x="3803650" y="2601913"/>
-                        <a:ext cx="2546350" cy="1400175"/>
+                        <a:off x="2065809" y="1081033"/>
+                        <a:ext cx="3960938" cy="393905"/>
                       </a:xfrm>
                       <a:prstGeom prst="rect">
                         <a:avLst/>
@@ -5502,130 +6493,211 @@
           </a:graphicData>
         </a:graphic>
       </p:graphicFrame>
-      <p:sp>
-        <p:nvSpPr>
-          <p:cNvPr id="23" name="TextBox 22"/>
-          <p:cNvSpPr txBox="1"/>
-          <p:nvPr/>
-        </p:nvSpPr>
-        <p:spPr>
-          <a:xfrm>
-            <a:off x="1262808" y="2619887"/>
-            <a:ext cx="1832809" cy="369332"/>
-          </a:xfrm>
-          <a:prstGeom prst="rect">
-            <a:avLst/>
-          </a:prstGeom>
-          <a:noFill/>
-        </p:spPr>
-        <p:txBody>
-          <a:bodyPr wrap="none" rtlCol="0">
-            <a:spAutoFit/>
-          </a:bodyPr>
-          <a:lstStyle/>
-          <a:p>
-            <a:r>
-              <a:rPr lang="en-US" dirty="0" smtClean="0"/>
-              <a:t>Physical Intercept</a:t>
-            </a:r>
-            <a:endParaRPr lang="en-US" dirty="0"/>
-          </a:p>
-        </p:txBody>
-      </p:sp>
-      <p:sp>
-        <p:nvSpPr>
-          <p:cNvPr id="24" name="TextBox 23"/>
-          <p:cNvSpPr txBox="1"/>
-          <p:nvPr/>
-        </p:nvSpPr>
-        <p:spPr>
-          <a:xfrm>
-            <a:off x="1600015" y="2957427"/>
-            <a:ext cx="1495602" cy="369332"/>
-          </a:xfrm>
-          <a:prstGeom prst="rect">
-            <a:avLst/>
-          </a:prstGeom>
-          <a:noFill/>
-        </p:spPr>
-        <p:txBody>
-          <a:bodyPr wrap="none" rtlCol="0">
-            <a:spAutoFit/>
-          </a:bodyPr>
-          <a:lstStyle/>
-          <a:p>
-            <a:r>
-              <a:rPr lang="en-US" dirty="0" smtClean="0"/>
-              <a:t>Physical Slope</a:t>
-            </a:r>
-            <a:endParaRPr lang="en-US" dirty="0"/>
-          </a:p>
-        </p:txBody>
-      </p:sp>
-      <p:sp>
-        <p:nvSpPr>
-          <p:cNvPr id="25" name="TextBox 24"/>
-          <p:cNvSpPr txBox="1"/>
-          <p:nvPr/>
-        </p:nvSpPr>
-        <p:spPr>
-          <a:xfrm>
-            <a:off x="1126873" y="3632506"/>
-            <a:ext cx="1968744" cy="369332"/>
-          </a:xfrm>
-          <a:prstGeom prst="rect">
-            <a:avLst/>
-          </a:prstGeom>
-          <a:noFill/>
-        </p:spPr>
-        <p:txBody>
-          <a:bodyPr wrap="none" rtlCol="0">
-            <a:spAutoFit/>
-          </a:bodyPr>
-          <a:lstStyle/>
-          <a:p>
-            <a:r>
-              <a:rPr lang="en-US" dirty="0" smtClean="0"/>
-              <a:t>Cognitive Intercept</a:t>
-            </a:r>
-            <a:endParaRPr lang="en-US" dirty="0"/>
-          </a:p>
-        </p:txBody>
-      </p:sp>
-      <p:sp>
-        <p:nvSpPr>
-          <p:cNvPr id="26" name="TextBox 25"/>
-          <p:cNvSpPr txBox="1"/>
-          <p:nvPr/>
-        </p:nvSpPr>
-        <p:spPr>
-          <a:xfrm>
-            <a:off x="1464080" y="3294967"/>
-            <a:ext cx="1631537" cy="369332"/>
-          </a:xfrm>
-          <a:prstGeom prst="rect">
-            <a:avLst/>
-          </a:prstGeom>
-          <a:noFill/>
-        </p:spPr>
-        <p:txBody>
-          <a:bodyPr wrap="none" rtlCol="0">
-            <a:spAutoFit/>
-          </a:bodyPr>
-          <a:lstStyle/>
-          <a:p>
-            <a:r>
-              <a:rPr lang="en-US" dirty="0" smtClean="0"/>
-              <a:t>Cognitive Slope</a:t>
-            </a:r>
-            <a:endParaRPr lang="en-US" dirty="0"/>
-          </a:p>
-        </p:txBody>
-      </p:sp>
+      <p:graphicFrame>
+        <p:nvGraphicFramePr>
+          <p:cNvPr id="8" name="Object 7"/>
+          <p:cNvGraphicFramePr>
+            <a:graphicFrameLocks noChangeAspect="1"/>
+          </p:cNvGraphicFramePr>
+          <p:nvPr>
+            <p:extLst>
+              <p:ext uri="{D42A27DB-BD31-4B8C-83A1-F6EECF244321}">
+                <p14:modId xmlns:p14="http://schemas.microsoft.com/office/powerpoint/2010/main" val="2963492603"/>
+              </p:ext>
+            </p:extLst>
+          </p:nvPr>
+        </p:nvGraphicFramePr>
+        <p:xfrm>
+          <a:off x="2993139" y="1475876"/>
+          <a:ext cx="3878266" cy="393905"/>
+        </p:xfrm>
+        <a:graphic>
+          <a:graphicData uri="http://schemas.openxmlformats.org/presentationml/2006/ole">
+            <mc:AlternateContent xmlns:mc="http://schemas.openxmlformats.org/markup-compatibility/2006">
+              <mc:Choice xmlns:v="urn:schemas-microsoft-com:vml" Requires="v">
+                <p:oleObj spid="_x0000_s5134" name="Equation" r:id="rId7" imgW="2374560" imgH="241200" progId="Equation.DSMT4">
+                  <p:embed/>
+                </p:oleObj>
+              </mc:Choice>
+              <mc:Fallback>
+                <p:oleObj name="Equation" r:id="rId7" imgW="2374560" imgH="241200" progId="Equation.DSMT4">
+                  <p:embed/>
+                  <p:pic>
+                    <p:nvPicPr>
+                      <p:cNvPr id="0" name=""/>
+                      <p:cNvPicPr/>
+                      <p:nvPr/>
+                    </p:nvPicPr>
+                    <p:blipFill>
+                      <a:blip r:embed="rId8"/>
+                      <a:stretch>
+                        <a:fillRect/>
+                      </a:stretch>
+                    </p:blipFill>
+                    <p:spPr>
+                      <a:xfrm>
+                        <a:off x="2993139" y="1475876"/>
+                        <a:ext cx="3878266" cy="393905"/>
+                      </a:xfrm>
+                      <a:prstGeom prst="rect">
+                        <a:avLst/>
+                      </a:prstGeom>
+                    </p:spPr>
+                  </p:pic>
+                </p:oleObj>
+              </mc:Fallback>
+            </mc:AlternateContent>
+          </a:graphicData>
+        </a:graphic>
+      </p:graphicFrame>
+      <p:graphicFrame>
+        <p:nvGraphicFramePr>
+          <p:cNvPr id="9" name="Object 8"/>
+          <p:cNvGraphicFramePr>
+            <a:graphicFrameLocks noChangeAspect="1"/>
+          </p:cNvGraphicFramePr>
+          <p:nvPr>
+            <p:extLst>
+              <p:ext uri="{D42A27DB-BD31-4B8C-83A1-F6EECF244321}">
+                <p14:modId xmlns:p14="http://schemas.microsoft.com/office/powerpoint/2010/main" val="3108509477"/>
+              </p:ext>
+            </p:extLst>
+          </p:nvPr>
+        </p:nvGraphicFramePr>
+        <p:xfrm>
+          <a:off x="2073558" y="2691873"/>
+          <a:ext cx="3960938" cy="393905"/>
+        </p:xfrm>
+        <a:graphic>
+          <a:graphicData uri="http://schemas.openxmlformats.org/presentationml/2006/ole">
+            <mc:AlternateContent xmlns:mc="http://schemas.openxmlformats.org/markup-compatibility/2006">
+              <mc:Choice xmlns:v="urn:schemas-microsoft-com:vml" Requires="v">
+                <p:oleObj spid="_x0000_s5135" name="Equation" r:id="rId9" imgW="2425680" imgH="241200" progId="Equation.DSMT4">
+                  <p:embed/>
+                </p:oleObj>
+              </mc:Choice>
+              <mc:Fallback>
+                <p:oleObj name="Equation" r:id="rId9" imgW="2425680" imgH="241200" progId="Equation.DSMT4">
+                  <p:embed/>
+                  <p:pic>
+                    <p:nvPicPr>
+                      <p:cNvPr id="0" name=""/>
+                      <p:cNvPicPr/>
+                      <p:nvPr/>
+                    </p:nvPicPr>
+                    <p:blipFill>
+                      <a:blip r:embed="rId10"/>
+                      <a:stretch>
+                        <a:fillRect/>
+                      </a:stretch>
+                    </p:blipFill>
+                    <p:spPr>
+                      <a:xfrm>
+                        <a:off x="2073558" y="2691873"/>
+                        <a:ext cx="3960938" cy="393905"/>
+                      </a:xfrm>
+                      <a:prstGeom prst="rect">
+                        <a:avLst/>
+                      </a:prstGeom>
+                    </p:spPr>
+                  </p:pic>
+                </p:oleObj>
+              </mc:Fallback>
+            </mc:AlternateContent>
+          </a:graphicData>
+        </a:graphic>
+      </p:graphicFrame>
+      <p:graphicFrame>
+        <p:nvGraphicFramePr>
+          <p:cNvPr id="10" name="Object 9"/>
+          <p:cNvGraphicFramePr>
+            <a:graphicFrameLocks noChangeAspect="1"/>
+          </p:cNvGraphicFramePr>
+          <p:nvPr>
+            <p:extLst>
+              <p:ext uri="{D42A27DB-BD31-4B8C-83A1-F6EECF244321}">
+                <p14:modId xmlns:p14="http://schemas.microsoft.com/office/powerpoint/2010/main" val="3949220661"/>
+              </p:ext>
+            </p:extLst>
+          </p:nvPr>
+        </p:nvGraphicFramePr>
+        <p:xfrm>
+          <a:off x="2899224" y="2297029"/>
+          <a:ext cx="3857598" cy="393905"/>
+        </p:xfrm>
+        <a:graphic>
+          <a:graphicData uri="http://schemas.openxmlformats.org/presentationml/2006/ole">
+            <mc:AlternateContent xmlns:mc="http://schemas.openxmlformats.org/markup-compatibility/2006">
+              <mc:Choice xmlns:v="urn:schemas-microsoft-com:vml" Requires="v">
+                <p:oleObj spid="_x0000_s5136" name="Equation" r:id="rId11" imgW="2361960" imgH="241200" progId="Equation.DSMT4">
+                  <p:embed/>
+                </p:oleObj>
+              </mc:Choice>
+              <mc:Fallback>
+                <p:oleObj name="Equation" r:id="rId11" imgW="2361960" imgH="241200" progId="Equation.DSMT4">
+                  <p:embed/>
+                  <p:pic>
+                    <p:nvPicPr>
+                      <p:cNvPr id="0" name=""/>
+                      <p:cNvPicPr/>
+                      <p:nvPr/>
+                    </p:nvPicPr>
+                    <p:blipFill>
+                      <a:blip r:embed="rId12"/>
+                      <a:stretch>
+                        <a:fillRect/>
+                      </a:stretch>
+                    </p:blipFill>
+                    <p:spPr>
+                      <a:xfrm>
+                        <a:off x="2899224" y="2297029"/>
+                        <a:ext cx="3857598" cy="393905"/>
+                      </a:xfrm>
+                      <a:prstGeom prst="rect">
+                        <a:avLst/>
+                      </a:prstGeom>
+                    </p:spPr>
+                  </p:pic>
+                </p:oleObj>
+              </mc:Fallback>
+            </mc:AlternateContent>
+          </a:graphicData>
+        </a:graphic>
+      </p:graphicFrame>
     </p:spTree>
     <p:extLst>
       <p:ext uri="{BB962C8B-B14F-4D97-AF65-F5344CB8AC3E}">
-        <p14:creationId xmlns:p14="http://schemas.microsoft.com/office/powerpoint/2010/main" val="1673359969"/>
+        <p14:creationId xmlns:p14="http://schemas.microsoft.com/office/powerpoint/2010/main" val="3784479210"/>
+      </p:ext>
+    </p:extLst>
+  </p:cSld>
+  <p:clrMapOvr>
+    <a:masterClrMapping/>
+  </p:clrMapOvr>
+</p:sld>
+</file>
+
+<file path=ppt/slides/slide8.xml><?xml version="1.0" encoding="utf-8"?>
+<p:sld xmlns:a="http://schemas.openxmlformats.org/drawingml/2006/main" xmlns:r="http://schemas.openxmlformats.org/officeDocument/2006/relationships" xmlns:p="http://schemas.openxmlformats.org/presentationml/2006/main">
+  <p:cSld>
+    <p:spTree>
+      <p:nvGrpSpPr>
+        <p:cNvPr id="1" name=""/>
+        <p:cNvGrpSpPr/>
+        <p:nvPr/>
+      </p:nvGrpSpPr>
+      <p:grpSpPr>
+        <a:xfrm>
+          <a:off x="0" y="0"/>
+          <a:ext cx="0" cy="0"/>
+          <a:chOff x="0" y="0"/>
+          <a:chExt cx="0" cy="0"/>
+        </a:xfrm>
+      </p:grpSpPr>
+    </p:spTree>
+    <p:extLst>
+      <p:ext uri="{BB962C8B-B14F-4D97-AF65-F5344CB8AC3E}">
+        <p14:creationId xmlns:p14="http://schemas.microsoft.com/office/powerpoint/2010/main" val="1336856304"/>
       </p:ext>
     </p:extLst>
   </p:cSld>

</xml_diff>

<commit_message>
#41 corrected images in issue description
</commit_message>
<xml_diff>
--- a/libs/materials/naming_convention.pptx
+++ b/libs/materials/naming_convention.pptx
@@ -10,9 +10,10 @@
     <p:sldId id="257" r:id="rId4"/>
     <p:sldId id="258" r:id="rId5"/>
     <p:sldId id="259" r:id="rId6"/>
-    <p:sldId id="262" r:id="rId7"/>
-    <p:sldId id="263" r:id="rId8"/>
-    <p:sldId id="261" r:id="rId9"/>
+    <p:sldId id="264" r:id="rId7"/>
+    <p:sldId id="262" r:id="rId8"/>
+    <p:sldId id="263" r:id="rId9"/>
+    <p:sldId id="261" r:id="rId10"/>
   </p:sldIdLst>
   <p:sldSz cx="12192000" cy="6858000"/>
   <p:notesSz cx="6858000" cy="9144000"/>
@@ -113,7 +114,7 @@
   </p:defaultTextStyle>
   <p:extLst>
     <p:ext uri="{EFAFB233-063F-42B5-8137-9DF3F51BA10A}">
-      <p15:sldGuideLst xmlns:p15="http://schemas.microsoft.com/office/powerpoint/2012/main" xmlns=""/>
+      <p15:sldGuideLst xmlns="" xmlns:p15="http://schemas.microsoft.com/office/powerpoint/2012/main"/>
     </p:ext>
   </p:extLst>
 </p:presentation>
@@ -4494,7 +4495,7 @@
             <a:graphicData uri="http://schemas.openxmlformats.org/presentationml/2006/ole">
               <mc:AlternateContent xmlns:mc="http://schemas.openxmlformats.org/markup-compatibility/2006">
                 <mc:Choice xmlns:v="urn:schemas-microsoft-com:vml" Requires="v">
-                  <p:oleObj spid="_x0000_s1171" name="Equation" r:id="rId3" imgW="1904760" imgH="228600" progId="Equation.DSMT4">
+                  <p:oleObj spid="_x0000_s1178" name="Equation" r:id="rId3" imgW="1904760" imgH="228600" progId="Equation.DSMT4">
                     <p:embed/>
                   </p:oleObj>
                 </mc:Choice>
@@ -4551,7 +4552,7 @@
             <a:graphicData uri="http://schemas.openxmlformats.org/presentationml/2006/ole">
               <mc:AlternateContent xmlns:mc="http://schemas.openxmlformats.org/markup-compatibility/2006">
                 <mc:Choice xmlns:v="urn:schemas-microsoft-com:vml" Requires="v">
-                  <p:oleObj spid="_x0000_s1172" name="Equation" r:id="rId5" imgW="3187440" imgH="241200" progId="Equation.DSMT4">
+                  <p:oleObj spid="_x0000_s1179" name="Equation" r:id="rId5" imgW="3187440" imgH="241200" progId="Equation.DSMT4">
                     <p:embed/>
                   </p:oleObj>
                 </mc:Choice>
@@ -4608,7 +4609,7 @@
             <a:graphicData uri="http://schemas.openxmlformats.org/presentationml/2006/ole">
               <mc:AlternateContent xmlns:mc="http://schemas.openxmlformats.org/markup-compatibility/2006">
                 <mc:Choice xmlns:v="urn:schemas-microsoft-com:vml" Requires="v">
-                  <p:oleObj spid="_x0000_s1173" name="Equation" r:id="rId7" imgW="3124080" imgH="241200" progId="Equation.DSMT4">
+                  <p:oleObj spid="_x0000_s1180" name="Equation" r:id="rId7" imgW="3124080" imgH="241200" progId="Equation.DSMT4">
                     <p:embed/>
                   </p:oleObj>
                 </mc:Choice>
@@ -4665,7 +4666,7 @@
             <a:graphicData uri="http://schemas.openxmlformats.org/presentationml/2006/ole">
               <mc:AlternateContent xmlns:mc="http://schemas.openxmlformats.org/markup-compatibility/2006">
                 <mc:Choice xmlns:v="urn:schemas-microsoft-com:vml" Requires="v">
-                  <p:oleObj spid="_x0000_s1174" name="Equation" r:id="rId9" imgW="3136680" imgH="241200" progId="Equation.DSMT4">
+                  <p:oleObj spid="_x0000_s1181" name="Equation" r:id="rId9" imgW="3136680" imgH="241200" progId="Equation.DSMT4">
                     <p:embed/>
                   </p:oleObj>
                 </mc:Choice>
@@ -4722,7 +4723,7 @@
             <a:graphicData uri="http://schemas.openxmlformats.org/presentationml/2006/ole">
               <mc:AlternateContent xmlns:mc="http://schemas.openxmlformats.org/markup-compatibility/2006">
                 <mc:Choice xmlns:v="urn:schemas-microsoft-com:vml" Requires="v">
-                  <p:oleObj spid="_x0000_s1175" name="Equation" r:id="rId11" imgW="3073320" imgH="241200" progId="Equation.DSMT4">
+                  <p:oleObj spid="_x0000_s1182" name="Equation" r:id="rId11" imgW="3073320" imgH="241200" progId="Equation.DSMT4">
                     <p:embed/>
                   </p:oleObj>
                 </mc:Choice>
@@ -4794,7 +4795,7 @@
             <a:graphicData uri="http://schemas.openxmlformats.org/presentationml/2006/ole">
               <mc:AlternateContent xmlns:mc="http://schemas.openxmlformats.org/markup-compatibility/2006">
                 <mc:Choice xmlns:v="urn:schemas-microsoft-com:vml" Requires="v">
-                  <p:oleObj spid="_x0000_s1176" name="Equation" r:id="rId13" imgW="1650960" imgH="965160" progId="Equation.DSMT4">
+                  <p:oleObj spid="_x0000_s1183" name="Equation" r:id="rId13" imgW="1650960" imgH="965160" progId="Equation.DSMT4">
                     <p:embed/>
                   </p:oleObj>
                 </mc:Choice>
@@ -4851,7 +4852,7 @@
             <a:graphicData uri="http://schemas.openxmlformats.org/presentationml/2006/ole">
               <mc:AlternateContent xmlns:mc="http://schemas.openxmlformats.org/markup-compatibility/2006">
                 <mc:Choice xmlns:v="urn:schemas-microsoft-com:vml" Requires="v">
-                  <p:oleObj spid="_x0000_s1177" name="Equation" r:id="rId15" imgW="2438280" imgH="914400" progId="Equation.DSMT4">
+                  <p:oleObj spid="_x0000_s1184" name="Equation" r:id="rId15" imgW="2438280" imgH="914400" progId="Equation.DSMT4">
                     <p:embed/>
                   </p:oleObj>
                 </mc:Choice>
@@ -5059,7 +5060,7 @@
           <a:graphicData uri="http://schemas.openxmlformats.org/presentationml/2006/ole">
             <mc:AlternateContent xmlns:mc="http://schemas.openxmlformats.org/markup-compatibility/2006">
               <mc:Choice xmlns:v="urn:schemas-microsoft-com:vml" Requires="v">
-                <p:oleObj spid="_x0000_s2104" name="Equation" r:id="rId3" imgW="1650960" imgH="965160" progId="Equation.DSMT4">
+                <p:oleObj spid="_x0000_s2106" name="Equation" r:id="rId3" imgW="1650960" imgH="965160" progId="Equation.DSMT4">
                   <p:embed/>
                 </p:oleObj>
               </mc:Choice>
@@ -5116,7 +5117,7 @@
           <a:graphicData uri="http://schemas.openxmlformats.org/presentationml/2006/ole">
             <mc:AlternateContent xmlns:mc="http://schemas.openxmlformats.org/markup-compatibility/2006">
               <mc:Choice xmlns:v="urn:schemas-microsoft-com:vml" Requires="v">
-                <p:oleObj spid="_x0000_s2105" name="Equation" r:id="rId5" imgW="2438280" imgH="914400" progId="Equation.DSMT4">
+                <p:oleObj spid="_x0000_s2107" name="Equation" r:id="rId5" imgW="2438280" imgH="914400" progId="Equation.DSMT4">
                   <p:embed/>
                 </p:oleObj>
               </mc:Choice>
@@ -5451,7 +5452,7 @@
             <a:graphicData uri="http://schemas.openxmlformats.org/presentationml/2006/ole">
               <mc:AlternateContent xmlns:mc="http://schemas.openxmlformats.org/markup-compatibility/2006">
                 <mc:Choice xmlns:v="urn:schemas-microsoft-com:vml" Requires="v">
-                  <p:oleObj spid="_x0000_s3108" name="Equation" r:id="rId3" imgW="1650960" imgH="965160" progId="Equation.DSMT4">
+                  <p:oleObj spid="_x0000_s3113" name="Equation" r:id="rId3" imgW="1650960" imgH="965160" progId="Equation.DSMT4">
                     <p:embed/>
                   </p:oleObj>
                 </mc:Choice>
@@ -5508,7 +5509,7 @@
             <a:graphicData uri="http://schemas.openxmlformats.org/presentationml/2006/ole">
               <mc:AlternateContent xmlns:mc="http://schemas.openxmlformats.org/markup-compatibility/2006">
                 <mc:Choice xmlns:v="urn:schemas-microsoft-com:vml" Requires="v">
-                  <p:oleObj spid="_x0000_s3109" name="Equation" r:id="rId5" imgW="1663560" imgH="914400" progId="Equation.DSMT4">
+                  <p:oleObj spid="_x0000_s3114" name="Equation" r:id="rId5" imgW="1663560" imgH="914400" progId="Equation.DSMT4">
                     <p:embed/>
                   </p:oleObj>
                 </mc:Choice>
@@ -5799,7 +5800,7 @@
             <a:graphicData uri="http://schemas.openxmlformats.org/presentationml/2006/ole">
               <mc:AlternateContent xmlns:mc="http://schemas.openxmlformats.org/markup-compatibility/2006">
                 <mc:Choice xmlns:v="urn:schemas-microsoft-com:vml" Requires="v">
-                  <p:oleObj spid="_x0000_s3110" name="Equation" r:id="rId7" imgW="672840" imgH="457200" progId="Equation.DSMT4">
+                  <p:oleObj spid="_x0000_s3115" name="Equation" r:id="rId7" imgW="672840" imgH="457200" progId="Equation.DSMT4">
                     <p:embed/>
                   </p:oleObj>
                 </mc:Choice>
@@ -5934,7 +5935,7 @@
             <a:graphicData uri="http://schemas.openxmlformats.org/presentationml/2006/ole">
               <mc:AlternateContent xmlns:mc="http://schemas.openxmlformats.org/markup-compatibility/2006">
                 <mc:Choice xmlns:v="urn:schemas-microsoft-com:vml" Requires="v">
-                  <p:oleObj spid="_x0000_s3111" name="Equation" r:id="rId9" imgW="1650960" imgH="965160" progId="Equation.DSMT4">
+                  <p:oleObj spid="_x0000_s3116" name="Equation" r:id="rId9" imgW="1650960" imgH="965160" progId="Equation.DSMT4">
                     <p:embed/>
                   </p:oleObj>
                 </mc:Choice>
@@ -5991,7 +5992,7 @@
             <a:graphicData uri="http://schemas.openxmlformats.org/presentationml/2006/ole">
               <mc:AlternateContent xmlns:mc="http://schemas.openxmlformats.org/markup-compatibility/2006">
                 <mc:Choice xmlns:v="urn:schemas-microsoft-com:vml" Requires="v">
-                  <p:oleObj spid="_x0000_s3112" name="Equation" r:id="rId10" imgW="1663560" imgH="914400" progId="Equation.DSMT4">
+                  <p:oleObj spid="_x0000_s3117" name="Equation" r:id="rId10" imgW="1663560" imgH="914400" progId="Equation.DSMT4">
                     <p:embed/>
                   </p:oleObj>
                 </mc:Choice>
@@ -6293,6 +6294,707 @@
       </p:grpSpPr>
       <p:grpSp>
         <p:nvGrpSpPr>
+          <p:cNvPr id="7" name="Group 6"/>
+          <p:cNvGrpSpPr/>
+          <p:nvPr/>
+        </p:nvGrpSpPr>
+        <p:grpSpPr>
+          <a:xfrm>
+            <a:off x="293370" y="285112"/>
+            <a:ext cx="5343214" cy="2231172"/>
+            <a:chOff x="293370" y="285112"/>
+            <a:chExt cx="5343214" cy="2231172"/>
+          </a:xfrm>
+        </p:grpSpPr>
+        <p:graphicFrame>
+          <p:nvGraphicFramePr>
+            <p:cNvPr id="22" name="Object 21"/>
+            <p:cNvGraphicFramePr>
+              <a:graphicFrameLocks noChangeAspect="1"/>
+            </p:cNvGraphicFramePr>
+            <p:nvPr>
+              <p:extLst>
+                <p:ext uri="{D42A27DB-BD31-4B8C-83A1-F6EECF244321}">
+                  <p14:modId xmlns:p14="http://schemas.microsoft.com/office/powerpoint/2010/main" val="1840638540"/>
+                </p:ext>
+              </p:extLst>
+            </p:nvPr>
+          </p:nvGraphicFramePr>
+          <p:xfrm>
+            <a:off x="3090234" y="1116109"/>
+            <a:ext cx="2546350" cy="1400175"/>
+          </p:xfrm>
+          <a:graphic>
+            <a:graphicData uri="http://schemas.openxmlformats.org/presentationml/2006/ole">
+              <mc:AlternateContent xmlns:mc="http://schemas.openxmlformats.org/markup-compatibility/2006">
+                <mc:Choice xmlns:v="urn:schemas-microsoft-com:vml" Requires="v">
+                  <p:oleObj spid="_x0000_s6150" name="Equation" r:id="rId3" imgW="1663560" imgH="914400" progId="Equation.DSMT4">
+                    <p:embed/>
+                  </p:oleObj>
+                </mc:Choice>
+                <mc:Fallback>
+                  <p:oleObj name="Equation" r:id="rId3" imgW="1663560" imgH="914400" progId="Equation.DSMT4">
+                    <p:embed/>
+                    <p:pic>
+                      <p:nvPicPr>
+                        <p:cNvPr id="0" name=""/>
+                        <p:cNvPicPr/>
+                        <p:nvPr/>
+                      </p:nvPicPr>
+                      <p:blipFill>
+                        <a:blip r:embed="rId4"/>
+                        <a:stretch>
+                          <a:fillRect/>
+                        </a:stretch>
+                      </p:blipFill>
+                      <p:spPr>
+                        <a:xfrm>
+                          <a:off x="3090234" y="1116109"/>
+                          <a:ext cx="2546350" cy="1400175"/>
+                        </a:xfrm>
+                        <a:prstGeom prst="rect">
+                          <a:avLst/>
+                        </a:prstGeom>
+                      </p:spPr>
+                    </p:pic>
+                  </p:oleObj>
+                </mc:Fallback>
+              </mc:AlternateContent>
+            </a:graphicData>
+          </a:graphic>
+        </p:graphicFrame>
+        <p:sp>
+          <p:nvSpPr>
+            <p:cNvPr id="3" name="Rectangle 2"/>
+            <p:cNvSpPr/>
+            <p:nvPr/>
+          </p:nvSpPr>
+          <p:spPr>
+            <a:xfrm>
+              <a:off x="2148252" y="285112"/>
+              <a:ext cx="1628330" cy="369332"/>
+            </a:xfrm>
+            <a:prstGeom prst="rect">
+              <a:avLst/>
+            </a:prstGeom>
+            <a:noFill/>
+          </p:spPr>
+          <p:txBody>
+            <a:bodyPr wrap="none" lIns="91440" tIns="45720" rIns="91440" bIns="45720">
+              <a:spAutoFit/>
+            </a:bodyPr>
+            <a:lstStyle/>
+            <a:p>
+              <a:pPr algn="ctr"/>
+              <a:r>
+                <a:rPr lang="en-US" b="0" cap="none" spc="0" dirty="0" smtClean="0">
+                  <a:ln w="0"/>
+                  <a:solidFill>
+                    <a:schemeClr val="accent1"/>
+                  </a:solidFill>
+                  <a:effectLst>
+                    <a:outerShdw blurRad="38100" dist="19050" dir="2700000" algn="tl" rotWithShape="0">
+                      <a:schemeClr val="dk1">
+                        <a:alpha val="40000"/>
+                      </a:schemeClr>
+                    </a:outerShdw>
+                  </a:effectLst>
+                  <a:latin typeface="Gill Sans MT" panose="020B0502020104020203" pitchFamily="34" charset="0"/>
+                </a:rPr>
+                <a:t>Random Effects</a:t>
+              </a:r>
+              <a:endParaRPr lang="en-US" b="0" cap="none" spc="0" dirty="0">
+                <a:ln w="0"/>
+                <a:solidFill>
+                  <a:schemeClr val="accent1"/>
+                </a:solidFill>
+                <a:effectLst>
+                  <a:outerShdw blurRad="38100" dist="19050" dir="2700000" algn="tl" rotWithShape="0">
+                    <a:schemeClr val="dk1">
+                      <a:alpha val="40000"/>
+                    </a:schemeClr>
+                  </a:outerShdw>
+                </a:effectLst>
+                <a:latin typeface="Gill Sans MT" panose="020B0502020104020203" pitchFamily="34" charset="0"/>
+              </a:endParaRPr>
+            </a:p>
+          </p:txBody>
+        </p:sp>
+        <p:graphicFrame>
+          <p:nvGraphicFramePr>
+            <p:cNvPr id="2" name="Object 1"/>
+            <p:cNvGraphicFramePr>
+              <a:graphicFrameLocks noChangeAspect="1"/>
+            </p:cNvGraphicFramePr>
+            <p:nvPr>
+              <p:extLst>
+                <p:ext uri="{D42A27DB-BD31-4B8C-83A1-F6EECF244321}">
+                  <p14:modId xmlns:p14="http://schemas.microsoft.com/office/powerpoint/2010/main" val="1530240272"/>
+                </p:ext>
+              </p:extLst>
+            </p:nvPr>
+          </p:nvGraphicFramePr>
+          <p:xfrm>
+            <a:off x="293370" y="1116109"/>
+            <a:ext cx="2546350" cy="1400175"/>
+          </p:xfrm>
+          <a:graphic>
+            <a:graphicData uri="http://schemas.openxmlformats.org/presentationml/2006/ole">
+              <mc:AlternateContent xmlns:mc="http://schemas.openxmlformats.org/markup-compatibility/2006">
+                <mc:Choice xmlns:v="urn:schemas-microsoft-com:vml" Requires="v">
+                  <p:oleObj spid="_x0000_s6151" name="Equation" r:id="rId5" imgW="1663560" imgH="914400" progId="Equation.DSMT4">
+                    <p:embed/>
+                  </p:oleObj>
+                </mc:Choice>
+                <mc:Fallback>
+                  <p:oleObj name="Equation" r:id="rId5" imgW="1663560" imgH="914400" progId="Equation.DSMT4">
+                    <p:embed/>
+                    <p:pic>
+                      <p:nvPicPr>
+                        <p:cNvPr id="0" name="Object 21"/>
+                        <p:cNvPicPr>
+                          <a:picLocks noChangeAspect="1" noChangeArrowheads="1"/>
+                        </p:cNvPicPr>
+                        <p:nvPr/>
+                      </p:nvPicPr>
+                      <p:blipFill>
+                        <a:blip r:embed="rId6">
+                          <a:extLst>
+                            <a:ext uri="{28A0092B-C50C-407E-A947-70E740481C1C}">
+                              <a14:useLocalDpi xmlns:a14="http://schemas.microsoft.com/office/drawing/2010/main" val="0"/>
+                            </a:ext>
+                          </a:extLst>
+                        </a:blip>
+                        <a:srcRect/>
+                        <a:stretch>
+                          <a:fillRect/>
+                        </a:stretch>
+                      </p:blipFill>
+                      <p:spPr bwMode="auto">
+                        <a:xfrm>
+                          <a:off x="293370" y="1116109"/>
+                          <a:ext cx="2546350" cy="1400175"/>
+                        </a:xfrm>
+                        <a:prstGeom prst="rect">
+                          <a:avLst/>
+                        </a:prstGeom>
+                        <a:noFill/>
+                        <a:ln>
+                          <a:noFill/>
+                        </a:ln>
+                        <a:extLst>
+                          <a:ext uri="{909E8E84-426E-40DD-AFC4-6F175D3DCCD1}">
+                            <a14:hiddenFill xmlns:a14="http://schemas.microsoft.com/office/drawing/2010/main">
+                              <a:solidFill>
+                                <a:srgbClr val="FFFFFF"/>
+                              </a:solidFill>
+                            </a14:hiddenFill>
+                          </a:ext>
+                          <a:ext uri="{91240B29-F687-4F45-9708-019B960494DF}">
+                            <a14:hiddenLine xmlns:a14="http://schemas.microsoft.com/office/drawing/2010/main" w="9525">
+                              <a:solidFill>
+                                <a:srgbClr val="000000"/>
+                              </a:solidFill>
+                              <a:miter lim="800000"/>
+                              <a:headEnd/>
+                              <a:tailEnd/>
+                            </a14:hiddenLine>
+                          </a:ext>
+                        </a:extLst>
+                      </p:spPr>
+                    </p:pic>
+                  </p:oleObj>
+                </mc:Fallback>
+              </mc:AlternateContent>
+            </a:graphicData>
+          </a:graphic>
+        </p:graphicFrame>
+        <p:sp>
+          <p:nvSpPr>
+            <p:cNvPr id="27" name="Rectangle 26"/>
+            <p:cNvSpPr/>
+            <p:nvPr/>
+          </p:nvSpPr>
+          <p:spPr>
+            <a:xfrm>
+              <a:off x="1177591" y="704944"/>
+              <a:ext cx="788357" cy="369332"/>
+            </a:xfrm>
+            <a:prstGeom prst="rect">
+              <a:avLst/>
+            </a:prstGeom>
+            <a:noFill/>
+          </p:spPr>
+          <p:txBody>
+            <a:bodyPr wrap="none" lIns="91440" tIns="45720" rIns="91440" bIns="45720">
+              <a:spAutoFit/>
+            </a:bodyPr>
+            <a:lstStyle/>
+            <a:p>
+              <a:pPr algn="ctr"/>
+              <a:r>
+                <a:rPr lang="en-US" b="0" cap="none" spc="0" dirty="0" smtClean="0">
+                  <a:ln w="0"/>
+                  <a:solidFill>
+                    <a:srgbClr val="CC0066"/>
+                  </a:solidFill>
+                  <a:effectLst>
+                    <a:outerShdw blurRad="38100" dist="19050" dir="2700000" algn="tl" rotWithShape="0">
+                      <a:schemeClr val="dk1">
+                        <a:alpha val="40000"/>
+                      </a:schemeClr>
+                    </a:outerShdw>
+                  </a:effectLst>
+                  <a:latin typeface="Gill Sans MT" panose="020B0502020104020203" pitchFamily="34" charset="0"/>
+                </a:rPr>
+                <a:t>female</a:t>
+              </a:r>
+              <a:endParaRPr lang="en-US" b="0" cap="none" spc="0" dirty="0">
+                <a:ln w="0"/>
+                <a:solidFill>
+                  <a:srgbClr val="CC0066"/>
+                </a:solidFill>
+                <a:effectLst>
+                  <a:outerShdw blurRad="38100" dist="19050" dir="2700000" algn="tl" rotWithShape="0">
+                    <a:schemeClr val="dk1">
+                      <a:alpha val="40000"/>
+                    </a:schemeClr>
+                  </a:outerShdw>
+                </a:effectLst>
+                <a:latin typeface="Gill Sans MT" panose="020B0502020104020203" pitchFamily="34" charset="0"/>
+              </a:endParaRPr>
+            </a:p>
+          </p:txBody>
+        </p:sp>
+        <p:sp>
+          <p:nvSpPr>
+            <p:cNvPr id="28" name="Rectangle 27"/>
+            <p:cNvSpPr/>
+            <p:nvPr/>
+          </p:nvSpPr>
+          <p:spPr>
+            <a:xfrm>
+              <a:off x="4053356" y="704944"/>
+              <a:ext cx="622286" cy="369332"/>
+            </a:xfrm>
+            <a:prstGeom prst="rect">
+              <a:avLst/>
+            </a:prstGeom>
+            <a:noFill/>
+          </p:spPr>
+          <p:txBody>
+            <a:bodyPr wrap="none" lIns="91440" tIns="45720" rIns="91440" bIns="45720">
+              <a:spAutoFit/>
+            </a:bodyPr>
+            <a:lstStyle/>
+            <a:p>
+              <a:pPr algn="ctr"/>
+              <a:r>
+                <a:rPr lang="en-US" b="0" cap="none" spc="0" dirty="0" smtClean="0">
+                  <a:ln w="0"/>
+                  <a:solidFill>
+                    <a:srgbClr val="CC0066"/>
+                  </a:solidFill>
+                  <a:effectLst>
+                    <a:outerShdw blurRad="38100" dist="19050" dir="2700000" algn="tl" rotWithShape="0">
+                      <a:schemeClr val="dk1">
+                        <a:alpha val="40000"/>
+                      </a:schemeClr>
+                    </a:outerShdw>
+                  </a:effectLst>
+                  <a:latin typeface="Gill Sans MT" panose="020B0502020104020203" pitchFamily="34" charset="0"/>
+                </a:rPr>
+                <a:t>male</a:t>
+              </a:r>
+              <a:endParaRPr lang="en-US" b="0" cap="none" spc="0" dirty="0">
+                <a:ln w="0"/>
+                <a:solidFill>
+                  <a:srgbClr val="CC0066"/>
+                </a:solidFill>
+                <a:effectLst>
+                  <a:outerShdw blurRad="38100" dist="19050" dir="2700000" algn="tl" rotWithShape="0">
+                    <a:schemeClr val="dk1">
+                      <a:alpha val="40000"/>
+                    </a:schemeClr>
+                  </a:outerShdw>
+                </a:effectLst>
+                <a:latin typeface="Gill Sans MT" panose="020B0502020104020203" pitchFamily="34" charset="0"/>
+              </a:endParaRPr>
+            </a:p>
+          </p:txBody>
+        </p:sp>
+      </p:grpSp>
+      <p:grpSp>
+        <p:nvGrpSpPr>
+          <p:cNvPr id="8" name="Group 7"/>
+          <p:cNvGrpSpPr/>
+          <p:nvPr/>
+        </p:nvGrpSpPr>
+        <p:grpSpPr>
+          <a:xfrm>
+            <a:off x="490681" y="3087478"/>
+            <a:ext cx="5259410" cy="2454451"/>
+            <a:chOff x="490681" y="3087478"/>
+            <a:chExt cx="5259410" cy="2454451"/>
+          </a:xfrm>
+        </p:grpSpPr>
+        <p:graphicFrame>
+          <p:nvGraphicFramePr>
+            <p:cNvPr id="4" name="Object 3"/>
+            <p:cNvGraphicFramePr>
+              <a:graphicFrameLocks noChangeAspect="1"/>
+            </p:cNvGraphicFramePr>
+            <p:nvPr>
+              <p:extLst>
+                <p:ext uri="{D42A27DB-BD31-4B8C-83A1-F6EECF244321}">
+                  <p14:modId xmlns:p14="http://schemas.microsoft.com/office/powerpoint/2010/main" val="2268502163"/>
+                </p:ext>
+              </p:extLst>
+            </p:nvPr>
+          </p:nvGraphicFramePr>
+          <p:xfrm>
+            <a:off x="3283706" y="3876642"/>
+            <a:ext cx="2466385" cy="1665287"/>
+          </p:xfrm>
+          <a:graphic>
+            <a:graphicData uri="http://schemas.openxmlformats.org/presentationml/2006/ole">
+              <mc:AlternateContent xmlns:mc="http://schemas.openxmlformats.org/markup-compatibility/2006">
+                <mc:Choice xmlns:v="urn:schemas-microsoft-com:vml" Requires="v">
+                  <p:oleObj spid="_x0000_s6152" name="Equation" r:id="rId7" imgW="672840" imgH="457200" progId="Equation.DSMT4">
+                    <p:embed/>
+                  </p:oleObj>
+                </mc:Choice>
+                <mc:Fallback>
+                  <p:oleObj name="Equation" r:id="rId7" imgW="672840" imgH="457200" progId="Equation.DSMT4">
+                    <p:embed/>
+                    <p:pic>
+                      <p:nvPicPr>
+                        <p:cNvPr id="0" name=""/>
+                        <p:cNvPicPr>
+                          <a:picLocks noChangeAspect="1" noChangeArrowheads="1"/>
+                        </p:cNvPicPr>
+                        <p:nvPr/>
+                      </p:nvPicPr>
+                      <p:blipFill>
+                        <a:blip r:embed="rId8"/>
+                        <a:srcRect/>
+                        <a:stretch>
+                          <a:fillRect/>
+                        </a:stretch>
+                      </p:blipFill>
+                      <p:spPr bwMode="auto">
+                        <a:xfrm>
+                          <a:off x="3283706" y="3876642"/>
+                          <a:ext cx="2466385" cy="1665287"/>
+                        </a:xfrm>
+                        <a:prstGeom prst="rect">
+                          <a:avLst/>
+                        </a:prstGeom>
+                        <a:noFill/>
+                        <a:ln>
+                          <a:noFill/>
+                        </a:ln>
+                      </p:spPr>
+                    </p:pic>
+                  </p:oleObj>
+                </mc:Fallback>
+              </mc:AlternateContent>
+            </a:graphicData>
+          </a:graphic>
+        </p:graphicFrame>
+        <p:sp>
+          <p:nvSpPr>
+            <p:cNvPr id="29" name="Rectangle 28"/>
+            <p:cNvSpPr/>
+            <p:nvPr/>
+          </p:nvSpPr>
+          <p:spPr>
+            <a:xfrm>
+              <a:off x="2592879" y="3087478"/>
+              <a:ext cx="1043877" cy="369332"/>
+            </a:xfrm>
+            <a:prstGeom prst="rect">
+              <a:avLst/>
+            </a:prstGeom>
+            <a:noFill/>
+          </p:spPr>
+          <p:txBody>
+            <a:bodyPr wrap="none" lIns="91440" tIns="45720" rIns="91440" bIns="45720">
+              <a:spAutoFit/>
+            </a:bodyPr>
+            <a:lstStyle/>
+            <a:p>
+              <a:pPr algn="ctr"/>
+              <a:r>
+                <a:rPr lang="en-US" b="0" cap="none" spc="0" dirty="0" smtClean="0">
+                  <a:ln w="0"/>
+                  <a:solidFill>
+                    <a:schemeClr val="accent1"/>
+                  </a:solidFill>
+                  <a:effectLst>
+                    <a:outerShdw blurRad="38100" dist="19050" dir="2700000" algn="tl" rotWithShape="0">
+                      <a:schemeClr val="dk1">
+                        <a:alpha val="40000"/>
+                      </a:schemeClr>
+                    </a:outerShdw>
+                  </a:effectLst>
+                  <a:latin typeface="Gill Sans MT" panose="020B0502020104020203" pitchFamily="34" charset="0"/>
+                </a:rPr>
+                <a:t>Residuals</a:t>
+              </a:r>
+              <a:endParaRPr lang="en-US" b="0" cap="none" spc="0" dirty="0">
+                <a:ln w="0"/>
+                <a:solidFill>
+                  <a:schemeClr val="accent1"/>
+                </a:solidFill>
+                <a:effectLst>
+                  <a:outerShdw blurRad="38100" dist="19050" dir="2700000" algn="tl" rotWithShape="0">
+                    <a:schemeClr val="dk1">
+                      <a:alpha val="40000"/>
+                    </a:schemeClr>
+                  </a:outerShdw>
+                </a:effectLst>
+                <a:latin typeface="Gill Sans MT" panose="020B0502020104020203" pitchFamily="34" charset="0"/>
+              </a:endParaRPr>
+            </a:p>
+          </p:txBody>
+        </p:sp>
+        <p:sp>
+          <p:nvSpPr>
+            <p:cNvPr id="39" name="Rectangle 38"/>
+            <p:cNvSpPr/>
+            <p:nvPr/>
+          </p:nvSpPr>
+          <p:spPr>
+            <a:xfrm>
+              <a:off x="1329991" y="3507310"/>
+              <a:ext cx="788357" cy="369332"/>
+            </a:xfrm>
+            <a:prstGeom prst="rect">
+              <a:avLst/>
+            </a:prstGeom>
+            <a:noFill/>
+          </p:spPr>
+          <p:txBody>
+            <a:bodyPr wrap="none" lIns="91440" tIns="45720" rIns="91440" bIns="45720">
+              <a:spAutoFit/>
+            </a:bodyPr>
+            <a:lstStyle/>
+            <a:p>
+              <a:pPr algn="ctr"/>
+              <a:r>
+                <a:rPr lang="en-US" b="0" cap="none" spc="0" dirty="0" smtClean="0">
+                  <a:ln w="0"/>
+                  <a:solidFill>
+                    <a:srgbClr val="CC0066"/>
+                  </a:solidFill>
+                  <a:effectLst>
+                    <a:outerShdw blurRad="38100" dist="19050" dir="2700000" algn="tl" rotWithShape="0">
+                      <a:schemeClr val="dk1">
+                        <a:alpha val="40000"/>
+                      </a:schemeClr>
+                    </a:outerShdw>
+                  </a:effectLst>
+                  <a:latin typeface="Gill Sans MT" panose="020B0502020104020203" pitchFamily="34" charset="0"/>
+                </a:rPr>
+                <a:t>female</a:t>
+              </a:r>
+              <a:endParaRPr lang="en-US" b="0" cap="none" spc="0" dirty="0">
+                <a:ln w="0"/>
+                <a:solidFill>
+                  <a:srgbClr val="CC0066"/>
+                </a:solidFill>
+                <a:effectLst>
+                  <a:outerShdw blurRad="38100" dist="19050" dir="2700000" algn="tl" rotWithShape="0">
+                    <a:schemeClr val="dk1">
+                      <a:alpha val="40000"/>
+                    </a:schemeClr>
+                  </a:outerShdw>
+                </a:effectLst>
+                <a:latin typeface="Gill Sans MT" panose="020B0502020104020203" pitchFamily="34" charset="0"/>
+              </a:endParaRPr>
+            </a:p>
+          </p:txBody>
+        </p:sp>
+        <p:sp>
+          <p:nvSpPr>
+            <p:cNvPr id="40" name="Rectangle 39"/>
+            <p:cNvSpPr/>
+            <p:nvPr/>
+          </p:nvSpPr>
+          <p:spPr>
+            <a:xfrm>
+              <a:off x="4205756" y="3507310"/>
+              <a:ext cx="622286" cy="369332"/>
+            </a:xfrm>
+            <a:prstGeom prst="rect">
+              <a:avLst/>
+            </a:prstGeom>
+            <a:noFill/>
+          </p:spPr>
+          <p:txBody>
+            <a:bodyPr wrap="none" lIns="91440" tIns="45720" rIns="91440" bIns="45720">
+              <a:spAutoFit/>
+            </a:bodyPr>
+            <a:lstStyle/>
+            <a:p>
+              <a:pPr algn="ctr"/>
+              <a:r>
+                <a:rPr lang="en-US" b="0" cap="none" spc="0" dirty="0" smtClean="0">
+                  <a:ln w="0"/>
+                  <a:solidFill>
+                    <a:srgbClr val="CC0066"/>
+                  </a:solidFill>
+                  <a:effectLst>
+                    <a:outerShdw blurRad="38100" dist="19050" dir="2700000" algn="tl" rotWithShape="0">
+                      <a:schemeClr val="dk1">
+                        <a:alpha val="40000"/>
+                      </a:schemeClr>
+                    </a:outerShdw>
+                  </a:effectLst>
+                  <a:latin typeface="Gill Sans MT" panose="020B0502020104020203" pitchFamily="34" charset="0"/>
+                </a:rPr>
+                <a:t>male</a:t>
+              </a:r>
+              <a:endParaRPr lang="en-US" b="0" cap="none" spc="0" dirty="0">
+                <a:ln w="0"/>
+                <a:solidFill>
+                  <a:srgbClr val="CC0066"/>
+                </a:solidFill>
+                <a:effectLst>
+                  <a:outerShdw blurRad="38100" dist="19050" dir="2700000" algn="tl" rotWithShape="0">
+                    <a:schemeClr val="dk1">
+                      <a:alpha val="40000"/>
+                    </a:schemeClr>
+                  </a:outerShdw>
+                </a:effectLst>
+                <a:latin typeface="Gill Sans MT" panose="020B0502020104020203" pitchFamily="34" charset="0"/>
+              </a:endParaRPr>
+            </a:p>
+          </p:txBody>
+        </p:sp>
+        <p:graphicFrame>
+          <p:nvGraphicFramePr>
+            <p:cNvPr id="6" name="Object 5"/>
+            <p:cNvGraphicFramePr>
+              <a:graphicFrameLocks noChangeAspect="1"/>
+            </p:cNvGraphicFramePr>
+            <p:nvPr>
+              <p:extLst>
+                <p:ext uri="{D42A27DB-BD31-4B8C-83A1-F6EECF244321}">
+                  <p14:modId xmlns:p14="http://schemas.microsoft.com/office/powerpoint/2010/main" val="2458149830"/>
+                </p:ext>
+              </p:extLst>
+            </p:nvPr>
+          </p:nvGraphicFramePr>
+          <p:xfrm>
+            <a:off x="490681" y="3876642"/>
+            <a:ext cx="2466975" cy="1665287"/>
+          </p:xfrm>
+          <a:graphic>
+            <a:graphicData uri="http://schemas.openxmlformats.org/presentationml/2006/ole">
+              <mc:AlternateContent xmlns:mc="http://schemas.openxmlformats.org/markup-compatibility/2006">
+                <mc:Choice xmlns:v="urn:schemas-microsoft-com:vml" Requires="v">
+                  <p:oleObj spid="_x0000_s6153" name="Equation" r:id="rId9" imgW="672840" imgH="457200" progId="Equation.DSMT4">
+                    <p:embed/>
+                  </p:oleObj>
+                </mc:Choice>
+                <mc:Fallback>
+                  <p:oleObj name="Equation" r:id="rId9" imgW="672840" imgH="457200" progId="Equation.DSMT4">
+                    <p:embed/>
+                    <p:pic>
+                      <p:nvPicPr>
+                        <p:cNvPr id="0" name="Object 3"/>
+                        <p:cNvPicPr>
+                          <a:picLocks noChangeAspect="1" noChangeArrowheads="1"/>
+                        </p:cNvPicPr>
+                        <p:nvPr/>
+                      </p:nvPicPr>
+                      <p:blipFill>
+                        <a:blip r:embed="rId10">
+                          <a:extLst>
+                            <a:ext uri="{28A0092B-C50C-407E-A947-70E740481C1C}">
+                              <a14:useLocalDpi xmlns:a14="http://schemas.microsoft.com/office/drawing/2010/main" val="0"/>
+                            </a:ext>
+                          </a:extLst>
+                        </a:blip>
+                        <a:srcRect/>
+                        <a:stretch>
+                          <a:fillRect/>
+                        </a:stretch>
+                      </p:blipFill>
+                      <p:spPr bwMode="auto">
+                        <a:xfrm>
+                          <a:off x="490681" y="3876642"/>
+                          <a:ext cx="2466975" cy="1665287"/>
+                        </a:xfrm>
+                        <a:prstGeom prst="rect">
+                          <a:avLst/>
+                        </a:prstGeom>
+                        <a:noFill/>
+                        <a:ln>
+                          <a:noFill/>
+                        </a:ln>
+                        <a:extLst>
+                          <a:ext uri="{909E8E84-426E-40DD-AFC4-6F175D3DCCD1}">
+                            <a14:hiddenFill xmlns:a14="http://schemas.microsoft.com/office/drawing/2010/main">
+                              <a:solidFill>
+                                <a:srgbClr val="FFFFFF"/>
+                              </a:solidFill>
+                            </a14:hiddenFill>
+                          </a:ext>
+                          <a:ext uri="{91240B29-F687-4F45-9708-019B960494DF}">
+                            <a14:hiddenLine xmlns:a14="http://schemas.microsoft.com/office/drawing/2010/main" w="9525">
+                              <a:solidFill>
+                                <a:srgbClr val="000000"/>
+                              </a:solidFill>
+                              <a:miter lim="800000"/>
+                              <a:headEnd/>
+                              <a:tailEnd/>
+                            </a14:hiddenLine>
+                          </a:ext>
+                        </a:extLst>
+                      </p:spPr>
+                    </p:pic>
+                  </p:oleObj>
+                </mc:Fallback>
+              </mc:AlternateContent>
+            </a:graphicData>
+          </a:graphic>
+        </p:graphicFrame>
+      </p:grpSp>
+    </p:spTree>
+    <p:extLst>
+      <p:ext uri="{BB962C8B-B14F-4D97-AF65-F5344CB8AC3E}">
+        <p14:creationId xmlns:p14="http://schemas.microsoft.com/office/powerpoint/2010/main" val="1205896389"/>
+      </p:ext>
+    </p:extLst>
+  </p:cSld>
+  <p:clrMapOvr>
+    <a:masterClrMapping/>
+  </p:clrMapOvr>
+</p:sld>
+</file>
+
+<file path=ppt/slides/slide7.xml><?xml version="1.0" encoding="utf-8"?>
+<p:sld xmlns:a="http://schemas.openxmlformats.org/drawingml/2006/main" xmlns:r="http://schemas.openxmlformats.org/officeDocument/2006/relationships" xmlns:p="http://schemas.openxmlformats.org/presentationml/2006/main">
+  <p:cSld>
+    <p:spTree>
+      <p:nvGrpSpPr>
+        <p:cNvPr id="1" name=""/>
+        <p:cNvGrpSpPr/>
+        <p:nvPr/>
+      </p:nvGrpSpPr>
+      <p:grpSpPr>
+        <a:xfrm>
+          <a:off x="0" y="0"/>
+          <a:ext cx="0" cy="0"/>
+          <a:chOff x="0" y="0"/>
+          <a:chExt cx="0" cy="0"/>
+        </a:xfrm>
+      </p:grpSpPr>
+      <p:grpSp>
+        <p:nvGrpSpPr>
           <p:cNvPr id="2" name="Group 1"/>
           <p:cNvGrpSpPr/>
           <p:nvPr/>
@@ -6327,7 +7029,7 @@
             <a:graphicData uri="http://schemas.openxmlformats.org/presentationml/2006/ole">
               <mc:AlternateContent xmlns:mc="http://schemas.openxmlformats.org/markup-compatibility/2006">
                 <mc:Choice xmlns:v="urn:schemas-microsoft-com:vml" Requires="v">
-                  <p:oleObj spid="_x0000_s4170" name="Equation" r:id="rId3" imgW="1854000" imgH="228600" progId="Equation.DSMT4">
+                  <p:oleObj spid="_x0000_s4177" name="Equation" r:id="rId3" imgW="1854000" imgH="228600" progId="Equation.DSMT4">
                     <p:embed/>
                   </p:oleObj>
                 </mc:Choice>
@@ -6384,7 +7086,7 @@
             <a:graphicData uri="http://schemas.openxmlformats.org/presentationml/2006/ole">
               <mc:AlternateContent xmlns:mc="http://schemas.openxmlformats.org/markup-compatibility/2006">
                 <mc:Choice xmlns:v="urn:schemas-microsoft-com:vml" Requires="v">
-                  <p:oleObj spid="_x0000_s4171" name="Equation" r:id="rId5" imgW="2425680" imgH="241200" progId="Equation.DSMT4">
+                  <p:oleObj spid="_x0000_s4178" name="Equation" r:id="rId5" imgW="2425680" imgH="241200" progId="Equation.DSMT4">
                     <p:embed/>
                   </p:oleObj>
                 </mc:Choice>
@@ -6441,7 +7143,7 @@
             <a:graphicData uri="http://schemas.openxmlformats.org/presentationml/2006/ole">
               <mc:AlternateContent xmlns:mc="http://schemas.openxmlformats.org/markup-compatibility/2006">
                 <mc:Choice xmlns:v="urn:schemas-microsoft-com:vml" Requires="v">
-                  <p:oleObj spid="_x0000_s4172" name="Equation" r:id="rId7" imgW="2374560" imgH="241200" progId="Equation.DSMT4">
+                  <p:oleObj spid="_x0000_s4179" name="Equation" r:id="rId7" imgW="2374560" imgH="241200" progId="Equation.DSMT4">
                     <p:embed/>
                   </p:oleObj>
                 </mc:Choice>
@@ -6498,7 +7200,7 @@
             <a:graphicData uri="http://schemas.openxmlformats.org/presentationml/2006/ole">
               <mc:AlternateContent xmlns:mc="http://schemas.openxmlformats.org/markup-compatibility/2006">
                 <mc:Choice xmlns:v="urn:schemas-microsoft-com:vml" Requires="v">
-                  <p:oleObj spid="_x0000_s4173" name="Equation" r:id="rId9" imgW="2425680" imgH="241200" progId="Equation.DSMT4">
+                  <p:oleObj spid="_x0000_s4180" name="Equation" r:id="rId9" imgW="2425680" imgH="241200" progId="Equation.DSMT4">
                     <p:embed/>
                   </p:oleObj>
                 </mc:Choice>
@@ -6555,7 +7257,7 @@
             <a:graphicData uri="http://schemas.openxmlformats.org/presentationml/2006/ole">
               <mc:AlternateContent xmlns:mc="http://schemas.openxmlformats.org/markup-compatibility/2006">
                 <mc:Choice xmlns:v="urn:schemas-microsoft-com:vml" Requires="v">
-                  <p:oleObj spid="_x0000_s4174" name="Equation" r:id="rId11" imgW="2361960" imgH="241200" progId="Equation.DSMT4">
+                  <p:oleObj spid="_x0000_s4181" name="Equation" r:id="rId11" imgW="2361960" imgH="241200" progId="Equation.DSMT4">
                     <p:embed/>
                   </p:oleObj>
                 </mc:Choice>
@@ -6623,7 +7325,7 @@
             <a:graphicData uri="http://schemas.openxmlformats.org/presentationml/2006/ole">
               <mc:AlternateContent xmlns:mc="http://schemas.openxmlformats.org/markup-compatibility/2006">
                 <mc:Choice xmlns:v="urn:schemas-microsoft-com:vml" Requires="v">
-                  <p:oleObj spid="_x0000_s4175" name="Equation" r:id="rId13" imgW="1650960" imgH="965160" progId="Equation.DSMT4">
+                  <p:oleObj spid="_x0000_s4182" name="Equation" r:id="rId13" imgW="1650960" imgH="965160" progId="Equation.DSMT4">
                     <p:embed/>
                   </p:oleObj>
                 </mc:Choice>
@@ -6680,7 +7382,7 @@
             <a:graphicData uri="http://schemas.openxmlformats.org/presentationml/2006/ole">
               <mc:AlternateContent xmlns:mc="http://schemas.openxmlformats.org/markup-compatibility/2006">
                 <mc:Choice xmlns:v="urn:schemas-microsoft-com:vml" Requires="v">
-                  <p:oleObj spid="_x0000_s4176" name="Equation" r:id="rId15" imgW="2438280" imgH="914400" progId="Equation.DSMT4">
+                  <p:oleObj spid="_x0000_s4183" name="Equation" r:id="rId15" imgW="2438280" imgH="914400" progId="Equation.DSMT4">
                     <p:embed/>
                   </p:oleObj>
                 </mc:Choice>
@@ -6849,7 +7551,7 @@
 </p:sld>
 </file>
 
-<file path=ppt/slides/slide7.xml><?xml version="1.0" encoding="utf-8"?>
+<file path=ppt/slides/slide8.xml><?xml version="1.0" encoding="utf-8"?>
 <p:sld xmlns:a="http://schemas.openxmlformats.org/drawingml/2006/main" xmlns:r="http://schemas.openxmlformats.org/officeDocument/2006/relationships" xmlns:p="http://schemas.openxmlformats.org/presentationml/2006/main">
   <p:cSld>
     <p:spTree>
@@ -6888,7 +7590,7 @@
           <a:graphicData uri="http://schemas.openxmlformats.org/presentationml/2006/ole">
             <mc:AlternateContent xmlns:mc="http://schemas.openxmlformats.org/markup-compatibility/2006">
               <mc:Choice xmlns:v="urn:schemas-microsoft-com:vml" Requires="v">
-                <p:oleObj spid="_x0000_s5142" name="Equation" r:id="rId3" imgW="1854000" imgH="228600" progId="Equation.DSMT4">
+                <p:oleObj spid="_x0000_s5147" name="Equation" r:id="rId3" imgW="1854000" imgH="228600" progId="Equation.DSMT4">
                   <p:embed/>
                 </p:oleObj>
               </mc:Choice>
@@ -6945,7 +7647,7 @@
           <a:graphicData uri="http://schemas.openxmlformats.org/presentationml/2006/ole">
             <mc:AlternateContent xmlns:mc="http://schemas.openxmlformats.org/markup-compatibility/2006">
               <mc:Choice xmlns:v="urn:schemas-microsoft-com:vml" Requires="v">
-                <p:oleObj spid="_x0000_s5143" name="Equation" r:id="rId5" imgW="2425680" imgH="241200" progId="Equation.DSMT4">
+                <p:oleObj spid="_x0000_s5148" name="Equation" r:id="rId5" imgW="2425680" imgH="241200" progId="Equation.DSMT4">
                   <p:embed/>
                 </p:oleObj>
               </mc:Choice>
@@ -7002,7 +7704,7 @@
           <a:graphicData uri="http://schemas.openxmlformats.org/presentationml/2006/ole">
             <mc:AlternateContent xmlns:mc="http://schemas.openxmlformats.org/markup-compatibility/2006">
               <mc:Choice xmlns:v="urn:schemas-microsoft-com:vml" Requires="v">
-                <p:oleObj spid="_x0000_s5144" name="Equation" r:id="rId7" imgW="2374560" imgH="241200" progId="Equation.DSMT4">
+                <p:oleObj spid="_x0000_s5149" name="Equation" r:id="rId7" imgW="2374560" imgH="241200" progId="Equation.DSMT4">
                   <p:embed/>
                 </p:oleObj>
               </mc:Choice>
@@ -7059,7 +7761,7 @@
           <a:graphicData uri="http://schemas.openxmlformats.org/presentationml/2006/ole">
             <mc:AlternateContent xmlns:mc="http://schemas.openxmlformats.org/markup-compatibility/2006">
               <mc:Choice xmlns:v="urn:schemas-microsoft-com:vml" Requires="v">
-                <p:oleObj spid="_x0000_s5145" name="Equation" r:id="rId9" imgW="2425680" imgH="241200" progId="Equation.DSMT4">
+                <p:oleObj spid="_x0000_s5150" name="Equation" r:id="rId9" imgW="2425680" imgH="241200" progId="Equation.DSMT4">
                   <p:embed/>
                 </p:oleObj>
               </mc:Choice>
@@ -7116,7 +7818,7 @@
           <a:graphicData uri="http://schemas.openxmlformats.org/presentationml/2006/ole">
             <mc:AlternateContent xmlns:mc="http://schemas.openxmlformats.org/markup-compatibility/2006">
               <mc:Choice xmlns:v="urn:schemas-microsoft-com:vml" Requires="v">
-                <p:oleObj spid="_x0000_s5146" name="Equation" r:id="rId11" imgW="2361960" imgH="241200" progId="Equation.DSMT4">
+                <p:oleObj spid="_x0000_s5151" name="Equation" r:id="rId11" imgW="2361960" imgH="241200" progId="Equation.DSMT4">
                   <p:embed/>
                 </p:oleObj>
               </mc:Choice>
@@ -7164,7 +7866,7 @@
 </p:sld>
 </file>
 
-<file path=ppt/slides/slide8.xml><?xml version="1.0" encoding="utf-8"?>
+<file path=ppt/slides/slide9.xml><?xml version="1.0" encoding="utf-8"?>
 <p:sld xmlns:a="http://schemas.openxmlformats.org/drawingml/2006/main" xmlns:r="http://schemas.openxmlformats.org/officeDocument/2006/relationships" xmlns:p="http://schemas.openxmlformats.org/presentationml/2006/main">
   <p:cSld>
     <p:spTree>
@@ -7449,7 +8151,7 @@
   <a:extraClrSchemeLst/>
   <a:extLst>
     <a:ext uri="{05A4C25C-085E-4340-85A3-A5531E510DB2}">
-      <thm15:themeFamily xmlns:thm15="http://schemas.microsoft.com/office/thememl/2012/main" xmlns="" name="Office Theme" id="{62F939B6-93AF-4DB8-9C6B-D6C7DFDC589F}" vid="{4A3C46E8-61CC-4603-A589-7422A47A8E4A}"/>
+      <thm15:themeFamily xmlns="" xmlns:thm15="http://schemas.microsoft.com/office/thememl/2012/main" name="Office Theme" id="{62F939B6-93AF-4DB8-9C6B-D6C7DFDC589F}" vid="{4A3C46E8-61CC-4603-A589-7422A47A8E4A}"/>
     </a:ext>
   </a:extLst>
 </a:theme>

</xml_diff>

<commit_message>
#46, updated reports after re-generation
</commit_message>
<xml_diff>
--- a/libs/materials/naming_convention.pptx
+++ b/libs/materials/naming_convention.pptx
@@ -279,7 +279,7 @@
           <a:p>
             <a:fld id="{FFC3AEC4-2EDB-40EB-AFB2-2248CB6E3774}" type="datetimeFigureOut">
               <a:rPr lang="en-US" smtClean="0"/>
-              <a:t>7/12/2015</a:t>
+              <a:t>7/14/2015</a:t>
             </a:fld>
             <a:endParaRPr lang="en-US"/>
           </a:p>
@@ -449,7 +449,7 @@
           <a:p>
             <a:fld id="{FFC3AEC4-2EDB-40EB-AFB2-2248CB6E3774}" type="datetimeFigureOut">
               <a:rPr lang="en-US" smtClean="0"/>
-              <a:t>7/12/2015</a:t>
+              <a:t>7/14/2015</a:t>
             </a:fld>
             <a:endParaRPr lang="en-US"/>
           </a:p>
@@ -629,7 +629,7 @@
           <a:p>
             <a:fld id="{FFC3AEC4-2EDB-40EB-AFB2-2248CB6E3774}" type="datetimeFigureOut">
               <a:rPr lang="en-US" smtClean="0"/>
-              <a:t>7/12/2015</a:t>
+              <a:t>7/14/2015</a:t>
             </a:fld>
             <a:endParaRPr lang="en-US"/>
           </a:p>
@@ -799,7 +799,7 @@
           <a:p>
             <a:fld id="{FFC3AEC4-2EDB-40EB-AFB2-2248CB6E3774}" type="datetimeFigureOut">
               <a:rPr lang="en-US" smtClean="0"/>
-              <a:t>7/12/2015</a:t>
+              <a:t>7/14/2015</a:t>
             </a:fld>
             <a:endParaRPr lang="en-US"/>
           </a:p>
@@ -1045,7 +1045,7 @@
           <a:p>
             <a:fld id="{FFC3AEC4-2EDB-40EB-AFB2-2248CB6E3774}" type="datetimeFigureOut">
               <a:rPr lang="en-US" smtClean="0"/>
-              <a:t>7/12/2015</a:t>
+              <a:t>7/14/2015</a:t>
             </a:fld>
             <a:endParaRPr lang="en-US"/>
           </a:p>
@@ -1277,7 +1277,7 @@
           <a:p>
             <a:fld id="{FFC3AEC4-2EDB-40EB-AFB2-2248CB6E3774}" type="datetimeFigureOut">
               <a:rPr lang="en-US" smtClean="0"/>
-              <a:t>7/12/2015</a:t>
+              <a:t>7/14/2015</a:t>
             </a:fld>
             <a:endParaRPr lang="en-US"/>
           </a:p>
@@ -1644,7 +1644,7 @@
           <a:p>
             <a:fld id="{FFC3AEC4-2EDB-40EB-AFB2-2248CB6E3774}" type="datetimeFigureOut">
               <a:rPr lang="en-US" smtClean="0"/>
-              <a:t>7/12/2015</a:t>
+              <a:t>7/14/2015</a:t>
             </a:fld>
             <a:endParaRPr lang="en-US"/>
           </a:p>
@@ -1762,7 +1762,7 @@
           <a:p>
             <a:fld id="{FFC3AEC4-2EDB-40EB-AFB2-2248CB6E3774}" type="datetimeFigureOut">
               <a:rPr lang="en-US" smtClean="0"/>
-              <a:t>7/12/2015</a:t>
+              <a:t>7/14/2015</a:t>
             </a:fld>
             <a:endParaRPr lang="en-US"/>
           </a:p>
@@ -1857,7 +1857,7 @@
           <a:p>
             <a:fld id="{FFC3AEC4-2EDB-40EB-AFB2-2248CB6E3774}" type="datetimeFigureOut">
               <a:rPr lang="en-US" smtClean="0"/>
-              <a:t>7/12/2015</a:t>
+              <a:t>7/14/2015</a:t>
             </a:fld>
             <a:endParaRPr lang="en-US"/>
           </a:p>
@@ -2134,7 +2134,7 @@
           <a:p>
             <a:fld id="{FFC3AEC4-2EDB-40EB-AFB2-2248CB6E3774}" type="datetimeFigureOut">
               <a:rPr lang="en-US" smtClean="0"/>
-              <a:t>7/12/2015</a:t>
+              <a:t>7/14/2015</a:t>
             </a:fld>
             <a:endParaRPr lang="en-US"/>
           </a:p>
@@ -2387,7 +2387,7 @@
           <a:p>
             <a:fld id="{FFC3AEC4-2EDB-40EB-AFB2-2248CB6E3774}" type="datetimeFigureOut">
               <a:rPr lang="en-US" smtClean="0"/>
-              <a:t>7/12/2015</a:t>
+              <a:t>7/14/2015</a:t>
             </a:fld>
             <a:endParaRPr lang="en-US"/>
           </a:p>
@@ -2600,7 +2600,7 @@
           <a:p>
             <a:fld id="{FFC3AEC4-2EDB-40EB-AFB2-2248CB6E3774}" type="datetimeFigureOut">
               <a:rPr lang="en-US" smtClean="0"/>
-              <a:t>7/12/2015</a:t>
+              <a:t>7/14/2015</a:t>
             </a:fld>
             <a:endParaRPr lang="en-US"/>
           </a:p>
@@ -4523,7 +4523,7 @@
             <a:graphicData uri="http://schemas.openxmlformats.org/presentationml/2006/ole">
               <mc:AlternateContent xmlns:mc="http://schemas.openxmlformats.org/markup-compatibility/2006">
                 <mc:Choice xmlns:v="urn:schemas-microsoft-com:vml" Requires="v">
-                  <p:oleObj spid="_x0000_s7189" name="Equation" r:id="rId3" imgW="1650960" imgH="965160" progId="Equation.DSMT4">
+                  <p:oleObj spid="_x0000_s7206" name="Equation" r:id="rId3" imgW="1650960" imgH="965160" progId="Equation.DSMT4">
                     <p:embed/>
                   </p:oleObj>
                 </mc:Choice>
@@ -4567,7 +4567,7 @@
             <p:nvPr>
               <p:extLst>
                 <p:ext uri="{D42A27DB-BD31-4B8C-83A1-F6EECF244321}">
-                  <p14:modId xmlns:p14="http://schemas.microsoft.com/office/powerpoint/2010/main" val="3086599464"/>
+                  <p14:modId xmlns:p14="http://schemas.microsoft.com/office/powerpoint/2010/main" val="452516793"/>
                 </p:ext>
               </p:extLst>
             </p:nvPr>
@@ -4580,7 +4580,7 @@
             <a:graphicData uri="http://schemas.openxmlformats.org/presentationml/2006/ole">
               <mc:AlternateContent xmlns:mc="http://schemas.openxmlformats.org/markup-compatibility/2006">
                 <mc:Choice xmlns:v="urn:schemas-microsoft-com:vml" Requires="v">
-                  <p:oleObj spid="_x0000_s7190" name="Equation" r:id="rId5" imgW="1663560" imgH="914400" progId="Equation.DSMT4">
+                  <p:oleObj spid="_x0000_s7207" name="Equation" r:id="rId5" imgW="1663560" imgH="914400" progId="Equation.DSMT4">
                     <p:embed/>
                   </p:oleObj>
                 </mc:Choice>
@@ -4951,7 +4951,7 @@
             <a:graphicData uri="http://schemas.openxmlformats.org/presentationml/2006/ole">
               <mc:AlternateContent xmlns:mc="http://schemas.openxmlformats.org/markup-compatibility/2006">
                 <mc:Choice xmlns:v="urn:schemas-microsoft-com:vml" Requires="v">
-                  <p:oleObj spid="_x0000_s7191" name="Equation" r:id="rId7" imgW="749160" imgH="457200" progId="Equation.DSMT4">
+                  <p:oleObj spid="_x0000_s7208" name="Equation" r:id="rId7" imgW="749160" imgH="457200" progId="Equation.DSMT4">
                     <p:embed/>
                   </p:oleObj>
                 </mc:Choice>
@@ -5111,10 +5111,10 @@
         </p:nvGrpSpPr>
         <p:grpSpPr>
           <a:xfrm>
-            <a:off x="3095342" y="1588679"/>
-            <a:ext cx="4901859" cy="1995159"/>
-            <a:chOff x="2858578" y="1384572"/>
-            <a:chExt cx="4901859" cy="1995159"/>
+            <a:off x="3159505" y="1581585"/>
+            <a:ext cx="4513819" cy="1996824"/>
+            <a:chOff x="3290134" y="1361149"/>
+            <a:chExt cx="4513819" cy="1996824"/>
           </a:xfrm>
         </p:grpSpPr>
         <p:graphicFrame>
@@ -5126,20 +5126,20 @@
             <p:nvPr>
               <p:extLst>
                 <p:ext uri="{D42A27DB-BD31-4B8C-83A1-F6EECF244321}">
-                  <p14:modId xmlns:p14="http://schemas.microsoft.com/office/powerpoint/2010/main" val="635471417"/>
+                  <p14:modId xmlns:p14="http://schemas.microsoft.com/office/powerpoint/2010/main" val="1327474678"/>
                 </p:ext>
               </p:extLst>
             </p:nvPr>
           </p:nvGraphicFramePr>
           <p:xfrm>
-            <a:off x="2939071" y="2185688"/>
+            <a:off x="3290134" y="2171564"/>
             <a:ext cx="3189472" cy="392925"/>
           </p:xfrm>
           <a:graphic>
             <a:graphicData uri="http://schemas.openxmlformats.org/presentationml/2006/ole">
               <mc:AlternateContent xmlns:mc="http://schemas.openxmlformats.org/markup-compatibility/2006">
                 <mc:Choice xmlns:v="urn:schemas-microsoft-com:vml" Requires="v">
-                  <p:oleObj spid="_x0000_s7192" name="Equation" r:id="rId9" imgW="1854000" imgH="228600" progId="Equation.DSMT4">
+                  <p:oleObj spid="_x0000_s7209" name="Equation" r:id="rId9" imgW="1854000" imgH="228600" progId="Equation.DSMT4">
                     <p:embed/>
                   </p:oleObj>
                 </mc:Choice>
@@ -5160,7 +5160,7 @@
                       </p:blipFill>
                       <p:spPr>
                         <a:xfrm>
-                          <a:off x="2939071" y="2185688"/>
+                          <a:off x="3290134" y="2171564"/>
                           <a:ext cx="3189472" cy="392925"/>
                         </a:xfrm>
                         <a:prstGeom prst="rect">
@@ -5183,20 +5183,20 @@
             <p:nvPr>
               <p:extLst>
                 <p:ext uri="{D42A27DB-BD31-4B8C-83A1-F6EECF244321}">
-                  <p14:modId xmlns:p14="http://schemas.microsoft.com/office/powerpoint/2010/main" val="3237009558"/>
+                  <p14:modId xmlns:p14="http://schemas.microsoft.com/office/powerpoint/2010/main" val="2744003803"/>
                 </p:ext>
               </p:extLst>
             </p:nvPr>
           </p:nvGraphicFramePr>
           <p:xfrm>
-            <a:off x="2971035" y="1384572"/>
+            <a:off x="3634089" y="1361149"/>
             <a:ext cx="4169864" cy="414683"/>
           </p:xfrm>
           <a:graphic>
             <a:graphicData uri="http://schemas.openxmlformats.org/presentationml/2006/ole">
               <mc:AlternateContent xmlns:mc="http://schemas.openxmlformats.org/markup-compatibility/2006">
                 <mc:Choice xmlns:v="urn:schemas-microsoft-com:vml" Requires="v">
-                  <p:oleObj spid="_x0000_s7193" name="Equation" r:id="rId11" imgW="2425680" imgH="241200" progId="Equation.DSMT4">
+                  <p:oleObj spid="_x0000_s7210" name="Equation" r:id="rId11" imgW="2425680" imgH="241200" progId="Equation.DSMT4">
                     <p:embed/>
                   </p:oleObj>
                 </mc:Choice>
@@ -5217,7 +5217,7 @@
                       </p:blipFill>
                       <p:spPr>
                         <a:xfrm>
-                          <a:off x="2971035" y="1384572"/>
+                          <a:off x="3634089" y="1361149"/>
                           <a:ext cx="4169864" cy="414683"/>
                         </a:xfrm>
                         <a:prstGeom prst="rect">
@@ -5240,7 +5240,7 @@
             <p:nvPr>
               <p:extLst>
                 <p:ext uri="{D42A27DB-BD31-4B8C-83A1-F6EECF244321}">
-                  <p14:modId xmlns:p14="http://schemas.microsoft.com/office/powerpoint/2010/main" val="470376263"/>
+                  <p14:modId xmlns:p14="http://schemas.microsoft.com/office/powerpoint/2010/main" val="2668285747"/>
                 </p:ext>
               </p:extLst>
             </p:nvPr>
@@ -5253,7 +5253,7 @@
             <a:graphicData uri="http://schemas.openxmlformats.org/presentationml/2006/ole">
               <mc:AlternateContent xmlns:mc="http://schemas.openxmlformats.org/markup-compatibility/2006">
                 <mc:Choice xmlns:v="urn:schemas-microsoft-com:vml" Requires="v">
-                  <p:oleObj spid="_x0000_s7194" name="Equation" r:id="rId13" imgW="2374560" imgH="241200" progId="Equation.DSMT4">
+                  <p:oleObj spid="_x0000_s7211" name="Equation" r:id="rId13" imgW="2374560" imgH="241200" progId="Equation.DSMT4">
                     <p:embed/>
                   </p:oleObj>
                 </mc:Choice>
@@ -5297,20 +5297,20 @@
             <p:nvPr>
               <p:extLst>
                 <p:ext uri="{D42A27DB-BD31-4B8C-83A1-F6EECF244321}">
-                  <p14:modId xmlns:p14="http://schemas.microsoft.com/office/powerpoint/2010/main" val="1422931226"/>
+                  <p14:modId xmlns:p14="http://schemas.microsoft.com/office/powerpoint/2010/main" val="825340139"/>
                 </p:ext>
               </p:extLst>
             </p:nvPr>
           </p:nvGraphicFramePr>
           <p:xfrm>
-            <a:off x="2858578" y="2965048"/>
+            <a:off x="3557894" y="2943290"/>
             <a:ext cx="4169864" cy="414683"/>
           </p:xfrm>
           <a:graphic>
             <a:graphicData uri="http://schemas.openxmlformats.org/presentationml/2006/ole">
               <mc:AlternateContent xmlns:mc="http://schemas.openxmlformats.org/markup-compatibility/2006">
                 <mc:Choice xmlns:v="urn:schemas-microsoft-com:vml" Requires="v">
-                  <p:oleObj spid="_x0000_s7195" name="Equation" r:id="rId15" imgW="2425680" imgH="241200" progId="Equation.DSMT4">
+                  <p:oleObj spid="_x0000_s7212" name="Equation" r:id="rId15" imgW="2425680" imgH="241200" progId="Equation.DSMT4">
                     <p:embed/>
                   </p:oleObj>
                 </mc:Choice>
@@ -5331,7 +5331,7 @@
                       </p:blipFill>
                       <p:spPr>
                         <a:xfrm>
-                          <a:off x="2858578" y="2965048"/>
+                          <a:off x="3557894" y="2943290"/>
                           <a:ext cx="4169864" cy="414683"/>
                         </a:xfrm>
                         <a:prstGeom prst="rect">
@@ -5367,7 +5367,7 @@
             <a:graphicData uri="http://schemas.openxmlformats.org/presentationml/2006/ole">
               <mc:AlternateContent xmlns:mc="http://schemas.openxmlformats.org/markup-compatibility/2006">
                 <mc:Choice xmlns:v="urn:schemas-microsoft-com:vml" Requires="v">
-                  <p:oleObj spid="_x0000_s7196" name="Equation" r:id="rId17" imgW="2361960" imgH="241200" progId="Equation.DSMT4">
+                  <p:oleObj spid="_x0000_s7213" name="Equation" r:id="rId17" imgW="2361960" imgH="241200" progId="Equation.DSMT4">
                     <p:embed/>
                   </p:oleObj>
                 </mc:Choice>
@@ -5403,6 +5403,63 @@
           </a:graphic>
         </p:graphicFrame>
       </p:grpSp>
+      <p:graphicFrame>
+        <p:nvGraphicFramePr>
+          <p:cNvPr id="20" name="Object 19"/>
+          <p:cNvGraphicFramePr>
+            <a:graphicFrameLocks noChangeAspect="1"/>
+          </p:cNvGraphicFramePr>
+          <p:nvPr>
+            <p:extLst>
+              <p:ext uri="{D42A27DB-BD31-4B8C-83A1-F6EECF244321}">
+                <p14:modId xmlns:p14="http://schemas.microsoft.com/office/powerpoint/2010/main" val="3496485158"/>
+              </p:ext>
+            </p:extLst>
+          </p:nvPr>
+        </p:nvGraphicFramePr>
+        <p:xfrm>
+          <a:off x="3387725" y="-95250"/>
+          <a:ext cx="4083050" cy="1963738"/>
+        </p:xfrm>
+        <a:graphic>
+          <a:graphicData uri="http://schemas.openxmlformats.org/presentationml/2006/ole">
+            <mc:AlternateContent xmlns:mc="http://schemas.openxmlformats.org/markup-compatibility/2006">
+              <mc:Choice xmlns:v="urn:schemas-microsoft-com:vml" Requires="v">
+                <p:oleObj spid="_x0000_s7214" name="Equation" r:id="rId19" imgW="2374560" imgH="1143000" progId="Equation.DSMT4">
+                  <p:embed/>
+                </p:oleObj>
+              </mc:Choice>
+              <mc:Fallback>
+                <p:oleObj name="Equation" r:id="rId19" imgW="2374560" imgH="1143000" progId="Equation.DSMT4">
+                  <p:embed/>
+                  <p:pic>
+                    <p:nvPicPr>
+                      <p:cNvPr id="0" name=""/>
+                      <p:cNvPicPr/>
+                      <p:nvPr/>
+                    </p:nvPicPr>
+                    <p:blipFill>
+                      <a:blip r:embed="rId20"/>
+                      <a:stretch>
+                        <a:fillRect/>
+                      </a:stretch>
+                    </p:blipFill>
+                    <p:spPr>
+                      <a:xfrm>
+                        <a:off x="3387725" y="-95250"/>
+                        <a:ext cx="4083050" cy="1963738"/>
+                      </a:xfrm>
+                      <a:prstGeom prst="rect">
+                        <a:avLst/>
+                      </a:prstGeom>
+                    </p:spPr>
+                  </p:pic>
+                </p:oleObj>
+              </mc:Fallback>
+            </mc:AlternateContent>
+          </a:graphicData>
+        </a:graphic>
+      </p:graphicFrame>
     </p:spTree>
     <p:extLst>
       <p:ext uri="{BB962C8B-B14F-4D97-AF65-F5344CB8AC3E}">
@@ -5469,7 +5526,7 @@
             <a:graphicData uri="http://schemas.openxmlformats.org/presentationml/2006/ole">
               <mc:AlternateContent xmlns:mc="http://schemas.openxmlformats.org/markup-compatibility/2006">
                 <mc:Choice xmlns:v="urn:schemas-microsoft-com:vml" Requires="v">
-                  <p:oleObj spid="_x0000_s6166" name="Equation" r:id="rId3" imgW="1663560" imgH="914400" progId="Equation.DSMT4">
+                  <p:oleObj spid="_x0000_s6174" name="Equation" r:id="rId3" imgW="1663560" imgH="914400" progId="Equation.DSMT4">
                     <p:embed/>
                   </p:oleObj>
                 </mc:Choice>
@@ -5583,7 +5640,7 @@
             <a:graphicData uri="http://schemas.openxmlformats.org/presentationml/2006/ole">
               <mc:AlternateContent xmlns:mc="http://schemas.openxmlformats.org/markup-compatibility/2006">
                 <mc:Choice xmlns:v="urn:schemas-microsoft-com:vml" Requires="v">
-                  <p:oleObj spid="_x0000_s6167" name="Equation" r:id="rId5" imgW="1663560" imgH="914400" progId="Equation.DSMT4">
+                  <p:oleObj spid="_x0000_s6175" name="Equation" r:id="rId5" imgW="1663560" imgH="914400" progId="Equation.DSMT4">
                     <p:embed/>
                   </p:oleObj>
                 </mc:Choice>
@@ -5801,7 +5858,7 @@
             <a:graphicData uri="http://schemas.openxmlformats.org/presentationml/2006/ole">
               <mc:AlternateContent xmlns:mc="http://schemas.openxmlformats.org/markup-compatibility/2006">
                 <mc:Choice xmlns:v="urn:schemas-microsoft-com:vml" Requires="v">
-                  <p:oleObj spid="_x0000_s6168" name="Equation" r:id="rId7" imgW="672840" imgH="457200" progId="Equation.DSMT4">
+                  <p:oleObj spid="_x0000_s6176" name="Equation" r:id="rId7" imgW="672840" imgH="457200" progId="Equation.DSMT4">
                     <p:embed/>
                   </p:oleObj>
                 </mc:Choice>
@@ -6036,7 +6093,7 @@
             <a:graphicData uri="http://schemas.openxmlformats.org/presentationml/2006/ole">
               <mc:AlternateContent xmlns:mc="http://schemas.openxmlformats.org/markup-compatibility/2006">
                 <mc:Choice xmlns:v="urn:schemas-microsoft-com:vml" Requires="v">
-                  <p:oleObj spid="_x0000_s6169" name="Equation" r:id="rId9" imgW="672840" imgH="457200" progId="Equation.DSMT4">
+                  <p:oleObj spid="_x0000_s6177" name="Equation" r:id="rId9" imgW="672840" imgH="457200" progId="Equation.DSMT4">
                     <p:embed/>
                   </p:oleObj>
                 </mc:Choice>
@@ -6156,7 +6213,7 @@
           <a:graphicData uri="http://schemas.openxmlformats.org/presentationml/2006/ole">
             <mc:AlternateContent xmlns:mc="http://schemas.openxmlformats.org/markup-compatibility/2006">
               <mc:Choice xmlns:v="urn:schemas-microsoft-com:vml" Requires="v">
-                <p:oleObj spid="_x0000_s5167" name="Equation" r:id="rId3" imgW="1854000" imgH="228600" progId="Equation.DSMT4">
+                <p:oleObj spid="_x0000_s5177" name="Equation" r:id="rId3" imgW="1854000" imgH="228600" progId="Equation.DSMT4">
                   <p:embed/>
                 </p:oleObj>
               </mc:Choice>
@@ -6213,7 +6270,7 @@
           <a:graphicData uri="http://schemas.openxmlformats.org/presentationml/2006/ole">
             <mc:AlternateContent xmlns:mc="http://schemas.openxmlformats.org/markup-compatibility/2006">
               <mc:Choice xmlns:v="urn:schemas-microsoft-com:vml" Requires="v">
-                <p:oleObj spid="_x0000_s5168" name="Equation" r:id="rId5" imgW="2425680" imgH="241200" progId="Equation.DSMT4">
+                <p:oleObj spid="_x0000_s5178" name="Equation" r:id="rId5" imgW="2425680" imgH="241200" progId="Equation.DSMT4">
                   <p:embed/>
                 </p:oleObj>
               </mc:Choice>
@@ -6270,7 +6327,7 @@
           <a:graphicData uri="http://schemas.openxmlformats.org/presentationml/2006/ole">
             <mc:AlternateContent xmlns:mc="http://schemas.openxmlformats.org/markup-compatibility/2006">
               <mc:Choice xmlns:v="urn:schemas-microsoft-com:vml" Requires="v">
-                <p:oleObj spid="_x0000_s5169" name="Equation" r:id="rId7" imgW="2374560" imgH="241200" progId="Equation.DSMT4">
+                <p:oleObj spid="_x0000_s5179" name="Equation" r:id="rId7" imgW="2374560" imgH="241200" progId="Equation.DSMT4">
                   <p:embed/>
                 </p:oleObj>
               </mc:Choice>
@@ -6327,7 +6384,7 @@
           <a:graphicData uri="http://schemas.openxmlformats.org/presentationml/2006/ole">
             <mc:AlternateContent xmlns:mc="http://schemas.openxmlformats.org/markup-compatibility/2006">
               <mc:Choice xmlns:v="urn:schemas-microsoft-com:vml" Requires="v">
-                <p:oleObj spid="_x0000_s5170" name="Equation" r:id="rId9" imgW="2425680" imgH="241200" progId="Equation.DSMT4">
+                <p:oleObj spid="_x0000_s5180" name="Equation" r:id="rId9" imgW="2425680" imgH="241200" progId="Equation.DSMT4">
                   <p:embed/>
                 </p:oleObj>
               </mc:Choice>
@@ -6384,7 +6441,7 @@
           <a:graphicData uri="http://schemas.openxmlformats.org/presentationml/2006/ole">
             <mc:AlternateContent xmlns:mc="http://schemas.openxmlformats.org/markup-compatibility/2006">
               <mc:Choice xmlns:v="urn:schemas-microsoft-com:vml" Requires="v">
-                <p:oleObj spid="_x0000_s5171" name="Equation" r:id="rId11" imgW="2361960" imgH="241200" progId="Equation.DSMT4">
+                <p:oleObj spid="_x0000_s5181" name="Equation" r:id="rId11" imgW="2361960" imgH="241200" progId="Equation.DSMT4">
                   <p:embed/>
                 </p:oleObj>
               </mc:Choice>
@@ -6481,7 +6538,7 @@
             <a:graphicData uri="http://schemas.openxmlformats.org/presentationml/2006/ole">
               <mc:AlternateContent xmlns:mc="http://schemas.openxmlformats.org/markup-compatibility/2006">
                 <mc:Choice xmlns:v="urn:schemas-microsoft-com:vml" Requires="v">
-                  <p:oleObj spid="_x0000_s8208" name="Equation" r:id="rId3" imgW="1854000" imgH="228600" progId="Equation.DSMT4">
+                  <p:oleObj spid="_x0000_s8222" name="Equation" r:id="rId3" imgW="1854000" imgH="228600" progId="Equation.DSMT4">
                     <p:embed/>
                   </p:oleObj>
                 </mc:Choice>
@@ -6534,7 +6591,7 @@
             <a:graphicData uri="http://schemas.openxmlformats.org/presentationml/2006/ole">
               <mc:AlternateContent xmlns:mc="http://schemas.openxmlformats.org/markup-compatibility/2006">
                 <mc:Choice xmlns:v="urn:schemas-microsoft-com:vml" Requires="v">
-                  <p:oleObj spid="_x0000_s8209" name="Equation" r:id="rId5" imgW="2425680" imgH="241200" progId="Equation.DSMT4">
+                  <p:oleObj spid="_x0000_s8223" name="Equation" r:id="rId5" imgW="2425680" imgH="241200" progId="Equation.DSMT4">
                     <p:embed/>
                   </p:oleObj>
                 </mc:Choice>
@@ -6587,7 +6644,7 @@
             <a:graphicData uri="http://schemas.openxmlformats.org/presentationml/2006/ole">
               <mc:AlternateContent xmlns:mc="http://schemas.openxmlformats.org/markup-compatibility/2006">
                 <mc:Choice xmlns:v="urn:schemas-microsoft-com:vml" Requires="v">
-                  <p:oleObj spid="_x0000_s8210" name="Equation" r:id="rId7" imgW="2374560" imgH="241200" progId="Equation.DSMT4">
+                  <p:oleObj spid="_x0000_s8224" name="Equation" r:id="rId7" imgW="2374560" imgH="241200" progId="Equation.DSMT4">
                     <p:embed/>
                   </p:oleObj>
                 </mc:Choice>
@@ -6640,7 +6697,7 @@
             <a:graphicData uri="http://schemas.openxmlformats.org/presentationml/2006/ole">
               <mc:AlternateContent xmlns:mc="http://schemas.openxmlformats.org/markup-compatibility/2006">
                 <mc:Choice xmlns:v="urn:schemas-microsoft-com:vml" Requires="v">
-                  <p:oleObj spid="_x0000_s8211" name="Equation" r:id="rId9" imgW="2425680" imgH="241200" progId="Equation.DSMT4">
+                  <p:oleObj spid="_x0000_s8225" name="Equation" r:id="rId9" imgW="2425680" imgH="241200" progId="Equation.DSMT4">
                     <p:embed/>
                   </p:oleObj>
                 </mc:Choice>
@@ -6693,7 +6750,7 @@
             <a:graphicData uri="http://schemas.openxmlformats.org/presentationml/2006/ole">
               <mc:AlternateContent xmlns:mc="http://schemas.openxmlformats.org/markup-compatibility/2006">
                 <mc:Choice xmlns:v="urn:schemas-microsoft-com:vml" Requires="v">
-                  <p:oleObj spid="_x0000_s8212" name="Equation" r:id="rId11" imgW="2361960" imgH="241200" progId="Equation.DSMT4">
+                  <p:oleObj spid="_x0000_s8226" name="Equation" r:id="rId11" imgW="2361960" imgH="241200" progId="Equation.DSMT4">
                     <p:embed/>
                   </p:oleObj>
                 </mc:Choice>
@@ -6761,7 +6818,7 @@
             <a:graphicData uri="http://schemas.openxmlformats.org/presentationml/2006/ole">
               <mc:AlternateContent xmlns:mc="http://schemas.openxmlformats.org/markup-compatibility/2006">
                 <mc:Choice xmlns:v="urn:schemas-microsoft-com:vml" Requires="v">
-                  <p:oleObj spid="_x0000_s8213" name="Equation" r:id="rId13" imgW="1650960" imgH="965160" progId="Equation.DSMT4">
+                  <p:oleObj spid="_x0000_s8227" name="Equation" r:id="rId13" imgW="1650960" imgH="965160" progId="Equation.DSMT4">
                     <p:embed/>
                   </p:oleObj>
                 </mc:Choice>
@@ -6814,7 +6871,7 @@
             <a:graphicData uri="http://schemas.openxmlformats.org/presentationml/2006/ole">
               <mc:AlternateContent xmlns:mc="http://schemas.openxmlformats.org/markup-compatibility/2006">
                 <mc:Choice xmlns:v="urn:schemas-microsoft-com:vml" Requires="v">
-                  <p:oleObj spid="_x0000_s8214" name="Equation" r:id="rId15" imgW="2438280" imgH="914400" progId="Equation.DSMT4">
+                  <p:oleObj spid="_x0000_s8228" name="Equation" r:id="rId15" imgW="2438280" imgH="914400" progId="Equation.DSMT4">
                     <p:embed/>
                   </p:oleObj>
                 </mc:Choice>

</xml_diff>

<commit_message>
new naming convention source
</commit_message>
<xml_diff>
--- a/libs/materials/naming_convention.pptx
+++ b/libs/materials/naming_convention.pptx
@@ -6,12 +6,13 @@
   </p:sldMasterIdLst>
   <p:sldIdLst>
     <p:sldId id="256" r:id="rId2"/>
-    <p:sldId id="260" r:id="rId3"/>
-    <p:sldId id="265" r:id="rId4"/>
-    <p:sldId id="264" r:id="rId5"/>
-    <p:sldId id="263" r:id="rId6"/>
-    <p:sldId id="266" r:id="rId7"/>
-    <p:sldId id="261" r:id="rId8"/>
+    <p:sldId id="267" r:id="rId3"/>
+    <p:sldId id="260" r:id="rId4"/>
+    <p:sldId id="265" r:id="rId5"/>
+    <p:sldId id="264" r:id="rId6"/>
+    <p:sldId id="263" r:id="rId7"/>
+    <p:sldId id="266" r:id="rId8"/>
+    <p:sldId id="261" r:id="rId9"/>
   </p:sldIdLst>
   <p:sldSz cx="12192000" cy="6858000"/>
   <p:notesSz cx="6858000" cy="9144000"/>
@@ -116,6 +117,7 @@
         <p14:section name="Default Section" id="{94C1E986-F727-4732-9A38-10AF5433B629}">
           <p14:sldIdLst>
             <p14:sldId id="256"/>
+            <p14:sldId id="267"/>
             <p14:sldId id="260"/>
             <p14:sldId id="265"/>
             <p14:sldId id="264"/>
@@ -279,7 +281,7 @@
           <a:p>
             <a:fld id="{FFC3AEC4-2EDB-40EB-AFB2-2248CB6E3774}" type="datetimeFigureOut">
               <a:rPr lang="en-US" smtClean="0"/>
-              <a:t>7/16/2015</a:t>
+              <a:t>2/29/2016</a:t>
             </a:fld>
             <a:endParaRPr lang="en-US"/>
           </a:p>
@@ -449,7 +451,7 @@
           <a:p>
             <a:fld id="{FFC3AEC4-2EDB-40EB-AFB2-2248CB6E3774}" type="datetimeFigureOut">
               <a:rPr lang="en-US" smtClean="0"/>
-              <a:t>7/16/2015</a:t>
+              <a:t>2/29/2016</a:t>
             </a:fld>
             <a:endParaRPr lang="en-US"/>
           </a:p>
@@ -629,7 +631,7 @@
           <a:p>
             <a:fld id="{FFC3AEC4-2EDB-40EB-AFB2-2248CB6E3774}" type="datetimeFigureOut">
               <a:rPr lang="en-US" smtClean="0"/>
-              <a:t>7/16/2015</a:t>
+              <a:t>2/29/2016</a:t>
             </a:fld>
             <a:endParaRPr lang="en-US"/>
           </a:p>
@@ -799,7 +801,7 @@
           <a:p>
             <a:fld id="{FFC3AEC4-2EDB-40EB-AFB2-2248CB6E3774}" type="datetimeFigureOut">
               <a:rPr lang="en-US" smtClean="0"/>
-              <a:t>7/16/2015</a:t>
+              <a:t>2/29/2016</a:t>
             </a:fld>
             <a:endParaRPr lang="en-US"/>
           </a:p>
@@ -1045,7 +1047,7 @@
           <a:p>
             <a:fld id="{FFC3AEC4-2EDB-40EB-AFB2-2248CB6E3774}" type="datetimeFigureOut">
               <a:rPr lang="en-US" smtClean="0"/>
-              <a:t>7/16/2015</a:t>
+              <a:t>2/29/2016</a:t>
             </a:fld>
             <a:endParaRPr lang="en-US"/>
           </a:p>
@@ -1277,7 +1279,7 @@
           <a:p>
             <a:fld id="{FFC3AEC4-2EDB-40EB-AFB2-2248CB6E3774}" type="datetimeFigureOut">
               <a:rPr lang="en-US" smtClean="0"/>
-              <a:t>7/16/2015</a:t>
+              <a:t>2/29/2016</a:t>
             </a:fld>
             <a:endParaRPr lang="en-US"/>
           </a:p>
@@ -1644,7 +1646,7 @@
           <a:p>
             <a:fld id="{FFC3AEC4-2EDB-40EB-AFB2-2248CB6E3774}" type="datetimeFigureOut">
               <a:rPr lang="en-US" smtClean="0"/>
-              <a:t>7/16/2015</a:t>
+              <a:t>2/29/2016</a:t>
             </a:fld>
             <a:endParaRPr lang="en-US"/>
           </a:p>
@@ -1762,7 +1764,7 @@
           <a:p>
             <a:fld id="{FFC3AEC4-2EDB-40EB-AFB2-2248CB6E3774}" type="datetimeFigureOut">
               <a:rPr lang="en-US" smtClean="0"/>
-              <a:t>7/16/2015</a:t>
+              <a:t>2/29/2016</a:t>
             </a:fld>
             <a:endParaRPr lang="en-US"/>
           </a:p>
@@ -1857,7 +1859,7 @@
           <a:p>
             <a:fld id="{FFC3AEC4-2EDB-40EB-AFB2-2248CB6E3774}" type="datetimeFigureOut">
               <a:rPr lang="en-US" smtClean="0"/>
-              <a:t>7/16/2015</a:t>
+              <a:t>2/29/2016</a:t>
             </a:fld>
             <a:endParaRPr lang="en-US"/>
           </a:p>
@@ -2134,7 +2136,7 @@
           <a:p>
             <a:fld id="{FFC3AEC4-2EDB-40EB-AFB2-2248CB6E3774}" type="datetimeFigureOut">
               <a:rPr lang="en-US" smtClean="0"/>
-              <a:t>7/16/2015</a:t>
+              <a:t>2/29/2016</a:t>
             </a:fld>
             <a:endParaRPr lang="en-US"/>
           </a:p>
@@ -2387,7 +2389,7 @@
           <a:p>
             <a:fld id="{FFC3AEC4-2EDB-40EB-AFB2-2248CB6E3774}" type="datetimeFigureOut">
               <a:rPr lang="en-US" smtClean="0"/>
-              <a:t>7/16/2015</a:t>
+              <a:t>2/29/2016</a:t>
             </a:fld>
             <a:endParaRPr lang="en-US"/>
           </a:p>
@@ -2600,7 +2602,7 @@
           <a:p>
             <a:fld id="{FFC3AEC4-2EDB-40EB-AFB2-2248CB6E3774}" type="datetimeFigureOut">
               <a:rPr lang="en-US" smtClean="0"/>
-              <a:t>7/16/2015</a:t>
+              <a:t>2/29/2016</a:t>
             </a:fld>
             <a:endParaRPr lang="en-US"/>
           </a:p>
@@ -3951,6 +3953,565 @@
         </p:nvSpPr>
         <p:spPr>
           <a:xfrm>
+            <a:off x="1425146" y="2091816"/>
+            <a:ext cx="7830614" cy="461665"/>
+          </a:xfrm>
+          <a:prstGeom prst="rect">
+            <a:avLst/>
+          </a:prstGeom>
+          <a:noFill/>
+        </p:spPr>
+        <p:txBody>
+          <a:bodyPr wrap="square" rtlCol="0">
+            <a:spAutoFit/>
+          </a:bodyPr>
+          <a:lstStyle/>
+          <a:p>
+            <a:r>
+              <a:rPr lang="en-US" sz="2400" b="1" dirty="0" smtClean="0">
+                <a:solidFill>
+                  <a:srgbClr val="FF0000"/>
+                </a:solidFill>
+              </a:rPr>
+              <a:t>b</a:t>
+            </a:r>
+            <a:r>
+              <a:rPr lang="en-US" sz="2400" b="1" dirty="0" smtClean="0">
+                <a:solidFill>
+                  <a:schemeClr val="accent6">
+                    <a:lumMod val="75000"/>
+                  </a:schemeClr>
+                </a:solidFill>
+              </a:rPr>
+              <a:t>1</a:t>
+            </a:r>
+            <a:r>
+              <a:rPr lang="en-US" sz="2400" b="1" dirty="0" smtClean="0"/>
+              <a:t>_sex_covariateSet_</a:t>
+            </a:r>
+            <a:r>
+              <a:rPr lang="en-US" sz="2400" b="1" dirty="0" smtClean="0">
+                <a:solidFill>
+                  <a:schemeClr val="accent2">
+                    <a:lumMod val="75000"/>
+                  </a:schemeClr>
+                </a:solidFill>
+              </a:rPr>
+              <a:t>physicalMeasure</a:t>
+            </a:r>
+            <a:r>
+              <a:rPr lang="en-US" sz="2400" b="1" dirty="0" smtClean="0"/>
+              <a:t>_</a:t>
+            </a:r>
+            <a:r>
+              <a:rPr lang="en-US" sz="2400" b="1" dirty="0" smtClean="0">
+                <a:solidFill>
+                  <a:schemeClr val="accent1">
+                    <a:lumMod val="75000"/>
+                  </a:schemeClr>
+                </a:solidFill>
+              </a:rPr>
+              <a:t>cognitiveMeasure</a:t>
+            </a:r>
+            <a:endParaRPr lang="en-US" sz="2400" b="1" dirty="0">
+              <a:solidFill>
+                <a:schemeClr val="accent1">
+                  <a:lumMod val="75000"/>
+                </a:schemeClr>
+              </a:solidFill>
+            </a:endParaRPr>
+          </a:p>
+        </p:txBody>
+      </p:sp>
+      <p:sp>
+        <p:nvSpPr>
+          <p:cNvPr id="7" name="TextBox 6"/>
+          <p:cNvSpPr txBox="1"/>
+          <p:nvPr/>
+        </p:nvSpPr>
+        <p:spPr>
+          <a:xfrm>
+            <a:off x="3420601" y="2450671"/>
+            <a:ext cx="1223319" cy="1569660"/>
+          </a:xfrm>
+          <a:prstGeom prst="rect">
+            <a:avLst/>
+          </a:prstGeom>
+          <a:noFill/>
+        </p:spPr>
+        <p:txBody>
+          <a:bodyPr wrap="square" rtlCol="0">
+            <a:spAutoFit/>
+          </a:bodyPr>
+          <a:lstStyle/>
+          <a:p>
+            <a:r>
+              <a:rPr lang="en-US" sz="1600" dirty="0" smtClean="0"/>
+              <a:t>empty</a:t>
+            </a:r>
+          </a:p>
+          <a:p>
+            <a:r>
+              <a:rPr lang="en-US" sz="1600" dirty="0" smtClean="0"/>
+              <a:t>a</a:t>
+            </a:r>
+          </a:p>
+          <a:p>
+            <a:r>
+              <a:rPr lang="en-US" sz="1600" dirty="0" smtClean="0"/>
+              <a:t>ae</a:t>
+            </a:r>
+          </a:p>
+          <a:p>
+            <a:r>
+              <a:rPr lang="en-US" sz="1600" dirty="0" err="1" smtClean="0"/>
+              <a:t>aeh</a:t>
+            </a:r>
+            <a:endParaRPr lang="en-US" sz="1600" dirty="0" smtClean="0"/>
+          </a:p>
+          <a:p>
+            <a:r>
+              <a:rPr lang="en-US" sz="1600" dirty="0" err="1" smtClean="0"/>
+              <a:t>aehplus</a:t>
+            </a:r>
+            <a:endParaRPr lang="en-US" sz="1600" dirty="0" smtClean="0"/>
+          </a:p>
+          <a:p>
+            <a:r>
+              <a:rPr lang="en-US" sz="1600" dirty="0" smtClean="0"/>
+              <a:t>full</a:t>
+            </a:r>
+            <a:endParaRPr lang="en-US" sz="1600" dirty="0"/>
+          </a:p>
+        </p:txBody>
+      </p:sp>
+      <p:sp>
+        <p:nvSpPr>
+          <p:cNvPr id="9" name="TextBox 8"/>
+          <p:cNvSpPr txBox="1"/>
+          <p:nvPr/>
+        </p:nvSpPr>
+        <p:spPr>
+          <a:xfrm>
+            <a:off x="1425146" y="2484554"/>
+            <a:ext cx="1285103" cy="861774"/>
+          </a:xfrm>
+          <a:prstGeom prst="rect">
+            <a:avLst/>
+          </a:prstGeom>
+          <a:noFill/>
+        </p:spPr>
+        <p:txBody>
+          <a:bodyPr wrap="square" rtlCol="0">
+            <a:spAutoFit/>
+          </a:bodyPr>
+          <a:lstStyle/>
+          <a:p>
+            <a:r>
+              <a:rPr lang="en-US" sz="1600" dirty="0">
+                <a:solidFill>
+                  <a:srgbClr val="FF0000"/>
+                </a:solidFill>
+              </a:rPr>
+              <a:t>u</a:t>
+            </a:r>
+            <a:r>
+              <a:rPr lang="en-US" sz="1600" dirty="0" smtClean="0"/>
+              <a:t>nivariate</a:t>
+            </a:r>
+          </a:p>
+          <a:p>
+            <a:r>
+              <a:rPr lang="en-US" sz="1600" dirty="0" smtClean="0">
+                <a:solidFill>
+                  <a:srgbClr val="FF0000"/>
+                </a:solidFill>
+              </a:rPr>
+              <a:t>b</a:t>
+            </a:r>
+            <a:r>
+              <a:rPr lang="en-US" sz="1600" dirty="0" smtClean="0"/>
+              <a:t>ivariate</a:t>
+            </a:r>
+          </a:p>
+          <a:p>
+            <a:endParaRPr lang="en-US" sz="1600" dirty="0"/>
+          </a:p>
+        </p:txBody>
+      </p:sp>
+      <p:sp>
+        <p:nvSpPr>
+          <p:cNvPr id="10" name="TextBox 9"/>
+          <p:cNvSpPr txBox="1"/>
+          <p:nvPr/>
+        </p:nvSpPr>
+        <p:spPr>
+          <a:xfrm>
+            <a:off x="1425146" y="3109784"/>
+            <a:ext cx="4300151" cy="1384995"/>
+          </a:xfrm>
+          <a:prstGeom prst="rect">
+            <a:avLst/>
+          </a:prstGeom>
+          <a:noFill/>
+        </p:spPr>
+        <p:txBody>
+          <a:bodyPr wrap="square" rtlCol="0">
+            <a:spAutoFit/>
+          </a:bodyPr>
+          <a:lstStyle/>
+          <a:p>
+            <a:r>
+              <a:rPr lang="en-US" sz="1400" u="sng" dirty="0" smtClean="0"/>
+              <a:t>Random terms</a:t>
+            </a:r>
+          </a:p>
+          <a:p>
+            <a:endParaRPr lang="en-US" sz="1400" dirty="0"/>
+          </a:p>
+          <a:p>
+            <a:r>
+              <a:rPr lang="en-US" sz="1400" b="1" dirty="0" smtClean="0">
+                <a:solidFill>
+                  <a:schemeClr val="accent6">
+                    <a:lumMod val="75000"/>
+                  </a:schemeClr>
+                </a:solidFill>
+              </a:rPr>
+              <a:t>0</a:t>
+            </a:r>
+            <a:r>
+              <a:rPr lang="en-US" sz="1400" dirty="0" smtClean="0"/>
+              <a:t> -  intercept</a:t>
+            </a:r>
+            <a:br>
+              <a:rPr lang="en-US" sz="1400" dirty="0" smtClean="0"/>
+            </a:br>
+            <a:r>
+              <a:rPr lang="en-US" sz="1400" b="1" dirty="0" smtClean="0">
+                <a:solidFill>
+                  <a:schemeClr val="accent6">
+                    <a:lumMod val="75000"/>
+                  </a:schemeClr>
+                </a:solidFill>
+              </a:rPr>
+              <a:t>1</a:t>
+            </a:r>
+            <a:r>
+              <a:rPr lang="en-US" sz="1400" dirty="0" smtClean="0"/>
+              <a:t> – intercept + linear</a:t>
+            </a:r>
+          </a:p>
+          <a:p>
+            <a:r>
+              <a:rPr lang="en-US" sz="1400" b="1" dirty="0" smtClean="0">
+                <a:solidFill>
+                  <a:schemeClr val="accent6">
+                    <a:lumMod val="75000"/>
+                  </a:schemeClr>
+                </a:solidFill>
+              </a:rPr>
+              <a:t>2</a:t>
+            </a:r>
+            <a:r>
+              <a:rPr lang="en-US" sz="1400" dirty="0" smtClean="0">
+                <a:solidFill>
+                  <a:schemeClr val="accent6">
+                    <a:lumMod val="75000"/>
+                  </a:schemeClr>
+                </a:solidFill>
+              </a:rPr>
+              <a:t> </a:t>
+            </a:r>
+            <a:r>
+              <a:rPr lang="en-US" sz="1400" dirty="0" smtClean="0"/>
+              <a:t>– intercept + linear + quadratic</a:t>
+            </a:r>
+          </a:p>
+          <a:p>
+            <a:endParaRPr lang="en-US" sz="1400" dirty="0"/>
+          </a:p>
+        </p:txBody>
+      </p:sp>
+      <p:sp>
+        <p:nvSpPr>
+          <p:cNvPr id="11" name="TextBox 10"/>
+          <p:cNvSpPr txBox="1"/>
+          <p:nvPr/>
+        </p:nvSpPr>
+        <p:spPr>
+          <a:xfrm>
+            <a:off x="5127713" y="2487999"/>
+            <a:ext cx="1890584" cy="1754326"/>
+          </a:xfrm>
+          <a:prstGeom prst="rect">
+            <a:avLst/>
+          </a:prstGeom>
+          <a:noFill/>
+        </p:spPr>
+        <p:txBody>
+          <a:bodyPr wrap="square" rtlCol="0">
+            <a:spAutoFit/>
+          </a:bodyPr>
+          <a:lstStyle/>
+          <a:p>
+            <a:r>
+              <a:rPr lang="en-US" dirty="0" err="1" smtClean="0">
+                <a:solidFill>
+                  <a:schemeClr val="accent2">
+                    <a:lumMod val="75000"/>
+                  </a:schemeClr>
+                </a:solidFill>
+              </a:rPr>
+              <a:t>noPhys</a:t>
+            </a:r>
+            <a:endParaRPr lang="en-US" dirty="0" smtClean="0">
+              <a:solidFill>
+                <a:schemeClr val="accent2">
+                  <a:lumMod val="75000"/>
+                </a:schemeClr>
+              </a:solidFill>
+            </a:endParaRPr>
+          </a:p>
+          <a:p>
+            <a:r>
+              <a:rPr lang="en-US" dirty="0" smtClean="0">
+                <a:solidFill>
+                  <a:schemeClr val="accent2">
+                    <a:lumMod val="75000"/>
+                  </a:schemeClr>
+                </a:solidFill>
+              </a:rPr>
+              <a:t>grip</a:t>
+            </a:r>
+          </a:p>
+          <a:p>
+            <a:r>
+              <a:rPr lang="en-US" dirty="0">
+                <a:solidFill>
+                  <a:schemeClr val="accent2">
+                    <a:lumMod val="75000"/>
+                  </a:schemeClr>
+                </a:solidFill>
+              </a:rPr>
+              <a:t>gait</a:t>
+            </a:r>
+            <a:endParaRPr lang="en-US" dirty="0" smtClean="0">
+              <a:solidFill>
+                <a:schemeClr val="accent2">
+                  <a:lumMod val="75000"/>
+                </a:schemeClr>
+              </a:solidFill>
+            </a:endParaRPr>
+          </a:p>
+          <a:p>
+            <a:r>
+              <a:rPr lang="en-US" dirty="0" err="1" smtClean="0">
+                <a:solidFill>
+                  <a:schemeClr val="accent2">
+                    <a:lumMod val="75000"/>
+                  </a:schemeClr>
+                </a:solidFill>
+              </a:rPr>
+              <a:t>fev</a:t>
+            </a:r>
+            <a:endParaRPr lang="en-US" dirty="0" smtClean="0">
+              <a:solidFill>
+                <a:schemeClr val="accent2">
+                  <a:lumMod val="75000"/>
+                </a:schemeClr>
+              </a:solidFill>
+            </a:endParaRPr>
+          </a:p>
+          <a:p>
+            <a:endParaRPr lang="en-US" dirty="0" smtClean="0">
+              <a:solidFill>
+                <a:schemeClr val="accent2">
+                  <a:lumMod val="75000"/>
+                </a:schemeClr>
+              </a:solidFill>
+            </a:endParaRPr>
+          </a:p>
+          <a:p>
+            <a:endParaRPr lang="en-US" dirty="0">
+              <a:solidFill>
+                <a:schemeClr val="accent2">
+                  <a:lumMod val="60000"/>
+                  <a:lumOff val="40000"/>
+                </a:schemeClr>
+              </a:solidFill>
+            </a:endParaRPr>
+          </a:p>
+        </p:txBody>
+      </p:sp>
+      <p:sp>
+        <p:nvSpPr>
+          <p:cNvPr id="12" name="TextBox 11"/>
+          <p:cNvSpPr txBox="1"/>
+          <p:nvPr/>
+        </p:nvSpPr>
+        <p:spPr>
+          <a:xfrm>
+            <a:off x="7594418" y="2487999"/>
+            <a:ext cx="1890584" cy="1754326"/>
+          </a:xfrm>
+          <a:prstGeom prst="rect">
+            <a:avLst/>
+          </a:prstGeom>
+          <a:noFill/>
+        </p:spPr>
+        <p:txBody>
+          <a:bodyPr wrap="square" rtlCol="0">
+            <a:spAutoFit/>
+          </a:bodyPr>
+          <a:lstStyle/>
+          <a:p>
+            <a:r>
+              <a:rPr lang="en-US" dirty="0" err="1" smtClean="0">
+                <a:solidFill>
+                  <a:schemeClr val="accent1">
+                    <a:lumMod val="75000"/>
+                  </a:schemeClr>
+                </a:solidFill>
+              </a:rPr>
+              <a:t>noCog</a:t>
+            </a:r>
+            <a:endParaRPr lang="en-US" dirty="0" smtClean="0">
+              <a:solidFill>
+                <a:schemeClr val="accent1">
+                  <a:lumMod val="75000"/>
+                </a:schemeClr>
+              </a:solidFill>
+            </a:endParaRPr>
+          </a:p>
+          <a:p>
+            <a:r>
+              <a:rPr lang="en-US" dirty="0" smtClean="0">
+                <a:solidFill>
+                  <a:schemeClr val="accent1">
+                    <a:lumMod val="75000"/>
+                  </a:schemeClr>
+                </a:solidFill>
+              </a:rPr>
+              <a:t>animals</a:t>
+            </a:r>
+            <a:endParaRPr lang="en-US" dirty="0" smtClean="0">
+              <a:solidFill>
+                <a:schemeClr val="accent1">
+                  <a:lumMod val="75000"/>
+                </a:schemeClr>
+              </a:solidFill>
+            </a:endParaRPr>
+          </a:p>
+          <a:p>
+            <a:r>
+              <a:rPr lang="en-US" dirty="0" err="1" smtClean="0">
+                <a:solidFill>
+                  <a:schemeClr val="accent1">
+                    <a:lumMod val="75000"/>
+                  </a:schemeClr>
+                </a:solidFill>
+              </a:rPr>
+              <a:t>mmse</a:t>
+            </a:r>
+            <a:endParaRPr lang="en-US" dirty="0">
+              <a:solidFill>
+                <a:schemeClr val="accent1">
+                  <a:lumMod val="75000"/>
+                </a:schemeClr>
+              </a:solidFill>
+            </a:endParaRPr>
+          </a:p>
+          <a:p>
+            <a:r>
+              <a:rPr lang="en-US" dirty="0" smtClean="0">
+                <a:solidFill>
+                  <a:schemeClr val="accent1">
+                    <a:lumMod val="75000"/>
+                  </a:schemeClr>
+                </a:solidFill>
+              </a:rPr>
+              <a:t>clock</a:t>
+            </a:r>
+          </a:p>
+          <a:p>
+            <a:r>
+              <a:rPr lang="en-US" dirty="0" err="1" smtClean="0">
+                <a:solidFill>
+                  <a:schemeClr val="accent1">
+                    <a:lumMod val="75000"/>
+                  </a:schemeClr>
+                </a:solidFill>
+              </a:rPr>
+              <a:t>digitsymbol</a:t>
+            </a:r>
+            <a:endParaRPr lang="en-US" dirty="0" smtClean="0">
+              <a:solidFill>
+                <a:schemeClr val="accent1">
+                  <a:lumMod val="75000"/>
+                </a:schemeClr>
+              </a:solidFill>
+            </a:endParaRPr>
+          </a:p>
+          <a:p>
+            <a:r>
+              <a:rPr lang="en-US" dirty="0" err="1" smtClean="0">
+                <a:solidFill>
+                  <a:schemeClr val="accent1">
+                    <a:lumMod val="75000"/>
+                  </a:schemeClr>
+                </a:solidFill>
+              </a:rPr>
+              <a:t>proserecall</a:t>
+            </a:r>
+            <a:endParaRPr lang="en-US" dirty="0" smtClean="0">
+              <a:solidFill>
+                <a:schemeClr val="accent1">
+                  <a:lumMod val="75000"/>
+                </a:schemeClr>
+              </a:solidFill>
+            </a:endParaRPr>
+          </a:p>
+        </p:txBody>
+      </p:sp>
+    </p:spTree>
+    <p:extLst>
+      <p:ext uri="{BB962C8B-B14F-4D97-AF65-F5344CB8AC3E}">
+        <p14:creationId xmlns:p14="http://schemas.microsoft.com/office/powerpoint/2010/main" val="2718458721"/>
+      </p:ext>
+    </p:extLst>
+  </p:cSld>
+  <p:clrMapOvr>
+    <a:masterClrMapping/>
+  </p:clrMapOvr>
+</p:sld>
+</file>
+
+<file path=ppt/slides/slide3.xml><?xml version="1.0" encoding="utf-8"?>
+<p:sld xmlns:a="http://schemas.openxmlformats.org/drawingml/2006/main" xmlns:r="http://schemas.openxmlformats.org/officeDocument/2006/relationships" xmlns:p="http://schemas.openxmlformats.org/presentationml/2006/main">
+  <p:cSld>
+    <p:spTree>
+      <p:nvGrpSpPr>
+        <p:cNvPr id="1" name=""/>
+        <p:cNvGrpSpPr/>
+        <p:nvPr/>
+      </p:nvGrpSpPr>
+      <p:grpSpPr>
+        <a:xfrm>
+          <a:off x="0" y="0"/>
+          <a:ext cx="0" cy="0"/>
+          <a:chOff x="0" y="0"/>
+          <a:chExt cx="0" cy="0"/>
+        </a:xfrm>
+      </p:grpSpPr>
+      <p:sp>
+        <p:nvSpPr>
+          <p:cNvPr id="4" name="TextBox 3"/>
+          <p:cNvSpPr txBox="1"/>
+          <p:nvPr/>
+        </p:nvSpPr>
+        <p:spPr>
+          <a:xfrm>
             <a:off x="741406" y="321275"/>
             <a:ext cx="11710086" cy="523220"/>
           </a:xfrm>
@@ -4470,7 +5031,7 @@
 </p:sld>
 </file>
 
-<file path=ppt/slides/slide3.xml><?xml version="1.0" encoding="utf-8"?>
+<file path=ppt/slides/slide4.xml><?xml version="1.0" encoding="utf-8"?>
 <p:sld xmlns:a="http://schemas.openxmlformats.org/drawingml/2006/main" xmlns:r="http://schemas.openxmlformats.org/officeDocument/2006/relationships" xmlns:p="http://schemas.openxmlformats.org/presentationml/2006/main">
   <p:cSld>
     <p:spTree>
@@ -4523,7 +5084,7 @@
             <a:graphicData uri="http://schemas.openxmlformats.org/presentationml/2006/ole">
               <mc:AlternateContent xmlns:mc="http://schemas.openxmlformats.org/markup-compatibility/2006">
                 <mc:Choice xmlns:v="urn:schemas-microsoft-com:vml" Requires="v">
-                  <p:oleObj spid="_x0000_s7233" name="Equation" r:id="rId3" imgW="1650960" imgH="965160" progId="Equation.DSMT4">
+                  <p:oleObj spid="_x0000_s7242" name="Equation" r:id="rId3" imgW="1650960" imgH="965160" progId="Equation.DSMT4">
                     <p:embed/>
                   </p:oleObj>
                 </mc:Choice>
@@ -4580,7 +5141,7 @@
             <a:graphicData uri="http://schemas.openxmlformats.org/presentationml/2006/ole">
               <mc:AlternateContent xmlns:mc="http://schemas.openxmlformats.org/markup-compatibility/2006">
                 <mc:Choice xmlns:v="urn:schemas-microsoft-com:vml" Requires="v">
-                  <p:oleObj spid="_x0000_s7234" name="Equation" r:id="rId5" imgW="1663560" imgH="914400" progId="Equation.DSMT4">
+                  <p:oleObj spid="_x0000_s7243" name="Equation" r:id="rId5" imgW="1663560" imgH="914400" progId="Equation.DSMT4">
                     <p:embed/>
                   </p:oleObj>
                 </mc:Choice>
@@ -4951,7 +5512,7 @@
             <a:graphicData uri="http://schemas.openxmlformats.org/presentationml/2006/ole">
               <mc:AlternateContent xmlns:mc="http://schemas.openxmlformats.org/markup-compatibility/2006">
                 <mc:Choice xmlns:v="urn:schemas-microsoft-com:vml" Requires="v">
-                  <p:oleObj spid="_x0000_s7235" name="Equation" r:id="rId7" imgW="736560" imgH="457200" progId="Equation.DSMT4">
+                  <p:oleObj spid="_x0000_s7244" name="Equation" r:id="rId7" imgW="736560" imgH="457200" progId="Equation.DSMT4">
                     <p:embed/>
                   </p:oleObj>
                 </mc:Choice>
@@ -5139,7 +5700,7 @@
             <a:graphicData uri="http://schemas.openxmlformats.org/presentationml/2006/ole">
               <mc:AlternateContent xmlns:mc="http://schemas.openxmlformats.org/markup-compatibility/2006">
                 <mc:Choice xmlns:v="urn:schemas-microsoft-com:vml" Requires="v">
-                  <p:oleObj spid="_x0000_s7236" name="Equation" r:id="rId9" imgW="1854000" imgH="228600" progId="Equation.DSMT4">
+                  <p:oleObj spid="_x0000_s7245" name="Equation" r:id="rId9" imgW="1854000" imgH="228600" progId="Equation.DSMT4">
                     <p:embed/>
                   </p:oleObj>
                 </mc:Choice>
@@ -5196,7 +5757,7 @@
             <a:graphicData uri="http://schemas.openxmlformats.org/presentationml/2006/ole">
               <mc:AlternateContent xmlns:mc="http://schemas.openxmlformats.org/markup-compatibility/2006">
                 <mc:Choice xmlns:v="urn:schemas-microsoft-com:vml" Requires="v">
-                  <p:oleObj spid="_x0000_s7237" name="Equation" r:id="rId11" imgW="2425680" imgH="241200" progId="Equation.DSMT4">
+                  <p:oleObj spid="_x0000_s7246" name="Equation" r:id="rId11" imgW="2425680" imgH="241200" progId="Equation.DSMT4">
                     <p:embed/>
                   </p:oleObj>
                 </mc:Choice>
@@ -5253,7 +5814,7 @@
             <a:graphicData uri="http://schemas.openxmlformats.org/presentationml/2006/ole">
               <mc:AlternateContent xmlns:mc="http://schemas.openxmlformats.org/markup-compatibility/2006">
                 <mc:Choice xmlns:v="urn:schemas-microsoft-com:vml" Requires="v">
-                  <p:oleObj spid="_x0000_s7238" name="Equation" r:id="rId13" imgW="2374560" imgH="241200" progId="Equation.DSMT4">
+                  <p:oleObj spid="_x0000_s7247" name="Equation" r:id="rId13" imgW="2374560" imgH="241200" progId="Equation.DSMT4">
                     <p:embed/>
                   </p:oleObj>
                 </mc:Choice>
@@ -5310,7 +5871,7 @@
             <a:graphicData uri="http://schemas.openxmlformats.org/presentationml/2006/ole">
               <mc:AlternateContent xmlns:mc="http://schemas.openxmlformats.org/markup-compatibility/2006">
                 <mc:Choice xmlns:v="urn:schemas-microsoft-com:vml" Requires="v">
-                  <p:oleObj spid="_x0000_s7239" name="Equation" r:id="rId15" imgW="2425680" imgH="241200" progId="Equation.DSMT4">
+                  <p:oleObj spid="_x0000_s7248" name="Equation" r:id="rId15" imgW="2425680" imgH="241200" progId="Equation.DSMT4">
                     <p:embed/>
                   </p:oleObj>
                 </mc:Choice>
@@ -5367,7 +5928,7 @@
             <a:graphicData uri="http://schemas.openxmlformats.org/presentationml/2006/ole">
               <mc:AlternateContent xmlns:mc="http://schemas.openxmlformats.org/markup-compatibility/2006">
                 <mc:Choice xmlns:v="urn:schemas-microsoft-com:vml" Requires="v">
-                  <p:oleObj spid="_x0000_s7240" name="Equation" r:id="rId17" imgW="2361960" imgH="241200" progId="Equation.DSMT4">
+                  <p:oleObj spid="_x0000_s7249" name="Equation" r:id="rId17" imgW="2361960" imgH="241200" progId="Equation.DSMT4">
                     <p:embed/>
                   </p:oleObj>
                 </mc:Choice>
@@ -5425,7 +5986,7 @@
           <a:graphicData uri="http://schemas.openxmlformats.org/presentationml/2006/ole">
             <mc:AlternateContent xmlns:mc="http://schemas.openxmlformats.org/markup-compatibility/2006">
               <mc:Choice xmlns:v="urn:schemas-microsoft-com:vml" Requires="v">
-                <p:oleObj spid="_x0000_s7241" name="Equation" r:id="rId19" imgW="2374560" imgH="1143000" progId="Equation.DSMT4">
+                <p:oleObj spid="_x0000_s7250" name="Equation" r:id="rId19" imgW="2374560" imgH="1143000" progId="Equation.DSMT4">
                   <p:embed/>
                 </p:oleObj>
               </mc:Choice>
@@ -5473,7 +6034,7 @@
 </p:sld>
 </file>
 
-<file path=ppt/slides/slide4.xml><?xml version="1.0" encoding="utf-8"?>
+<file path=ppt/slides/slide5.xml><?xml version="1.0" encoding="utf-8"?>
 <p:sld xmlns:a="http://schemas.openxmlformats.org/drawingml/2006/main" xmlns:r="http://schemas.openxmlformats.org/officeDocument/2006/relationships" xmlns:p="http://schemas.openxmlformats.org/presentationml/2006/main">
   <p:cSld>
     <p:spTree>
@@ -5526,7 +6087,7 @@
             <a:graphicData uri="http://schemas.openxmlformats.org/presentationml/2006/ole">
               <mc:AlternateContent xmlns:mc="http://schemas.openxmlformats.org/markup-compatibility/2006">
                 <mc:Choice xmlns:v="urn:schemas-microsoft-com:vml" Requires="v">
-                  <p:oleObj spid="_x0000_s6186" name="Equation" r:id="rId3" imgW="1663560" imgH="914400" progId="Equation.DSMT4">
+                  <p:oleObj spid="_x0000_s6190" name="Equation" r:id="rId3" imgW="1663560" imgH="914400" progId="Equation.DSMT4">
                     <p:embed/>
                   </p:oleObj>
                 </mc:Choice>
@@ -5640,7 +6201,7 @@
             <a:graphicData uri="http://schemas.openxmlformats.org/presentationml/2006/ole">
               <mc:AlternateContent xmlns:mc="http://schemas.openxmlformats.org/markup-compatibility/2006">
                 <mc:Choice xmlns:v="urn:schemas-microsoft-com:vml" Requires="v">
-                  <p:oleObj spid="_x0000_s6187" name="Equation" r:id="rId5" imgW="1663560" imgH="914400" progId="Equation.DSMT4">
+                  <p:oleObj spid="_x0000_s6191" name="Equation" r:id="rId5" imgW="1663560" imgH="914400" progId="Equation.DSMT4">
                     <p:embed/>
                   </p:oleObj>
                 </mc:Choice>
@@ -5858,7 +6419,7 @@
             <a:graphicData uri="http://schemas.openxmlformats.org/presentationml/2006/ole">
               <mc:AlternateContent xmlns:mc="http://schemas.openxmlformats.org/markup-compatibility/2006">
                 <mc:Choice xmlns:v="urn:schemas-microsoft-com:vml" Requires="v">
-                  <p:oleObj spid="_x0000_s6188" name="Equation" r:id="rId7" imgW="672840" imgH="457200" progId="Equation.DSMT4">
+                  <p:oleObj spid="_x0000_s6192" name="Equation" r:id="rId7" imgW="672840" imgH="457200" progId="Equation.DSMT4">
                     <p:embed/>
                   </p:oleObj>
                 </mc:Choice>
@@ -6093,7 +6654,7 @@
             <a:graphicData uri="http://schemas.openxmlformats.org/presentationml/2006/ole">
               <mc:AlternateContent xmlns:mc="http://schemas.openxmlformats.org/markup-compatibility/2006">
                 <mc:Choice xmlns:v="urn:schemas-microsoft-com:vml" Requires="v">
-                  <p:oleObj spid="_x0000_s6189" name="Equation" r:id="rId9" imgW="672840" imgH="457200" progId="Equation.DSMT4">
+                  <p:oleObj spid="_x0000_s6193" name="Equation" r:id="rId9" imgW="672840" imgH="457200" progId="Equation.DSMT4">
                     <p:embed/>
                   </p:oleObj>
                 </mc:Choice>
@@ -6174,7 +6735,7 @@
 </p:sld>
 </file>
 
-<file path=ppt/slides/slide5.xml><?xml version="1.0" encoding="utf-8"?>
+<file path=ppt/slides/slide6.xml><?xml version="1.0" encoding="utf-8"?>
 <p:sld xmlns:a="http://schemas.openxmlformats.org/drawingml/2006/main" xmlns:r="http://schemas.openxmlformats.org/officeDocument/2006/relationships" xmlns:p="http://schemas.openxmlformats.org/presentationml/2006/main">
   <p:cSld>
     <p:spTree>
@@ -6213,7 +6774,7 @@
           <a:graphicData uri="http://schemas.openxmlformats.org/presentationml/2006/ole">
             <mc:AlternateContent xmlns:mc="http://schemas.openxmlformats.org/markup-compatibility/2006">
               <mc:Choice xmlns:v="urn:schemas-microsoft-com:vml" Requires="v">
-                <p:oleObj spid="_x0000_s5192" name="Equation" r:id="rId3" imgW="1854000" imgH="228600" progId="Equation.DSMT4">
+                <p:oleObj spid="_x0000_s5197" name="Equation" r:id="rId3" imgW="1854000" imgH="228600" progId="Equation.DSMT4">
                   <p:embed/>
                 </p:oleObj>
               </mc:Choice>
@@ -6270,7 +6831,7 @@
           <a:graphicData uri="http://schemas.openxmlformats.org/presentationml/2006/ole">
             <mc:AlternateContent xmlns:mc="http://schemas.openxmlformats.org/markup-compatibility/2006">
               <mc:Choice xmlns:v="urn:schemas-microsoft-com:vml" Requires="v">
-                <p:oleObj spid="_x0000_s5193" name="Equation" r:id="rId5" imgW="2425680" imgH="241200" progId="Equation.DSMT4">
+                <p:oleObj spid="_x0000_s5198" name="Equation" r:id="rId5" imgW="2425680" imgH="241200" progId="Equation.DSMT4">
                   <p:embed/>
                 </p:oleObj>
               </mc:Choice>
@@ -6327,7 +6888,7 @@
           <a:graphicData uri="http://schemas.openxmlformats.org/presentationml/2006/ole">
             <mc:AlternateContent xmlns:mc="http://schemas.openxmlformats.org/markup-compatibility/2006">
               <mc:Choice xmlns:v="urn:schemas-microsoft-com:vml" Requires="v">
-                <p:oleObj spid="_x0000_s5194" name="Equation" r:id="rId7" imgW="2374560" imgH="241200" progId="Equation.DSMT4">
+                <p:oleObj spid="_x0000_s5199" name="Equation" r:id="rId7" imgW="2374560" imgH="241200" progId="Equation.DSMT4">
                   <p:embed/>
                 </p:oleObj>
               </mc:Choice>
@@ -6384,7 +6945,7 @@
           <a:graphicData uri="http://schemas.openxmlformats.org/presentationml/2006/ole">
             <mc:AlternateContent xmlns:mc="http://schemas.openxmlformats.org/markup-compatibility/2006">
               <mc:Choice xmlns:v="urn:schemas-microsoft-com:vml" Requires="v">
-                <p:oleObj spid="_x0000_s5195" name="Equation" r:id="rId9" imgW="2425680" imgH="241200" progId="Equation.DSMT4">
+                <p:oleObj spid="_x0000_s5200" name="Equation" r:id="rId9" imgW="2425680" imgH="241200" progId="Equation.DSMT4">
                   <p:embed/>
                 </p:oleObj>
               </mc:Choice>
@@ -6441,7 +7002,7 @@
           <a:graphicData uri="http://schemas.openxmlformats.org/presentationml/2006/ole">
             <mc:AlternateContent xmlns:mc="http://schemas.openxmlformats.org/markup-compatibility/2006">
               <mc:Choice xmlns:v="urn:schemas-microsoft-com:vml" Requires="v">
-                <p:oleObj spid="_x0000_s5196" name="Equation" r:id="rId11" imgW="2361960" imgH="241200" progId="Equation.DSMT4">
+                <p:oleObj spid="_x0000_s5201" name="Equation" r:id="rId11" imgW="2361960" imgH="241200" progId="Equation.DSMT4">
                   <p:embed/>
                 </p:oleObj>
               </mc:Choice>
@@ -6489,7 +7050,7 @@
 </p:sld>
 </file>
 
-<file path=ppt/slides/slide6.xml><?xml version="1.0" encoding="utf-8"?>
+<file path=ppt/slides/slide7.xml><?xml version="1.0" encoding="utf-8"?>
 <p:sld xmlns:a="http://schemas.openxmlformats.org/drawingml/2006/main" xmlns:r="http://schemas.openxmlformats.org/officeDocument/2006/relationships" xmlns:p="http://schemas.openxmlformats.org/presentationml/2006/main">
   <p:cSld>
     <p:spTree>
@@ -6538,7 +7099,7 @@
             <a:graphicData uri="http://schemas.openxmlformats.org/presentationml/2006/ole">
               <mc:AlternateContent xmlns:mc="http://schemas.openxmlformats.org/markup-compatibility/2006">
                 <mc:Choice xmlns:v="urn:schemas-microsoft-com:vml" Requires="v">
-                  <p:oleObj spid="_x0000_s8243" name="Equation" r:id="rId3" imgW="1854000" imgH="228600" progId="Equation.DSMT4">
+                  <p:oleObj spid="_x0000_s8250" name="Equation" r:id="rId3" imgW="1854000" imgH="228600" progId="Equation.DSMT4">
                     <p:embed/>
                   </p:oleObj>
                 </mc:Choice>
@@ -6591,7 +7152,7 @@
             <a:graphicData uri="http://schemas.openxmlformats.org/presentationml/2006/ole">
               <mc:AlternateContent xmlns:mc="http://schemas.openxmlformats.org/markup-compatibility/2006">
                 <mc:Choice xmlns:v="urn:schemas-microsoft-com:vml" Requires="v">
-                  <p:oleObj spid="_x0000_s8244" name="Equation" r:id="rId5" imgW="2425680" imgH="241200" progId="Equation.DSMT4">
+                  <p:oleObj spid="_x0000_s8251" name="Equation" r:id="rId5" imgW="2425680" imgH="241200" progId="Equation.DSMT4">
                     <p:embed/>
                   </p:oleObj>
                 </mc:Choice>
@@ -6644,7 +7205,7 @@
             <a:graphicData uri="http://schemas.openxmlformats.org/presentationml/2006/ole">
               <mc:AlternateContent xmlns:mc="http://schemas.openxmlformats.org/markup-compatibility/2006">
                 <mc:Choice xmlns:v="urn:schemas-microsoft-com:vml" Requires="v">
-                  <p:oleObj spid="_x0000_s8245" name="Equation" r:id="rId7" imgW="2374560" imgH="241200" progId="Equation.DSMT4">
+                  <p:oleObj spid="_x0000_s8252" name="Equation" r:id="rId7" imgW="2374560" imgH="241200" progId="Equation.DSMT4">
                     <p:embed/>
                   </p:oleObj>
                 </mc:Choice>
@@ -6697,7 +7258,7 @@
             <a:graphicData uri="http://schemas.openxmlformats.org/presentationml/2006/ole">
               <mc:AlternateContent xmlns:mc="http://schemas.openxmlformats.org/markup-compatibility/2006">
                 <mc:Choice xmlns:v="urn:schemas-microsoft-com:vml" Requires="v">
-                  <p:oleObj spid="_x0000_s8246" name="Equation" r:id="rId9" imgW="2425680" imgH="241200" progId="Equation.DSMT4">
+                  <p:oleObj spid="_x0000_s8253" name="Equation" r:id="rId9" imgW="2425680" imgH="241200" progId="Equation.DSMT4">
                     <p:embed/>
                   </p:oleObj>
                 </mc:Choice>
@@ -6750,7 +7311,7 @@
             <a:graphicData uri="http://schemas.openxmlformats.org/presentationml/2006/ole">
               <mc:AlternateContent xmlns:mc="http://schemas.openxmlformats.org/markup-compatibility/2006">
                 <mc:Choice xmlns:v="urn:schemas-microsoft-com:vml" Requires="v">
-                  <p:oleObj spid="_x0000_s8247" name="Equation" r:id="rId11" imgW="2361960" imgH="241200" progId="Equation.DSMT4">
+                  <p:oleObj spid="_x0000_s8254" name="Equation" r:id="rId11" imgW="2361960" imgH="241200" progId="Equation.DSMT4">
                     <p:embed/>
                   </p:oleObj>
                 </mc:Choice>
@@ -6818,7 +7379,7 @@
             <a:graphicData uri="http://schemas.openxmlformats.org/presentationml/2006/ole">
               <mc:AlternateContent xmlns:mc="http://schemas.openxmlformats.org/markup-compatibility/2006">
                 <mc:Choice xmlns:v="urn:schemas-microsoft-com:vml" Requires="v">
-                  <p:oleObj spid="_x0000_s8248" name="Equation" r:id="rId13" imgW="1650960" imgH="965160" progId="Equation.DSMT4">
+                  <p:oleObj spid="_x0000_s8255" name="Equation" r:id="rId13" imgW="1650960" imgH="965160" progId="Equation.DSMT4">
                     <p:embed/>
                   </p:oleObj>
                 </mc:Choice>
@@ -6871,7 +7432,7 @@
             <a:graphicData uri="http://schemas.openxmlformats.org/presentationml/2006/ole">
               <mc:AlternateContent xmlns:mc="http://schemas.openxmlformats.org/markup-compatibility/2006">
                 <mc:Choice xmlns:v="urn:schemas-microsoft-com:vml" Requires="v">
-                  <p:oleObj spid="_x0000_s8249" name="Equation" r:id="rId15" imgW="2438280" imgH="914400" progId="Equation.DSMT4">
+                  <p:oleObj spid="_x0000_s8256" name="Equation" r:id="rId15" imgW="2438280" imgH="914400" progId="Equation.DSMT4">
                     <p:embed/>
                   </p:oleObj>
                 </mc:Choice>
@@ -7040,7 +7601,7 @@
 </p:sld>
 </file>
 
-<file path=ppt/slides/slide7.xml><?xml version="1.0" encoding="utf-8"?>
+<file path=ppt/slides/slide8.xml><?xml version="1.0" encoding="utf-8"?>
 <p:sld xmlns:a="http://schemas.openxmlformats.org/drawingml/2006/main" xmlns:r="http://schemas.openxmlformats.org/officeDocument/2006/relationships" xmlns:p="http://schemas.openxmlformats.org/presentationml/2006/main">
   <p:cSld>
     <p:spTree>
@@ -7079,7 +7640,7 @@
           <a:graphicData uri="http://schemas.openxmlformats.org/presentationml/2006/ole">
             <mc:AlternateContent xmlns:mc="http://schemas.openxmlformats.org/markup-compatibility/2006">
               <mc:Choice xmlns:v="urn:schemas-microsoft-com:vml" Requires="v">
-                <p:oleObj spid="_x0000_s9226" name="Equation" r:id="rId3" imgW="1854000" imgH="431640" progId="Equation.DSMT4">
+                <p:oleObj spid="_x0000_s9229" name="Equation" r:id="rId3" imgW="1854000" imgH="431640" progId="Equation.DSMT4">
                   <p:embed/>
                 </p:oleObj>
               </mc:Choice>
@@ -7166,7 +7727,7 @@
           <a:graphicData uri="http://schemas.openxmlformats.org/presentationml/2006/ole">
             <mc:AlternateContent xmlns:mc="http://schemas.openxmlformats.org/markup-compatibility/2006">
               <mc:Choice xmlns:v="urn:schemas-microsoft-com:vml" Requires="v">
-                <p:oleObj spid="_x0000_s9227" name="Equation" r:id="rId5" imgW="1523880" imgH="888840" progId="Equation.DSMT4">
+                <p:oleObj spid="_x0000_s9230" name="Equation" r:id="rId5" imgW="1523880" imgH="888840" progId="Equation.DSMT4">
                   <p:embed/>
                 </p:oleObj>
               </mc:Choice>
@@ -7223,7 +7784,7 @@
           <a:graphicData uri="http://schemas.openxmlformats.org/presentationml/2006/ole">
             <mc:AlternateContent xmlns:mc="http://schemas.openxmlformats.org/markup-compatibility/2006">
               <mc:Choice xmlns:v="urn:schemas-microsoft-com:vml" Requires="v">
-                <p:oleObj spid="_x0000_s9228" name="Equation" r:id="rId7" imgW="2082600" imgH="914400" progId="Equation.DSMT4">
+                <p:oleObj spid="_x0000_s9231" name="Equation" r:id="rId7" imgW="2082600" imgH="914400" progId="Equation.DSMT4">
                   <p:embed/>
                 </p:oleObj>
               </mc:Choice>

</xml_diff>